<commit_message>
update week 7 ppt
</commit_message>
<xml_diff>
--- a/Week07/DomManipulationContinued.pptx
+++ b/Week07/DomManipulationContinued.pptx
@@ -5,7 +5,7 @@
     <p:sldMasterId id="2147483648" r:id="rId1"/>
   </p:sldMasterIdLst>
   <p:notesMasterIdLst>
-    <p:notesMasterId r:id="rId10"/>
+    <p:notesMasterId r:id="rId11"/>
   </p:notesMasterIdLst>
   <p:sldIdLst>
     <p:sldId id="258" r:id="rId2"/>
@@ -16,6 +16,7 @@
     <p:sldId id="313" r:id="rId7"/>
     <p:sldId id="314" r:id="rId8"/>
     <p:sldId id="315" r:id="rId9"/>
+    <p:sldId id="316" r:id="rId10"/>
   </p:sldIdLst>
   <p:sldSz cx="12192000" cy="6858000"/>
   <p:notesSz cx="6858000" cy="9144000"/>
@@ -215,7 +216,7 @@
           <a:p>
             <a:fld id="{19104133-B5B0-4351-8158-4F0E5EB1E2BF}" type="datetimeFigureOut">
               <a:rPr lang="en-US" smtClean="0"/>
-              <a:t>3/26/2020</a:t>
+              <a:t>9/7/2022</a:t>
             </a:fld>
             <a:endParaRPr lang="en-US"/>
           </a:p>
@@ -279,38 +280,37 @@
           <a:p>
             <a:pPr lvl="0"/>
             <a:r>
-              <a:rPr lang="en-US" smtClean="0"/>
+              <a:rPr lang="en-US"/>
               <a:t>Edit Master text styles</a:t>
             </a:r>
           </a:p>
           <a:p>
             <a:pPr lvl="1"/>
             <a:r>
-              <a:rPr lang="en-US" smtClean="0"/>
+              <a:rPr lang="en-US"/>
               <a:t>Second level</a:t>
             </a:r>
           </a:p>
           <a:p>
             <a:pPr lvl="2"/>
             <a:r>
-              <a:rPr lang="en-US" smtClean="0"/>
+              <a:rPr lang="en-US"/>
               <a:t>Third level</a:t>
             </a:r>
           </a:p>
           <a:p>
             <a:pPr lvl="3"/>
             <a:r>
-              <a:rPr lang="en-US" smtClean="0"/>
+              <a:rPr lang="en-US"/>
               <a:t>Fourth level</a:t>
             </a:r>
           </a:p>
           <a:p>
             <a:pPr lvl="4"/>
             <a:r>
-              <a:rPr lang="en-US" smtClean="0"/>
+              <a:rPr lang="en-US"/>
               <a:t>Fifth level</a:t>
             </a:r>
-            <a:endParaRPr lang="en-US"/>
           </a:p>
         </p:txBody>
       </p:sp>
@@ -528,11 +528,11 @@
           <a:lstStyle/>
           <a:p>
             <a:r>
-              <a:rPr lang="en-US" dirty="0" smtClean="0"/>
+              <a:rPr lang="en-US" dirty="0"/>
               <a:t>Ask a student to come up to the whiteboard</a:t>
             </a:r>
             <a:r>
-              <a:rPr lang="en-US" baseline="0" dirty="0" smtClean="0"/>
+              <a:rPr lang="en-US" baseline="0" dirty="0"/>
               <a:t> and write the JavaScript necessary to select the paragraph and store it in a variable.</a:t>
             </a:r>
             <a:endParaRPr lang="en-US" dirty="0"/>
@@ -620,28 +620,28 @@
           <a:lstStyle/>
           <a:p>
             <a:r>
-              <a:rPr lang="en-US" dirty="0" smtClean="0"/>
+              <a:rPr lang="en-US" dirty="0"/>
               <a:t>Show the students the </a:t>
             </a:r>
             <a:r>
-              <a:rPr lang="en-US" b="1" dirty="0" err="1" smtClean="0"/>
+              <a:rPr lang="en-US" b="1" dirty="0" err="1"/>
               <a:t>textContent</a:t>
             </a:r>
             <a:r>
-              <a:rPr lang="en-US" b="0" dirty="0" smtClean="0"/>
+              <a:rPr lang="en-US" b="0" dirty="0"/>
               <a:t> property of an HTML</a:t>
             </a:r>
             <a:r>
-              <a:rPr lang="en-US" b="0" baseline="0" dirty="0" smtClean="0"/>
+              <a:rPr lang="en-US" b="0" baseline="0" dirty="0"/>
               <a:t> element stored in JavaScript. It is possible to update the content programmatically.</a:t>
             </a:r>
           </a:p>
           <a:p>
-            <a:endParaRPr lang="en-US" b="0" baseline="0" dirty="0" smtClean="0"/>
+            <a:endParaRPr lang="en-US" b="0" baseline="0" dirty="0"/>
           </a:p>
           <a:p>
             <a:r>
-              <a:rPr lang="en-US" b="0" baseline="0" dirty="0" smtClean="0"/>
+              <a:rPr lang="en-US" b="0" baseline="0" dirty="0"/>
               <a:t>Note that the capitalization MUST be consistent – all lowercase except for the C in Content.</a:t>
             </a:r>
             <a:endParaRPr lang="en-US" dirty="0"/>
@@ -729,38 +729,34 @@
           <a:lstStyle/>
           <a:p>
             <a:r>
-              <a:rPr lang="en-US" dirty="0" smtClean="0"/>
+              <a:rPr lang="en-US" dirty="0"/>
               <a:t>For the </a:t>
             </a:r>
             <a:r>
-              <a:rPr lang="en-US" dirty="0" err="1" smtClean="0"/>
+              <a:rPr lang="en-US" dirty="0" err="1"/>
               <a:t>Repl</a:t>
             </a:r>
             <a:r>
-              <a:rPr lang="en-US" dirty="0" smtClean="0"/>
+              <a:rPr lang="en-US" dirty="0"/>
               <a:t>,</a:t>
             </a:r>
             <a:r>
-              <a:rPr lang="en-US" baseline="0" dirty="0" smtClean="0"/>
-              <a:t> </a:t>
+              <a:rPr lang="en-US" baseline="0" dirty="0"/>
+              <a:t> show how the text on an HTML page can be updated programmatically. Note that the important part is </a:t>
             </a:r>
             <a:r>
-              <a:rPr lang="en-US" baseline="0" dirty="0" smtClean="0"/>
-              <a:t>show how the text on an HTML page can be updated programmatically. Note that the important part is </a:t>
-            </a:r>
-            <a:r>
-              <a:rPr lang="en-US" b="1" baseline="0" dirty="0" smtClean="0"/>
+              <a:rPr lang="en-US" b="1" baseline="0" dirty="0"/>
               <a:t>.</a:t>
             </a:r>
             <a:r>
-              <a:rPr lang="en-US" b="1" baseline="0" dirty="0" err="1" smtClean="0"/>
+              <a:rPr lang="en-US" b="1" baseline="0" dirty="0" err="1"/>
               <a:t>textContent</a:t>
             </a:r>
             <a:r>
-              <a:rPr lang="en-US" b="0" baseline="0" dirty="0" smtClean="0"/>
+              <a:rPr lang="en-US" b="0" baseline="0" dirty="0"/>
               <a:t>.</a:t>
             </a:r>
-            <a:endParaRPr lang="en-US" baseline="0" dirty="0" smtClean="0"/>
+            <a:endParaRPr lang="en-US" baseline="0" dirty="0"/>
           </a:p>
         </p:txBody>
       </p:sp>
@@ -845,63 +841,63 @@
           <a:lstStyle/>
           <a:p>
             <a:r>
-              <a:rPr lang="en-US" dirty="0" smtClean="0"/>
+              <a:rPr lang="en-US" dirty="0"/>
               <a:t>Another thing you can do with JavaScript is create completely new HTML elements</a:t>
             </a:r>
             <a:r>
-              <a:rPr lang="en-US" baseline="0" dirty="0" smtClean="0"/>
+              <a:rPr lang="en-US" baseline="0" dirty="0"/>
               <a:t> with </a:t>
             </a:r>
             <a:r>
-              <a:rPr lang="en-US" b="1" baseline="0" dirty="0" err="1" smtClean="0"/>
+              <a:rPr lang="en-US" b="1" baseline="0" dirty="0" err="1"/>
               <a:t>document.createElement</a:t>
             </a:r>
             <a:r>
-              <a:rPr lang="en-US" b="0" baseline="0" dirty="0" smtClean="0"/>
+              <a:rPr lang="en-US" b="0" baseline="0" dirty="0"/>
               <a:t>.</a:t>
             </a:r>
-            <a:endParaRPr lang="en-US" dirty="0" smtClean="0"/>
+            <a:endParaRPr lang="en-US" dirty="0"/>
           </a:p>
           <a:p>
-            <a:endParaRPr lang="en-US" dirty="0" smtClean="0"/>
+            <a:endParaRPr lang="en-US" dirty="0"/>
           </a:p>
           <a:p>
             <a:r>
-              <a:rPr lang="en-US" dirty="0" smtClean="0"/>
+              <a:rPr lang="en-US" dirty="0"/>
               <a:t>Show</a:t>
             </a:r>
             <a:r>
-              <a:rPr lang="en-US" baseline="0" dirty="0" smtClean="0"/>
+              <a:rPr lang="en-US" baseline="0" dirty="0"/>
               <a:t> </a:t>
             </a:r>
             <a:r>
-              <a:rPr lang="en-US" b="1" baseline="0" dirty="0" err="1" smtClean="0"/>
+              <a:rPr lang="en-US" b="1" baseline="0" dirty="0" err="1"/>
               <a:t>document.createElement</a:t>
             </a:r>
             <a:r>
-              <a:rPr lang="en-US" baseline="0" dirty="0" smtClean="0"/>
+              <a:rPr lang="en-US" baseline="0" dirty="0"/>
               <a:t>. Explain that it creates a new HTML element just like you would do in an HTML file – but it is programmatic!</a:t>
             </a:r>
           </a:p>
           <a:p>
-            <a:endParaRPr lang="en-US" baseline="0" dirty="0" smtClean="0"/>
+            <a:endParaRPr lang="en-US" baseline="0" dirty="0"/>
           </a:p>
           <a:p>
             <a:r>
-              <a:rPr lang="en-US" baseline="0" dirty="0" smtClean="0"/>
+              <a:rPr lang="en-US" baseline="0" dirty="0"/>
               <a:t>This creates an element in JavaScript, but it does not add it to the actual HTML document yet…</a:t>
             </a:r>
           </a:p>
           <a:p>
-            <a:endParaRPr lang="en-US" baseline="0" dirty="0" smtClean="0"/>
+            <a:endParaRPr lang="en-US" baseline="0" dirty="0"/>
           </a:p>
           <a:p>
             <a:r>
-              <a:rPr lang="en-US" baseline="0" dirty="0" smtClean="0"/>
+              <a:rPr lang="en-US" baseline="0" dirty="0"/>
               <a:t>Ask the students what the HTML element would look like. It is </a:t>
             </a:r>
             <a:r>
-              <a:rPr lang="en-US" b="1" baseline="0" dirty="0" smtClean="0"/>
+              <a:rPr lang="en-US" b="1" baseline="0" dirty="0"/>
               <a:t>&lt;p&gt;New Paragraph!&lt;/p&gt;</a:t>
             </a:r>
           </a:p>
@@ -991,126 +987,126 @@
           <a:lstStyle/>
           <a:p>
             <a:r>
-              <a:rPr lang="en-US" dirty="0" smtClean="0"/>
+              <a:rPr lang="en-US" dirty="0"/>
               <a:t>Ask</a:t>
             </a:r>
             <a:r>
-              <a:rPr lang="en-US" baseline="0" dirty="0" smtClean="0"/>
+              <a:rPr lang="en-US" baseline="0" dirty="0"/>
               <a:t> the students where they think the new element will appear on the HTML page – </a:t>
             </a:r>
             <a:r>
-              <a:rPr lang="en-US" b="1" baseline="0" dirty="0" smtClean="0"/>
+              <a:rPr lang="en-US" b="1" baseline="0" dirty="0"/>
               <a:t>Nowhere!</a:t>
             </a:r>
           </a:p>
           <a:p>
-            <a:endParaRPr lang="en-US" b="1" baseline="0" dirty="0" smtClean="0"/>
+            <a:endParaRPr lang="en-US" b="1" baseline="0" dirty="0"/>
           </a:p>
           <a:p>
             <a:r>
-              <a:rPr lang="en-US" b="0" baseline="0" dirty="0" smtClean="0"/>
+              <a:rPr lang="en-US" b="0" baseline="0" dirty="0"/>
               <a:t>Explain that for an element to appear, it must be appended to the document somewhere. This is possible with </a:t>
             </a:r>
             <a:r>
-              <a:rPr lang="en-US" b="1" baseline="0" dirty="0" err="1" smtClean="0"/>
+              <a:rPr lang="en-US" b="1" baseline="0" dirty="0" err="1"/>
               <a:t>appendChild</a:t>
             </a:r>
             <a:r>
-              <a:rPr lang="en-US" b="0" baseline="0" dirty="0" smtClean="0"/>
+              <a:rPr lang="en-US" b="0" baseline="0" dirty="0"/>
               <a:t>. </a:t>
             </a:r>
           </a:p>
           <a:p>
-            <a:endParaRPr lang="en-US" b="0" baseline="0" dirty="0" smtClean="0"/>
+            <a:endParaRPr lang="en-US" b="0" baseline="0" dirty="0"/>
           </a:p>
           <a:p>
             <a:r>
-              <a:rPr lang="en-US" b="0" baseline="0" dirty="0" smtClean="0"/>
+              <a:rPr lang="en-US" b="0" baseline="0" dirty="0"/>
               <a:t>First, it is necessary to have a container element (like the HTML </a:t>
             </a:r>
             <a:r>
-              <a:rPr lang="en-US" b="1" baseline="0" dirty="0" smtClean="0"/>
+              <a:rPr lang="en-US" b="1" baseline="0" dirty="0"/>
               <a:t>div</a:t>
             </a:r>
             <a:r>
-              <a:rPr lang="en-US" b="0" baseline="0" dirty="0" smtClean="0"/>
+              <a:rPr lang="en-US" b="0" baseline="0" dirty="0"/>
               <a:t> with an </a:t>
             </a:r>
             <a:r>
-              <a:rPr lang="en-US" b="1" baseline="0" dirty="0" smtClean="0"/>
+              <a:rPr lang="en-US" b="1" baseline="0" dirty="0"/>
               <a:t>id</a:t>
             </a:r>
             <a:r>
-              <a:rPr lang="en-US" b="0" baseline="0" dirty="0" smtClean="0"/>
+              <a:rPr lang="en-US" b="0" baseline="0" dirty="0"/>
               <a:t> of </a:t>
             </a:r>
             <a:r>
-              <a:rPr lang="en-US" b="1" baseline="0" dirty="0" smtClean="0"/>
+              <a:rPr lang="en-US" b="1" baseline="0" dirty="0"/>
               <a:t>container</a:t>
             </a:r>
             <a:r>
-              <a:rPr lang="en-US" b="0" baseline="0" dirty="0" smtClean="0"/>
+              <a:rPr lang="en-US" b="0" baseline="0" dirty="0"/>
               <a:t>)</a:t>
             </a:r>
           </a:p>
           <a:p>
-            <a:endParaRPr lang="en-US" b="0" baseline="0" dirty="0" smtClean="0"/>
+            <a:endParaRPr lang="en-US" b="0" baseline="0" dirty="0"/>
           </a:p>
           <a:p>
             <a:r>
-              <a:rPr lang="en-US" b="0" baseline="0" dirty="0" smtClean="0"/>
+              <a:rPr lang="en-US" b="0" baseline="0" dirty="0"/>
               <a:t>Ask the students how to select the </a:t>
             </a:r>
             <a:r>
-              <a:rPr lang="en-US" b="1" baseline="0" dirty="0" smtClean="0"/>
+              <a:rPr lang="en-US" b="1" baseline="0" dirty="0"/>
               <a:t>div</a:t>
             </a:r>
             <a:r>
-              <a:rPr lang="en-US" b="0" baseline="0" dirty="0" smtClean="0"/>
+              <a:rPr lang="en-US" b="0" baseline="0" dirty="0"/>
               <a:t> in JavaScript – </a:t>
             </a:r>
             <a:r>
-              <a:rPr lang="en-US" b="1" baseline="0" dirty="0" err="1" smtClean="0"/>
+              <a:rPr lang="en-US" b="1" baseline="0" dirty="0" err="1"/>
               <a:t>document.querySelector</a:t>
             </a:r>
             <a:r>
-              <a:rPr lang="en-US" b="1" baseline="0" dirty="0" smtClean="0"/>
+              <a:rPr lang="en-US" b="1" baseline="0" dirty="0"/>
               <a:t>(“#container”)</a:t>
             </a:r>
           </a:p>
           <a:p>
-            <a:endParaRPr lang="en-US" b="0" baseline="0" dirty="0" smtClean="0"/>
+            <a:endParaRPr lang="en-US" b="0" baseline="0" dirty="0"/>
           </a:p>
           <a:p>
             <a:r>
-              <a:rPr lang="en-US" b="0" baseline="0" dirty="0" smtClean="0"/>
+              <a:rPr lang="en-US" b="0" baseline="0" dirty="0"/>
               <a:t>Show how to append the </a:t>
             </a:r>
             <a:r>
-              <a:rPr lang="en-US" b="1" baseline="0" dirty="0" err="1" smtClean="0"/>
+              <a:rPr lang="en-US" b="1" baseline="0" dirty="0" err="1"/>
               <a:t>myPara</a:t>
             </a:r>
             <a:r>
-              <a:rPr lang="en-US" b="0" baseline="0" dirty="0" smtClean="0"/>
+              <a:rPr lang="en-US" b="0" baseline="0" dirty="0"/>
               <a:t> element to the </a:t>
             </a:r>
             <a:r>
-              <a:rPr lang="en-US" b="1" baseline="0" dirty="0" err="1" smtClean="0"/>
+              <a:rPr lang="en-US" b="1" baseline="0" dirty="0" err="1"/>
               <a:t>myDiv</a:t>
             </a:r>
             <a:r>
-              <a:rPr lang="en-US" b="0" baseline="0" dirty="0" smtClean="0"/>
+              <a:rPr lang="en-US" b="0" baseline="0" dirty="0"/>
               <a:t> element with </a:t>
             </a:r>
             <a:r>
-              <a:rPr lang="en-US" b="1" baseline="0" dirty="0" smtClean="0"/>
+              <a:rPr lang="en-US" b="1" baseline="0" dirty="0"/>
               <a:t>.</a:t>
             </a:r>
             <a:r>
-              <a:rPr lang="en-US" b="1" baseline="0" dirty="0" err="1" smtClean="0"/>
+              <a:rPr lang="en-US" b="1" baseline="0" dirty="0" err="1"/>
               <a:t>appendChild</a:t>
             </a:r>
-            <a:endParaRPr lang="en-US" b="0" baseline="0" dirty="0" smtClean="0"/>
+            <a:endParaRPr lang="en-US" b="0" baseline="0" dirty="0"/>
           </a:p>
           <a:p>
             <a:endParaRPr lang="en-US" b="0" dirty="0"/>
@@ -1342,35 +1338,35 @@
           <a:lstStyle/>
           <a:p>
             <a:r>
-              <a:rPr lang="en-US" dirty="0" smtClean="0"/>
+              <a:rPr lang="en-US" dirty="0"/>
               <a:t>In the </a:t>
             </a:r>
             <a:r>
-              <a:rPr lang="en-US" dirty="0" err="1" smtClean="0"/>
+              <a:rPr lang="en-US" dirty="0" err="1"/>
               <a:t>Repl</a:t>
             </a:r>
             <a:r>
-              <a:rPr lang="en-US" dirty="0" smtClean="0"/>
+              <a:rPr lang="en-US" dirty="0"/>
               <a:t>, click the button a couple of times and</a:t>
             </a:r>
             <a:r>
-              <a:rPr lang="en-US" baseline="0" dirty="0" smtClean="0"/>
+              <a:rPr lang="en-US" baseline="0" dirty="0"/>
               <a:t> inspect element to show the new paragraphs added.</a:t>
             </a:r>
           </a:p>
           <a:p>
-            <a:endParaRPr lang="en-US" baseline="0" dirty="0" smtClean="0"/>
+            <a:endParaRPr lang="en-US" baseline="0" dirty="0"/>
           </a:p>
           <a:p>
             <a:r>
-              <a:rPr lang="en-US" baseline="0" dirty="0" smtClean="0"/>
+              <a:rPr lang="en-US" baseline="0" dirty="0"/>
               <a:t>Note the use of </a:t>
             </a:r>
             <a:r>
-              <a:rPr lang="en-US" b="1" baseline="0" dirty="0" err="1" smtClean="0"/>
+              <a:rPr lang="en-US" b="1" baseline="0" dirty="0" err="1"/>
               <a:t>appendChild</a:t>
             </a:r>
-            <a:endParaRPr lang="en-US" baseline="0" dirty="0" smtClean="0"/>
+            <a:endParaRPr lang="en-US" baseline="0" dirty="0"/>
           </a:p>
         </p:txBody>
       </p:sp>
@@ -1550,15 +1546,7 @@
           <a:p>
             <a:r>
               <a:rPr lang="en-US" dirty="0"/>
-              <a:t>Click to edit Master </a:t>
-            </a:r>
-            <a:r>
-              <a:rPr lang="en-US" dirty="0" smtClean="0"/>
-              <a:t>subtitle </a:t>
-            </a:r>
-            <a:r>
-              <a:rPr lang="en-US" dirty="0"/>
-              <a:t>style</a:t>
+              <a:t>Click to edit Master subtitle style</a:t>
             </a:r>
           </a:p>
         </p:txBody>
@@ -1600,7 +1588,7 @@
             <a:fld id="{1C2D31DE-C454-491C-B5C3-F097855E3DF7}" type="datetime4">
               <a:rPr lang="en-US" smtClean="0"/>
               <a:pPr/>
-              <a:t>March 26, 2020</a:t>
+              <a:t>September 7, 2022</a:t>
             </a:fld>
             <a:endParaRPr lang="en-US" dirty="0"/>
           </a:p>
@@ -4674,17 +4662,16 @@
           <a:p>
             <a:pPr lvl="0"/>
             <a:r>
-              <a:rPr lang="en-US" dirty="0" smtClean="0"/>
+              <a:rPr lang="en-US" dirty="0"/>
               <a:t>Presenter Name</a:t>
             </a:r>
             <a:br>
-              <a:rPr lang="en-US" dirty="0" smtClean="0"/>
+              <a:rPr lang="en-US" dirty="0"/>
             </a:br>
             <a:r>
-              <a:rPr lang="en-US" dirty="0" smtClean="0"/>
+              <a:rPr lang="en-US" dirty="0"/>
               <a:t>Presenter Title</a:t>
             </a:r>
-            <a:endParaRPr lang="en-US" dirty="0"/>
           </a:p>
         </p:txBody>
       </p:sp>
@@ -4701,13 +4688,6 @@
   <p:transition>
     <p:fade/>
   </p:transition>
-  <p:timing>
-    <p:tnLst>
-      <p:par>
-        <p:cTn id="1" dur="indefinite" restart="never" nodeType="tmRoot"/>
-      </p:par>
-    </p:tnLst>
-  </p:timing>
   <p:hf sldNum="0" hdr="0" ftr="0"/>
 </p:sldLayout>
 </file>
@@ -5000,7 +4980,7 @@
           <a:p>
             <a:fld id="{5958763E-B898-436D-883D-03711491D54A}" type="datetimeFigureOut">
               <a:rPr lang="en-US" smtClean="0"/>
-              <a:t>3/26/2020</a:t>
+              <a:t>9/7/2022</a:t>
             </a:fld>
             <a:endParaRPr lang="en-US"/>
           </a:p>
@@ -5073,13 +5053,6 @@
   <p:transition>
     <p:fade/>
   </p:transition>
-  <p:timing>
-    <p:tnLst>
-      <p:par>
-        <p:cTn id="1" dur="indefinite" restart="never" nodeType="tmRoot"/>
-      </p:par>
-    </p:tnLst>
-  </p:timing>
 </p:sldLayout>
 </file>
 
@@ -5128,10 +5101,9 @@
           </a:lstStyle>
           <a:p>
             <a:r>
-              <a:rPr lang="en-US" dirty="0" smtClean="0"/>
+              <a:rPr lang="en-US" dirty="0"/>
               <a:t>Click icon to add picture</a:t>
             </a:r>
-            <a:endParaRPr lang="en-US" dirty="0"/>
           </a:p>
         </p:txBody>
       </p:sp>
@@ -5201,7 +5173,7 @@
           <a:p>
             <a:fld id="{5958763E-B898-436D-883D-03711491D54A}" type="datetimeFigureOut">
               <a:rPr lang="en-US" smtClean="0"/>
-              <a:t>3/26/2020</a:t>
+              <a:t>9/7/2022</a:t>
             </a:fld>
             <a:endParaRPr lang="en-US"/>
           </a:p>
@@ -5274,13 +5246,6 @@
   <p:transition>
     <p:fade/>
   </p:transition>
-  <p:timing>
-    <p:tnLst>
-      <p:par>
-        <p:cTn id="1" dur="indefinite" restart="never" nodeType="tmRoot"/>
-      </p:par>
-    </p:tnLst>
-  </p:timing>
 </p:sldLayout>
 </file>
 
@@ -5458,7 +5423,7 @@
           <a:p>
             <a:fld id="{5958763E-B898-436D-883D-03711491D54A}" type="datetimeFigureOut">
               <a:rPr lang="en-US" smtClean="0"/>
-              <a:t>3/26/2020</a:t>
+              <a:t>9/7/2022</a:t>
             </a:fld>
             <a:endParaRPr lang="en-US"/>
           </a:p>
@@ -5531,13 +5496,6 @@
   <p:transition>
     <p:fade/>
   </p:transition>
-  <p:timing>
-    <p:tnLst>
-      <p:par>
-        <p:cTn id="1" dur="indefinite" restart="never" nodeType="tmRoot"/>
-      </p:par>
-    </p:tnLst>
-  </p:timing>
 </p:sldLayout>
 </file>
 
@@ -5813,7 +5771,7 @@
           <a:p>
             <a:fld id="{5958763E-B898-436D-883D-03711491D54A}" type="datetimeFigureOut">
               <a:rPr lang="en-US" smtClean="0"/>
-              <a:t>3/26/2020</a:t>
+              <a:t>9/7/2022</a:t>
             </a:fld>
             <a:endParaRPr lang="en-US"/>
           </a:p>
@@ -5874,13 +5832,6 @@
   <p:transition>
     <p:fade/>
   </p:transition>
-  <p:timing>
-    <p:tnLst>
-      <p:par>
-        <p:cTn id="1" dur="indefinite" restart="never" nodeType="tmRoot"/>
-      </p:par>
-    </p:tnLst>
-  </p:timing>
 </p:sldLayout>
 </file>
 
@@ -6236,7 +6187,7 @@
           <a:p>
             <a:fld id="{5958763E-B898-436D-883D-03711491D54A}" type="datetimeFigureOut">
               <a:rPr lang="en-US" smtClean="0"/>
-              <a:t>3/26/2020</a:t>
+              <a:t>9/7/2022</a:t>
             </a:fld>
             <a:endParaRPr lang="en-US"/>
           </a:p>
@@ -6297,13 +6248,6 @@
   <p:transition>
     <p:fade/>
   </p:transition>
-  <p:timing>
-    <p:tnLst>
-      <p:par>
-        <p:cTn id="1" dur="indefinite" restart="never" nodeType="tmRoot"/>
-      </p:par>
-    </p:tnLst>
-  </p:timing>
 </p:sldLayout>
 </file>
 
@@ -6744,7 +6688,7 @@
           <a:p>
             <a:fld id="{5958763E-B898-436D-883D-03711491D54A}" type="datetimeFigureOut">
               <a:rPr lang="en-US" smtClean="0"/>
-              <a:t>3/26/2020</a:t>
+              <a:t>9/7/2022</a:t>
             </a:fld>
             <a:endParaRPr lang="en-US"/>
           </a:p>
@@ -6805,13 +6749,6 @@
   <p:transition>
     <p:fade/>
   </p:transition>
-  <p:timing>
-    <p:tnLst>
-      <p:par>
-        <p:cTn id="1" dur="indefinite" restart="never" nodeType="tmRoot"/>
-      </p:par>
-    </p:tnLst>
-  </p:timing>
 </p:sldLayout>
 </file>
 
@@ -7202,7 +7139,7 @@
           <a:p>
             <a:fld id="{5958763E-B898-436D-883D-03711491D54A}" type="datetimeFigureOut">
               <a:rPr lang="en-US" smtClean="0"/>
-              <a:t>3/26/2020</a:t>
+              <a:t>9/7/2022</a:t>
             </a:fld>
             <a:endParaRPr lang="en-US"/>
           </a:p>
@@ -7263,13 +7200,6 @@
   <p:transition>
     <p:fade/>
   </p:transition>
-  <p:timing>
-    <p:tnLst>
-      <p:par>
-        <p:cTn id="1" dur="indefinite" restart="never" nodeType="tmRoot"/>
-      </p:par>
-    </p:tnLst>
-  </p:timing>
 </p:sldLayout>
 </file>
 
@@ -7820,7 +7750,7 @@
           <a:p>
             <a:fld id="{5958763E-B898-436D-883D-03711491D54A}" type="datetimeFigureOut">
               <a:rPr lang="en-US" smtClean="0"/>
-              <a:t>3/26/2020</a:t>
+              <a:t>9/7/2022</a:t>
             </a:fld>
             <a:endParaRPr lang="en-US"/>
           </a:p>
@@ -7881,13 +7811,6 @@
   <p:transition>
     <p:fade/>
   </p:transition>
-  <p:timing>
-    <p:tnLst>
-      <p:par>
-        <p:cTn id="1" dur="indefinite" restart="never" nodeType="tmRoot"/>
-      </p:par>
-    </p:tnLst>
-  </p:timing>
 </p:sldLayout>
 </file>
 
@@ -8598,7 +8521,7 @@
           <a:p>
             <a:fld id="{5958763E-B898-436D-883D-03711491D54A}" type="datetimeFigureOut">
               <a:rPr lang="en-US" smtClean="0"/>
-              <a:t>3/26/2020</a:t>
+              <a:t>9/7/2022</a:t>
             </a:fld>
             <a:endParaRPr lang="en-US"/>
           </a:p>
@@ -8659,13 +8582,6 @@
   <p:transition>
     <p:fade/>
   </p:transition>
-  <p:timing>
-    <p:tnLst>
-      <p:par>
-        <p:cTn id="1" dur="indefinite" restart="never" nodeType="tmRoot"/>
-      </p:par>
-    </p:tnLst>
-  </p:timing>
 </p:sldLayout>
 </file>
 
@@ -8709,7 +8625,7 @@
           <a:p>
             <a:fld id="{5958763E-B898-436D-883D-03711491D54A}" type="datetimeFigureOut">
               <a:rPr lang="en-US" smtClean="0"/>
-              <a:t>3/26/2020</a:t>
+              <a:t>9/7/2022</a:t>
             </a:fld>
             <a:endParaRPr lang="en-US"/>
           </a:p>
@@ -8782,13 +8698,6 @@
   <p:transition>
     <p:fade/>
   </p:transition>
-  <p:timing>
-    <p:tnLst>
-      <p:par>
-        <p:cTn id="1" dur="indefinite" restart="never" nodeType="tmRoot"/>
-      </p:par>
-    </p:tnLst>
-  </p:timing>
 </p:sldLayout>
 </file>
 
@@ -8868,7 +8777,7 @@
                 <a:spcPct val="0"/>
               </a:spcAft>
             </a:pPr>
-            <a:endParaRPr lang="en-US" sz="2400" dirty="0" err="1" smtClean="0">
+            <a:endParaRPr lang="en-US" sz="2400" dirty="0" err="1">
               <a:gradFill>
                 <a:gsLst>
                   <a:gs pos="0">
@@ -9001,15 +8910,7 @@
           <a:p>
             <a:r>
               <a:rPr lang="en-US" dirty="0"/>
-              <a:t>Click to edit Master </a:t>
-            </a:r>
-            <a:r>
-              <a:rPr lang="en-US" dirty="0" smtClean="0"/>
-              <a:t>subtitle </a:t>
-            </a:r>
-            <a:r>
-              <a:rPr lang="en-US" dirty="0"/>
-              <a:t>style</a:t>
+              <a:t>Click to edit Master subtitle style</a:t>
             </a:r>
           </a:p>
         </p:txBody>
@@ -9051,7 +8952,7 @@
             <a:fld id="{1C2D31DE-C454-491C-B5C3-F097855E3DF7}" type="datetime4">
               <a:rPr lang="en-US" smtClean="0"/>
               <a:pPr/>
-              <a:t>March 26, 2020</a:t>
+              <a:t>September 7, 2022</a:t>
             </a:fld>
             <a:endParaRPr lang="en-US" dirty="0"/>
           </a:p>
@@ -12125,17 +12026,16 @@
           <a:p>
             <a:pPr lvl="0"/>
             <a:r>
-              <a:rPr lang="en-US" dirty="0" smtClean="0"/>
+              <a:rPr lang="en-US" dirty="0"/>
               <a:t>Presenter Name</a:t>
             </a:r>
             <a:br>
-              <a:rPr lang="en-US" dirty="0" smtClean="0"/>
+              <a:rPr lang="en-US" dirty="0"/>
             </a:br>
             <a:r>
-              <a:rPr lang="en-US" dirty="0" smtClean="0"/>
+              <a:rPr lang="en-US" dirty="0"/>
               <a:t>Presenter Title</a:t>
             </a:r>
-            <a:endParaRPr lang="en-US" dirty="0"/>
           </a:p>
         </p:txBody>
       </p:sp>
@@ -12152,13 +12052,6 @@
   <p:transition>
     <p:fade/>
   </p:transition>
-  <p:timing>
-    <p:tnLst>
-      <p:par>
-        <p:cTn id="1" dur="indefinite" restart="never" nodeType="tmRoot"/>
-      </p:par>
-    </p:tnLst>
-  </p:timing>
   <p:hf sldNum="0" hdr="0" ftr="0"/>
 </p:sldLayout>
 </file>
@@ -12211,7 +12104,7 @@
           <a:p>
             <a:fld id="{5958763E-B898-436D-883D-03711491D54A}" type="datetimeFigureOut">
               <a:rPr lang="en-US" smtClean="0"/>
-              <a:t>3/26/2020</a:t>
+              <a:t>9/7/2022</a:t>
             </a:fld>
             <a:endParaRPr lang="en-US"/>
           </a:p>
@@ -12284,13 +12177,6 @@
   <p:transition>
     <p:fade/>
   </p:transition>
-  <p:timing>
-    <p:tnLst>
-      <p:par>
-        <p:cTn id="1" dur="indefinite" restart="never" nodeType="tmRoot"/>
-      </p:par>
-    </p:tnLst>
-  </p:timing>
 </p:sldLayout>
 </file>
 
@@ -12342,7 +12228,7 @@
           <a:p>
             <a:fld id="{5958763E-B898-436D-883D-03711491D54A}" type="datetimeFigureOut">
               <a:rPr lang="en-US" smtClean="0"/>
-              <a:t>3/26/2020</a:t>
+              <a:t>9/7/2022</a:t>
             </a:fld>
             <a:endParaRPr lang="en-US"/>
           </a:p>
@@ -12415,13 +12301,6 @@
   <p:transition>
     <p:fade/>
   </p:transition>
-  <p:timing>
-    <p:tnLst>
-      <p:par>
-        <p:cTn id="1" dur="indefinite" restart="never" nodeType="tmRoot"/>
-      </p:par>
-    </p:tnLst>
-  </p:timing>
 </p:sldLayout>
 </file>
 
@@ -12473,7 +12352,7 @@
           <a:p>
             <a:fld id="{5958763E-B898-436D-883D-03711491D54A}" type="datetimeFigureOut">
               <a:rPr lang="en-US" smtClean="0"/>
-              <a:t>3/26/2020</a:t>
+              <a:t>9/7/2022</a:t>
             </a:fld>
             <a:endParaRPr lang="en-US"/>
           </a:p>
@@ -12546,13 +12425,6 @@
   <p:transition>
     <p:fade/>
   </p:transition>
-  <p:timing>
-    <p:tnLst>
-      <p:par>
-        <p:cTn id="1" dur="indefinite" restart="never" nodeType="tmRoot"/>
-      </p:par>
-    </p:tnLst>
-  </p:timing>
 </p:sldLayout>
 </file>
 
@@ -12604,7 +12476,7 @@
           <a:p>
             <a:fld id="{5958763E-B898-436D-883D-03711491D54A}" type="datetimeFigureOut">
               <a:rPr lang="en-US" smtClean="0"/>
-              <a:t>3/26/2020</a:t>
+              <a:t>9/7/2022</a:t>
             </a:fld>
             <a:endParaRPr lang="en-US"/>
           </a:p>
@@ -12677,13 +12549,6 @@
   <p:transition>
     <p:fade/>
   </p:transition>
-  <p:timing>
-    <p:tnLst>
-      <p:par>
-        <p:cTn id="1" dur="indefinite" restart="never" nodeType="tmRoot"/>
-      </p:par>
-    </p:tnLst>
-  </p:timing>
 </p:sldLayout>
 </file>
 
@@ -12735,7 +12600,7 @@
           <a:p>
             <a:fld id="{5958763E-B898-436D-883D-03711491D54A}" type="datetimeFigureOut">
               <a:rPr lang="en-US" smtClean="0"/>
-              <a:t>3/26/2020</a:t>
+              <a:t>9/7/2022</a:t>
             </a:fld>
             <a:endParaRPr lang="en-US"/>
           </a:p>
@@ -12808,13 +12673,6 @@
   <p:transition>
     <p:fade/>
   </p:transition>
-  <p:timing>
-    <p:tnLst>
-      <p:par>
-        <p:cTn id="1" dur="indefinite" restart="never" nodeType="tmRoot"/>
-      </p:par>
-    </p:tnLst>
-  </p:timing>
 </p:sldLayout>
 </file>
 
@@ -12866,7 +12724,7 @@
           <a:p>
             <a:fld id="{5958763E-B898-436D-883D-03711491D54A}" type="datetimeFigureOut">
               <a:rPr lang="en-US" smtClean="0"/>
-              <a:t>3/26/2020</a:t>
+              <a:t>9/7/2022</a:t>
             </a:fld>
             <a:endParaRPr lang="en-US"/>
           </a:p>
@@ -12939,13 +12797,6 @@
   <p:transition>
     <p:fade/>
   </p:transition>
-  <p:timing>
-    <p:tnLst>
-      <p:par>
-        <p:cTn id="1" dur="indefinite" restart="never" nodeType="tmRoot"/>
-      </p:par>
-    </p:tnLst>
-  </p:timing>
 </p:sldLayout>
 </file>
 
@@ -12997,7 +12848,7 @@
           <a:p>
             <a:fld id="{5958763E-B898-436D-883D-03711491D54A}" type="datetimeFigureOut">
               <a:rPr lang="en-US" smtClean="0"/>
-              <a:t>3/26/2020</a:t>
+              <a:t>9/7/2022</a:t>
             </a:fld>
             <a:endParaRPr lang="en-US"/>
           </a:p>
@@ -13070,13 +12921,6 @@
   <p:transition>
     <p:fade/>
   </p:transition>
-  <p:timing>
-    <p:tnLst>
-      <p:par>
-        <p:cTn id="1" dur="indefinite" restart="never" nodeType="tmRoot"/>
-      </p:par>
-    </p:tnLst>
-  </p:timing>
 </p:sldLayout>
 </file>
 
@@ -13128,7 +12972,7 @@
           <a:p>
             <a:fld id="{5958763E-B898-436D-883D-03711491D54A}" type="datetimeFigureOut">
               <a:rPr lang="en-US" smtClean="0"/>
-              <a:t>3/26/2020</a:t>
+              <a:t>9/7/2022</a:t>
             </a:fld>
             <a:endParaRPr lang="en-US"/>
           </a:p>
@@ -13201,13 +13045,6 @@
   <p:transition>
     <p:fade/>
   </p:transition>
-  <p:timing>
-    <p:tnLst>
-      <p:par>
-        <p:cTn id="1" dur="indefinite" restart="never" nodeType="tmRoot"/>
-      </p:par>
-    </p:tnLst>
-  </p:timing>
 </p:sldLayout>
 </file>
 
@@ -13268,7 +13105,7 @@
           <a:p>
             <a:fld id="{5958763E-B898-436D-883D-03711491D54A}" type="datetimeFigureOut">
               <a:rPr lang="en-US" smtClean="0"/>
-              <a:t>3/26/2020</a:t>
+              <a:t>9/7/2022</a:t>
             </a:fld>
             <a:endParaRPr lang="en-US"/>
           </a:p>
@@ -13341,13 +13178,6 @@
   <p:transition>
     <p:fade/>
   </p:transition>
-  <p:timing>
-    <p:tnLst>
-      <p:par>
-        <p:cTn id="1" dur="indefinite" restart="never" nodeType="tmRoot"/>
-      </p:par>
-    </p:tnLst>
-  </p:timing>
 </p:sldLayout>
 </file>
 
@@ -16349,13 +16179,6 @@
   <p:transition>
     <p:fade/>
   </p:transition>
-  <p:timing>
-    <p:tnLst>
-      <p:par>
-        <p:cTn id="1" dur="indefinite" restart="never" nodeType="tmRoot"/>
-      </p:par>
-    </p:tnLst>
-  </p:timing>
 </p:sldLayout>
 </file>
 
@@ -16443,7 +16266,7 @@
                 <a:spcPct val="0"/>
               </a:spcAft>
             </a:pPr>
-            <a:endParaRPr lang="en-US" sz="2400" dirty="0" err="1" smtClean="0">
+            <a:endParaRPr lang="en-US" sz="2400" dirty="0" err="1">
               <a:gradFill>
                 <a:gsLst>
                   <a:gs pos="0">
@@ -16579,15 +16402,7 @@
           <a:p>
             <a:r>
               <a:rPr lang="en-US" dirty="0"/>
-              <a:t>Click to edit Master </a:t>
-            </a:r>
-            <a:r>
-              <a:rPr lang="en-US" dirty="0" smtClean="0"/>
-              <a:t>subtitle </a:t>
-            </a:r>
-            <a:r>
-              <a:rPr lang="en-US" dirty="0"/>
-              <a:t>style</a:t>
+              <a:t>Click to edit Master subtitle style</a:t>
             </a:r>
           </a:p>
         </p:txBody>
@@ -16629,7 +16444,7 @@
             <a:fld id="{1C2D31DE-C454-491C-B5C3-F097855E3DF7}" type="datetime4">
               <a:rPr lang="en-US" smtClean="0"/>
               <a:pPr/>
-              <a:t>March 26, 2020</a:t>
+              <a:t>September 7, 2022</a:t>
             </a:fld>
             <a:endParaRPr lang="en-US" dirty="0"/>
           </a:p>
@@ -19711,17 +19526,16 @@
           <a:p>
             <a:pPr lvl="0"/>
             <a:r>
-              <a:rPr lang="en-US" dirty="0" smtClean="0"/>
+              <a:rPr lang="en-US" dirty="0"/>
               <a:t>Presenter Name</a:t>
             </a:r>
             <a:br>
-              <a:rPr lang="en-US" dirty="0" smtClean="0"/>
+              <a:rPr lang="en-US" dirty="0"/>
             </a:br>
             <a:r>
-              <a:rPr lang="en-US" dirty="0" smtClean="0"/>
+              <a:rPr lang="en-US" dirty="0"/>
               <a:t>Presenter Title</a:t>
             </a:r>
-            <a:endParaRPr lang="en-US" dirty="0"/>
           </a:p>
         </p:txBody>
       </p:sp>
@@ -19738,13 +19552,6 @@
   <p:transition>
     <p:fade/>
   </p:transition>
-  <p:timing>
-    <p:tnLst>
-      <p:par>
-        <p:cTn id="1" dur="indefinite" restart="never" nodeType="tmRoot"/>
-      </p:par>
-    </p:tnLst>
-  </p:timing>
   <p:hf sldNum="0" hdr="0" ftr="0"/>
 </p:sldLayout>
 </file>
@@ -27254,10 +27061,9 @@
           <a:p>
             <a:pPr lvl="0"/>
             <a:r>
-              <a:rPr lang="en-US" dirty="0" smtClean="0"/>
+              <a:rPr lang="en-US" dirty="0"/>
               <a:t>&lt;Call to action&gt;</a:t>
             </a:r>
-            <a:endParaRPr lang="en-US" dirty="0"/>
           </a:p>
         </p:txBody>
       </p:sp>
@@ -28874,7 +28680,7 @@
           <a:p>
             <a:fld id="{5958763E-B898-436D-883D-03711491D54A}" type="datetimeFigureOut">
               <a:rPr lang="en-US" smtClean="0"/>
-              <a:t>3/26/2020</a:t>
+              <a:t>9/7/2022</a:t>
             </a:fld>
             <a:endParaRPr lang="en-US"/>
           </a:p>
@@ -29001,7 +28807,7 @@
                 <a:spcPct val="0"/>
               </a:spcAft>
             </a:pPr>
-            <a:endParaRPr lang="en-US" sz="2400" dirty="0" err="1" smtClean="0">
+            <a:endParaRPr lang="en-US" sz="2400" dirty="0" err="1">
               <a:gradFill>
                 <a:gsLst>
                   <a:gs pos="0">
@@ -29032,13 +28838,6 @@
   <p:transition>
     <p:fade/>
   </p:transition>
-  <p:timing>
-    <p:tnLst>
-      <p:par>
-        <p:cTn id="1" dur="indefinite" restart="never" nodeType="tmRoot"/>
-      </p:par>
-    </p:tnLst>
-  </p:timing>
 </p:sldLayout>
 </file>
 
@@ -29283,7 +29082,7 @@
           <a:p>
             <a:fld id="{5958763E-B898-436D-883D-03711491D54A}" type="datetimeFigureOut">
               <a:rPr lang="en-US" smtClean="0"/>
-              <a:t>3/26/2020</a:t>
+              <a:t>9/7/2022</a:t>
             </a:fld>
             <a:endParaRPr lang="en-US"/>
           </a:p>
@@ -29356,13 +29155,6 @@
   <p:transition>
     <p:fade/>
   </p:transition>
-  <p:timing>
-    <p:tnLst>
-      <p:par>
-        <p:cTn id="1" dur="indefinite" restart="never" nodeType="tmRoot"/>
-      </p:par>
-    </p:tnLst>
-  </p:timing>
 </p:sldLayout>
 </file>
 
@@ -29584,7 +29376,7 @@
           <a:p>
             <a:fld id="{5958763E-B898-436D-883D-03711491D54A}" type="datetimeFigureOut">
               <a:rPr lang="en-US" smtClean="0"/>
-              <a:t>3/26/2020</a:t>
+              <a:t>9/7/2022</a:t>
             </a:fld>
             <a:endParaRPr lang="en-US"/>
           </a:p>
@@ -29657,13 +29449,6 @@
   <p:transition>
     <p:fade/>
   </p:transition>
-  <p:timing>
-    <p:tnLst>
-      <p:par>
-        <p:cTn id="1" dur="indefinite" restart="never" nodeType="tmRoot"/>
-      </p:par>
-    </p:tnLst>
-  </p:timing>
 </p:sldLayout>
 </file>
 
@@ -29792,7 +29577,7 @@
           <a:p>
             <a:fld id="{5958763E-B898-436D-883D-03711491D54A}" type="datetimeFigureOut">
               <a:rPr lang="en-US" smtClean="0"/>
-              <a:t>3/26/2020</a:t>
+              <a:t>9/7/2022</a:t>
             </a:fld>
             <a:endParaRPr lang="en-US"/>
           </a:p>
@@ -29915,13 +29700,6 @@
   <p:transition>
     <p:fade/>
   </p:transition>
-  <p:timing>
-    <p:tnLst>
-      <p:par>
-        <p:cTn id="1" dur="indefinite" restart="never" nodeType="tmRoot"/>
-      </p:par>
-    </p:tnLst>
-  </p:timing>
 </p:sldLayout>
 </file>
 
@@ -30060,7 +29838,7 @@
           <a:p>
             <a:fld id="{5958763E-B898-436D-883D-03711491D54A}" type="datetimeFigureOut">
               <a:rPr lang="en-US" smtClean="0"/>
-              <a:t>3/26/2020</a:t>
+              <a:t>9/7/2022</a:t>
             </a:fld>
             <a:endParaRPr lang="en-US"/>
           </a:p>
@@ -30187,13 +29965,6 @@
   <p:transition>
     <p:fade/>
   </p:transition>
-  <p:timing>
-    <p:tnLst>
-      <p:par>
-        <p:cTn id="1" dur="indefinite" restart="never" nodeType="tmRoot"/>
-      </p:par>
-    </p:tnLst>
-  </p:timing>
 </p:sldLayout>
 </file>
 
@@ -30355,7 +30126,7 @@
                 <a:spcPct val="0"/>
               </a:spcAft>
             </a:pPr>
-            <a:endParaRPr lang="en-US" sz="2400" dirty="0" err="1" smtClean="0">
+            <a:endParaRPr lang="en-US" sz="2400" dirty="0" err="1">
               <a:gradFill>
                 <a:gsLst>
                   <a:gs pos="0">
@@ -30406,10 +30177,9 @@
           </a:lstStyle>
           <a:p>
             <a:r>
-              <a:rPr lang="en-US" dirty="0" smtClean="0"/>
+              <a:rPr lang="en-US" dirty="0"/>
               <a:t>Type “Agenda”</a:t>
             </a:r>
-            <a:endParaRPr lang="en-US" dirty="0"/>
           </a:p>
         </p:txBody>
       </p:sp>
@@ -30533,24 +30303,23 @@
           <a:p>
             <a:pPr lvl="0"/>
             <a:r>
-              <a:rPr lang="en-US" dirty="0" smtClean="0"/>
+              <a:rPr lang="en-US" dirty="0"/>
               <a:t>Item 1</a:t>
             </a:r>
           </a:p>
           <a:p>
             <a:pPr lvl="0"/>
             <a:r>
-              <a:rPr lang="en-US" dirty="0" smtClean="0"/>
+              <a:rPr lang="en-US" dirty="0"/>
               <a:t>Item 2</a:t>
             </a:r>
           </a:p>
           <a:p>
             <a:pPr lvl="0"/>
             <a:r>
-              <a:rPr lang="en-US" dirty="0" smtClean="0"/>
+              <a:rPr lang="en-US" dirty="0"/>
               <a:t>Item 3</a:t>
             </a:r>
-            <a:endParaRPr lang="en-US" dirty="0"/>
           </a:p>
         </p:txBody>
       </p:sp>
@@ -30577,7 +30346,7 @@
           <a:p>
             <a:fld id="{5958763E-B898-436D-883D-03711491D54A}" type="datetimeFigureOut">
               <a:rPr lang="en-US" smtClean="0"/>
-              <a:t>3/26/2020</a:t>
+              <a:t>9/7/2022</a:t>
             </a:fld>
             <a:endParaRPr lang="en-US"/>
           </a:p>
@@ -30684,13 +30453,6 @@
   <p:transition>
     <p:fade/>
   </p:transition>
-  <p:timing>
-    <p:tnLst>
-      <p:par>
-        <p:cTn id="1" dur="indefinite" restart="never" nodeType="tmRoot"/>
-      </p:par>
-    </p:tnLst>
-  </p:timing>
 </p:sldLayout>
 </file>
 
@@ -30852,7 +30614,7 @@
                 <a:spcPct val="0"/>
               </a:spcAft>
             </a:pPr>
-            <a:endParaRPr lang="en-US" sz="2400" dirty="0" err="1" smtClean="0">
+            <a:endParaRPr lang="en-US" sz="2400" dirty="0" err="1">
               <a:gradFill>
                 <a:gsLst>
                   <a:gs pos="0">
@@ -30905,10 +30667,9 @@
           </a:lstStyle>
           <a:p>
             <a:r>
-              <a:rPr lang="en-US" dirty="0" smtClean="0"/>
+              <a:rPr lang="en-US" dirty="0"/>
               <a:t>Notable Quote</a:t>
             </a:r>
-            <a:endParaRPr lang="en-US" dirty="0"/>
           </a:p>
         </p:txBody>
       </p:sp>
@@ -31035,10 +30796,9 @@
           <a:p>
             <a:pPr lvl="0"/>
             <a:r>
-              <a:rPr lang="en-US" dirty="0" smtClean="0"/>
+              <a:rPr lang="en-US" dirty="0"/>
               <a:t>– Attribution</a:t>
             </a:r>
-            <a:endParaRPr lang="en-US" dirty="0"/>
           </a:p>
         </p:txBody>
       </p:sp>
@@ -31065,7 +30825,7 @@
           <a:p>
             <a:fld id="{5958763E-B898-436D-883D-03711491D54A}" type="datetimeFigureOut">
               <a:rPr lang="en-US" smtClean="0"/>
-              <a:t>3/26/2020</a:t>
+              <a:t>9/7/2022</a:t>
             </a:fld>
             <a:endParaRPr lang="en-US"/>
           </a:p>
@@ -31813,13 +31573,6 @@
   <p:transition>
     <p:fade/>
   </p:transition>
-  <p:timing>
-    <p:tnLst>
-      <p:par>
-        <p:cTn id="1" dur="indefinite" restart="never" nodeType="tmRoot"/>
-      </p:par>
-    </p:tnLst>
-  </p:timing>
 </p:sldLayout>
 </file>
 
@@ -31891,7 +31644,7 @@
           <a:p>
             <a:fld id="{5958763E-B898-436D-883D-03711491D54A}" type="datetimeFigureOut">
               <a:rPr lang="en-US" smtClean="0"/>
-              <a:t>3/26/2020</a:t>
+              <a:t>9/7/2022</a:t>
             </a:fld>
             <a:endParaRPr lang="en-US"/>
           </a:p>
@@ -31964,13 +31717,6 @@
   <p:transition>
     <p:fade/>
   </p:transition>
-  <p:timing>
-    <p:tnLst>
-      <p:par>
-        <p:cTn id="1" dur="indefinite" restart="never" nodeType="tmRoot"/>
-      </p:par>
-    </p:tnLst>
-  </p:timing>
 </p:sldLayout>
 </file>
 
@@ -32099,7 +31845,7 @@
           <a:p>
             <a:fld id="{5958763E-B898-436D-883D-03711491D54A}" type="datetimeFigureOut">
               <a:rPr lang="en-US" smtClean="0"/>
-              <a:t>3/26/2020</a:t>
+              <a:t>9/7/2022</a:t>
             </a:fld>
             <a:endParaRPr lang="en-US"/>
           </a:p>
@@ -32222,13 +31968,6 @@
   <p:transition>
     <p:fade/>
   </p:transition>
-  <p:timing>
-    <p:tnLst>
-      <p:par>
-        <p:cTn id="1" dur="indefinite" restart="never" nodeType="tmRoot"/>
-      </p:par>
-    </p:tnLst>
-  </p:timing>
 </p:sldLayout>
 </file>
 
@@ -32441,7 +32180,7 @@
           <a:p>
             <a:fld id="{5958763E-B898-436D-883D-03711491D54A}" type="datetimeFigureOut">
               <a:rPr lang="en-US" smtClean="0"/>
-              <a:t>3/26/2020</a:t>
+              <a:t>9/7/2022</a:t>
             </a:fld>
             <a:endParaRPr lang="en-US"/>
           </a:p>
@@ -32514,13 +32253,6 @@
   <p:transition>
     <p:fade/>
   </p:transition>
-  <p:timing>
-    <p:tnLst>
-      <p:par>
-        <p:cTn id="1" dur="indefinite" restart="never" nodeType="tmRoot"/>
-      </p:par>
-    </p:tnLst>
-  </p:timing>
 </p:sldLayout>
 </file>
 
@@ -32678,7 +32410,7 @@
           <a:p>
             <a:fld id="{5958763E-B898-436D-883D-03711491D54A}" type="datetimeFigureOut">
               <a:rPr lang="en-US" smtClean="0"/>
-              <a:t>3/26/2020</a:t>
+              <a:t>9/7/2022</a:t>
             </a:fld>
             <a:endParaRPr lang="en-US"/>
           </a:p>
@@ -32751,13 +32483,6 @@
   <p:transition>
     <p:fade/>
   </p:transition>
-  <p:timing>
-    <p:tnLst>
-      <p:par>
-        <p:cTn id="1" dur="indefinite" restart="never" nodeType="tmRoot"/>
-      </p:par>
-    </p:tnLst>
-  </p:timing>
 </p:sldLayout>
 </file>
 
@@ -32929,7 +32654,7 @@
           <a:p>
             <a:fld id="{5958763E-B898-436D-883D-03711491D54A}" type="datetimeFigureOut">
               <a:rPr lang="en-US" smtClean="0"/>
-              <a:t>3/26/2020</a:t>
+              <a:t>9/7/2022</a:t>
             </a:fld>
             <a:endParaRPr lang="en-US"/>
           </a:p>
@@ -33075,13 +32800,6 @@
   <p:transition>
     <p:fade/>
   </p:transition>
-  <p:timing>
-    <p:tnLst>
-      <p:par>
-        <p:cTn id="1" dur="indefinite" restart="never" nodeType="tmRoot"/>
-      </p:par>
-    </p:tnLst>
-  </p:timing>
   <p:txStyles>
     <p:titleStyle>
       <a:lvl1pPr algn="l" defTabSz="914400" rtl="0" eaLnBrk="1" latinLnBrk="0" hangingPunct="1">
@@ -33386,7 +33104,7 @@
       </a:lvl9pPr>
     </p:otherStyle>
   </p:txStyles>
-  <p:extLst mod="1">
+  <p:extLst>
     <p:ext uri="{27BBF7A9-308A-43DC-89C8-2F10F3537804}">
       <p15:sldGuideLst xmlns:p15="http://schemas.microsoft.com/office/powerpoint/2012/main">
         <p15:guide id="1" orient="horz" pos="2160" userDrawn="1">
@@ -33465,10 +33183,9 @@
           <a:lstStyle/>
           <a:p>
             <a:r>
-              <a:rPr lang="en-US" sz="6600" dirty="0" smtClean="0"/>
+              <a:rPr lang="en-US" sz="6600" dirty="0"/>
               <a:t>DOM Manipulation: Updating HTML</a:t>
             </a:r>
-            <a:endParaRPr lang="en-US" sz="6600" dirty="0"/>
           </a:p>
         </p:txBody>
       </p:sp>
@@ -33493,11 +33210,11 @@
           <a:lstStyle/>
           <a:p>
             <a:r>
-              <a:rPr lang="en-US" dirty="0" smtClean="0"/>
+              <a:rPr lang="en-US" dirty="0"/>
               <a:t>Hy-Tech Club: </a:t>
             </a:r>
             <a:r>
-              <a:rPr lang="en-US" smtClean="0"/>
+              <a:rPr lang="en-US"/>
               <a:t>Web 102</a:t>
             </a:r>
             <a:endParaRPr lang="en-US" dirty="0"/>
@@ -36485,13 +36202,6 @@
   <p:transition>
     <p:fade/>
   </p:transition>
-  <p:timing>
-    <p:tnLst>
-      <p:par>
-        <p:cTn id="1" dur="indefinite" restart="never" nodeType="tmRoot"/>
-      </p:par>
-    </p:tnLst>
-  </p:timing>
 </p:sld>
 </file>
 
@@ -36528,10 +36238,9 @@
           <a:lstStyle/>
           <a:p>
             <a:r>
-              <a:rPr lang="en-US" dirty="0" smtClean="0"/>
+              <a:rPr lang="en-US" dirty="0"/>
               <a:t>Review – select this paragraph in JavaScript</a:t>
             </a:r>
-            <a:endParaRPr lang="en-US" dirty="0"/>
           </a:p>
         </p:txBody>
       </p:sp>
@@ -36641,25 +36350,7 @@
                 </a:solidFill>
                 <a:latin typeface="Consolas" panose="020B0609020204030204" pitchFamily="49" charset="0"/>
               </a:rPr>
-              <a:t>"</a:t>
-            </a:r>
-            <a:r>
-              <a:rPr lang="en-US" sz="3600" dirty="0" err="1">
-                <a:solidFill>
-                  <a:srgbClr val="0000FF"/>
-                </a:solidFill>
-                <a:latin typeface="Consolas" panose="020B0609020204030204" pitchFamily="49" charset="0"/>
-              </a:rPr>
-              <a:t>myText</a:t>
-            </a:r>
-            <a:r>
-              <a:rPr lang="en-US" sz="3600" dirty="0">
-                <a:solidFill>
-                  <a:srgbClr val="0000FF"/>
-                </a:solidFill>
-                <a:latin typeface="Consolas" panose="020B0609020204030204" pitchFamily="49" charset="0"/>
-              </a:rPr>
-              <a:t>"</a:t>
+              <a:t>"my-text"</a:t>
             </a:r>
             <a:r>
               <a:rPr lang="en-US" sz="3600" dirty="0">
@@ -36765,13 +36456,13 @@
           <a:lstStyle/>
           <a:p>
             <a:r>
-              <a:rPr lang="en-US" sz="3200" dirty="0" err="1">
+              <a:rPr lang="en-US" sz="3200" dirty="0">
                 <a:solidFill>
                   <a:srgbClr val="0000FF"/>
                 </a:solidFill>
                 <a:latin typeface="Consolas" panose="020B0609020204030204" pitchFamily="49" charset="0"/>
               </a:rPr>
-              <a:t>var</a:t>
+              <a:t>let</a:t>
             </a:r>
             <a:r>
               <a:rPr lang="en-US" sz="3200" dirty="0">
@@ -36783,7 +36474,7 @@
               <a:t> </a:t>
             </a:r>
             <a:r>
-              <a:rPr lang="en-US" sz="3200" dirty="0" err="1" smtClean="0">
+              <a:rPr lang="en-US" sz="3200" dirty="0" err="1">
                 <a:solidFill>
                   <a:srgbClr val="000000"/>
                 </a:solidFill>
@@ -36792,22 +36483,13 @@
               <a:t>myEl</a:t>
             </a:r>
             <a:r>
-              <a:rPr lang="en-US" sz="3200" dirty="0" smtClean="0">
-                <a:solidFill>
-                  <a:srgbClr val="000000"/>
-                </a:solidFill>
-                <a:latin typeface="Consolas" panose="020B0609020204030204" pitchFamily="49" charset="0"/>
-              </a:rPr>
-              <a:t> </a:t>
-            </a:r>
-            <a:r>
               <a:rPr lang="en-US" sz="3200" dirty="0">
                 <a:solidFill>
                   <a:srgbClr val="000000"/>
                 </a:solidFill>
                 <a:latin typeface="Consolas" panose="020B0609020204030204" pitchFamily="49" charset="0"/>
               </a:rPr>
-              <a:t>= </a:t>
+              <a:t> = </a:t>
             </a:r>
             <a:r>
               <a:rPr lang="en-US" sz="3200" dirty="0" err="1">
@@ -36834,25 +36516,7 @@
                 </a:solidFill>
                 <a:latin typeface="Consolas" panose="020B0609020204030204" pitchFamily="49" charset="0"/>
               </a:rPr>
-              <a:t>"#</a:t>
-            </a:r>
-            <a:r>
-              <a:rPr lang="en-US" sz="3200" dirty="0" err="1">
-                <a:solidFill>
-                  <a:srgbClr val="A31515"/>
-                </a:solidFill>
-                <a:latin typeface="Consolas" panose="020B0609020204030204" pitchFamily="49" charset="0"/>
-              </a:rPr>
-              <a:t>myText</a:t>
-            </a:r>
-            <a:r>
-              <a:rPr lang="en-US" sz="3200" dirty="0">
-                <a:solidFill>
-                  <a:srgbClr val="A31515"/>
-                </a:solidFill>
-                <a:latin typeface="Consolas" panose="020B0609020204030204" pitchFamily="49" charset="0"/>
-              </a:rPr>
-              <a:t>"</a:t>
+              <a:t>"#my-text"</a:t>
             </a:r>
             <a:r>
               <a:rPr lang="en-US" sz="3200" dirty="0">
@@ -37028,7 +36692,7 @@
               <a:t>.</a:t>
             </a:r>
             <a:r>
-              <a:rPr lang="en-US" sz="4400" cap="none" dirty="0" err="1" smtClean="0">
+              <a:rPr lang="en-US" sz="4400" cap="none" dirty="0" err="1">
                 <a:solidFill>
                   <a:schemeClr val="accent1">
                     <a:lumMod val="50000"/>
@@ -37060,7 +36724,12 @@
             <p:ph idx="1"/>
           </p:nvPr>
         </p:nvSpPr>
-        <p:spPr/>
+        <p:spPr>
+          <a:xfrm>
+            <a:off x="381000" y="1143000"/>
+            <a:ext cx="11544300" cy="5257800"/>
+          </a:xfrm>
+        </p:spPr>
         <p:txBody>
           <a:bodyPr>
             <a:normAutofit/>
@@ -37071,13 +36740,13 @@
               <a:buNone/>
             </a:pPr>
             <a:r>
-              <a:rPr lang="en-US" sz="3600" dirty="0" err="1">
+              <a:rPr lang="en-US" sz="3600" dirty="0">
                 <a:solidFill>
                   <a:srgbClr val="0000FF"/>
                 </a:solidFill>
                 <a:latin typeface="Consolas" panose="020B0609020204030204" pitchFamily="49" charset="0"/>
               </a:rPr>
-              <a:t>var</a:t>
+              <a:t>let</a:t>
             </a:r>
             <a:r>
               <a:rPr lang="en-US" sz="3600" dirty="0">
@@ -37131,25 +36800,7 @@
                 </a:solidFill>
                 <a:latin typeface="Consolas" panose="020B0609020204030204" pitchFamily="49" charset="0"/>
               </a:rPr>
-              <a:t>"#</a:t>
-            </a:r>
-            <a:r>
-              <a:rPr lang="en-US" sz="3600" dirty="0" err="1">
-                <a:solidFill>
-                  <a:srgbClr val="A31515"/>
-                </a:solidFill>
-                <a:latin typeface="Consolas" panose="020B0609020204030204" pitchFamily="49" charset="0"/>
-              </a:rPr>
-              <a:t>myText</a:t>
-            </a:r>
-            <a:r>
-              <a:rPr lang="en-US" sz="3600" dirty="0">
-                <a:solidFill>
-                  <a:srgbClr val="A31515"/>
-                </a:solidFill>
-                <a:latin typeface="Consolas" panose="020B0609020204030204" pitchFamily="49" charset="0"/>
-              </a:rPr>
-              <a:t>"</a:t>
+              <a:t>"#my-text"</a:t>
             </a:r>
             <a:r>
               <a:rPr lang="en-US" sz="3600" dirty="0">
@@ -37217,26 +36868,25 @@
             <a:pPr marL="57150" indent="0">
               <a:buNone/>
             </a:pPr>
-            <a:endParaRPr lang="en-US" dirty="0" smtClean="0"/>
+            <a:endParaRPr lang="en-US" dirty="0"/>
           </a:p>
           <a:p>
             <a:pPr marL="57150" indent="0">
               <a:buNone/>
             </a:pPr>
-            <a:endParaRPr lang="en-US" dirty="0" smtClean="0"/>
+            <a:endParaRPr lang="en-US" dirty="0"/>
           </a:p>
           <a:p>
             <a:r>
-              <a:rPr lang="en-US" sz="3200" dirty="0" smtClean="0"/>
+              <a:rPr lang="en-US" sz="3200" dirty="0"/>
               <a:t>Sets the value like a variable</a:t>
             </a:r>
           </a:p>
           <a:p>
             <a:r>
-              <a:rPr lang="en-US" sz="3200" dirty="0" smtClean="0"/>
+              <a:rPr lang="en-US" sz="3200" dirty="0"/>
               <a:t>Allows the developer to change the content of the page!</a:t>
             </a:r>
-            <a:endParaRPr lang="en-US" sz="3200" dirty="0"/>
           </a:p>
         </p:txBody>
       </p:sp>
@@ -37303,7 +36953,7 @@
                 <a:spcPct val="0"/>
               </a:spcAft>
             </a:pPr>
-            <a:endParaRPr lang="en-US" sz="2400" dirty="0" err="1" smtClean="0">
+            <a:endParaRPr lang="en-US" sz="2400" dirty="0" err="1">
               <a:gradFill>
                 <a:gsLst>
                   <a:gs pos="0">
@@ -37650,14 +37300,9 @@
           <a:lstStyle/>
           <a:p>
             <a:r>
-              <a:rPr lang="en-US" dirty="0" smtClean="0"/>
-              <a:t>Text content </a:t>
+              <a:rPr lang="en-US" dirty="0"/>
+              <a:t>Text content example</a:t>
             </a:r>
-            <a:r>
-              <a:rPr lang="en-US" dirty="0" smtClean="0"/>
-              <a:t>example</a:t>
-            </a:r>
-            <a:endParaRPr lang="en-US" dirty="0"/>
           </a:p>
         </p:txBody>
       </p:sp>
@@ -37682,12 +37327,12 @@
               <a:buNone/>
             </a:pPr>
             <a:r>
-              <a:rPr lang="en-US" sz="11500" dirty="0">
+              <a:rPr lang="en-US" sz="9600" dirty="0">
                 <a:hlinkClick r:id="rId3"/>
               </a:rPr>
-              <a:t>https://repl.it/repls/HeartfeltSnowPixel</a:t>
+              <a:t>https://replit.com/@HylandOutreach/UpdateTextContent</a:t>
             </a:r>
-            <a:endParaRPr lang="en-US" sz="13800" dirty="0"/>
+            <a:endParaRPr lang="en-US" sz="9600" dirty="0"/>
           </a:p>
         </p:txBody>
       </p:sp>
@@ -37704,13 +37349,6 @@
   <p:transition>
     <p:fade/>
   </p:transition>
-  <p:timing>
-    <p:tnLst>
-      <p:par>
-        <p:cTn id="1" dur="indefinite" restart="never" nodeType="tmRoot"/>
-      </p:par>
-    </p:tnLst>
-  </p:timing>
 </p:sld>
 </file>
 
@@ -37754,7 +37392,7 @@
               </a:spcBef>
             </a:pPr>
             <a:r>
-              <a:rPr lang="en-US" sz="4400" cap="none" dirty="0" err="1" smtClean="0">
+              <a:rPr lang="en-US" sz="4400" cap="none" dirty="0" err="1">
                 <a:solidFill>
                   <a:schemeClr val="accent1">
                     <a:lumMod val="50000"/>
@@ -37797,13 +37435,13 @@
               <a:buNone/>
             </a:pPr>
             <a:r>
-              <a:rPr lang="en-US" sz="3600" dirty="0" err="1">
+              <a:rPr lang="en-US" sz="3600" dirty="0">
                 <a:solidFill>
                   <a:srgbClr val="0000FF"/>
                 </a:solidFill>
                 <a:latin typeface="Consolas" panose="020B0609020204030204" pitchFamily="49" charset="0"/>
               </a:rPr>
-              <a:t>var</a:t>
+              <a:t>let</a:t>
             </a:r>
             <a:r>
               <a:rPr lang="en-US" sz="3600" dirty="0">
@@ -37898,19 +37536,10 @@
                 </a:solidFill>
                 <a:latin typeface="Consolas" panose="020B0609020204030204" pitchFamily="49" charset="0"/>
               </a:rPr>
-              <a:t>"New paragraph</a:t>
+              <a:t>"New paragraph!"</a:t>
             </a:r>
             <a:r>
-              <a:rPr lang="en-US" sz="3600" dirty="0" smtClean="0">
-                <a:solidFill>
-                  <a:srgbClr val="A31515"/>
-                </a:solidFill>
-                <a:latin typeface="Consolas" panose="020B0609020204030204" pitchFamily="49" charset="0"/>
-              </a:rPr>
-              <a:t>!"</a:t>
-            </a:r>
-            <a:r>
-              <a:rPr lang="en-US" sz="3600" dirty="0" smtClean="0">
+              <a:rPr lang="en-US" sz="3600" dirty="0">
                 <a:solidFill>
                   <a:srgbClr val="000000"/>
                 </a:solidFill>
@@ -37937,7 +37566,7 @@
               </a:buClr>
             </a:pPr>
             <a:r>
-              <a:rPr lang="en-US" sz="3200" dirty="0" smtClean="0">
+              <a:rPr lang="en-US" sz="3200" dirty="0">
                 <a:solidFill>
                   <a:srgbClr val="56565A"/>
                 </a:solidFill>
@@ -37952,7 +37581,7 @@
               </a:buClr>
             </a:pPr>
             <a:r>
-              <a:rPr lang="en-US" sz="2800" dirty="0" smtClean="0">
+              <a:rPr lang="en-US" sz="2800" dirty="0">
                 <a:solidFill>
                   <a:srgbClr val="56565A"/>
                 </a:solidFill>
@@ -37967,7 +37596,7 @@
               </a:buClr>
             </a:pPr>
             <a:r>
-              <a:rPr lang="en-US" sz="3200" dirty="0" smtClean="0">
+              <a:rPr lang="en-US" sz="3200" dirty="0">
                 <a:solidFill>
                   <a:srgbClr val="56565A"/>
                 </a:solidFill>
@@ -37975,7 +37604,7 @@
               <a:t>Uses </a:t>
             </a:r>
             <a:r>
-              <a:rPr lang="en-US" sz="3600" b="1" dirty="0" smtClean="0">
+              <a:rPr lang="en-US" sz="3600" b="1" dirty="0">
                 <a:solidFill>
                   <a:schemeClr val="accent1">
                     <a:lumMod val="50000"/>
@@ -37986,7 +37615,7 @@
               <a:t>.</a:t>
             </a:r>
             <a:r>
-              <a:rPr lang="en-US" sz="3600" b="1" dirty="0" err="1" smtClean="0">
+              <a:rPr lang="en-US" sz="3600" b="1" dirty="0" err="1">
                 <a:solidFill>
                   <a:schemeClr val="accent1">
                     <a:lumMod val="50000"/>
@@ -37997,7 +37626,7 @@
               <a:t>textContent</a:t>
             </a:r>
             <a:r>
-              <a:rPr lang="en-US" sz="3200" dirty="0" smtClean="0">
+              <a:rPr lang="en-US" sz="3200" dirty="0">
                 <a:solidFill>
                   <a:srgbClr val="56565A"/>
                 </a:solidFill>
@@ -38012,7 +37641,7 @@
               </a:buClr>
               <a:buNone/>
             </a:pPr>
-            <a:endParaRPr lang="en-US" sz="3600" dirty="0" smtClean="0">
+            <a:endParaRPr lang="en-US" sz="3600" dirty="0">
               <a:solidFill>
                 <a:srgbClr val="000000"/>
               </a:solidFill>
@@ -38048,16 +37677,7 @@
                 </a:solidFill>
                 <a:latin typeface="Consolas" panose="020B0609020204030204" pitchFamily="49" charset="0"/>
               </a:rPr>
-              <a:t>&lt;/p</a:t>
-            </a:r>
-            <a:r>
-              <a:rPr lang="en-US" sz="4400" dirty="0" smtClean="0">
-                <a:solidFill>
-                  <a:srgbClr val="800000"/>
-                </a:solidFill>
-                <a:latin typeface="Consolas" panose="020B0609020204030204" pitchFamily="49" charset="0"/>
-              </a:rPr>
-              <a:t>&gt;</a:t>
+              <a:t>&lt;/p&gt;</a:t>
             </a:r>
             <a:endParaRPr lang="en-US" sz="4400" dirty="0">
               <a:solidFill>
@@ -38513,10 +38133,9 @@
           <a:lstStyle/>
           <a:p>
             <a:r>
-              <a:rPr lang="en-US" dirty="0" smtClean="0"/>
+              <a:rPr lang="en-US" dirty="0"/>
               <a:t>Where does the new element go?</a:t>
             </a:r>
-            <a:endParaRPr lang="en-US" dirty="0"/>
           </a:p>
         </p:txBody>
       </p:sp>
@@ -38539,32 +38158,32 @@
               <a:buNone/>
             </a:pPr>
             <a:r>
-              <a:rPr lang="en-US" i="1" dirty="0" smtClean="0"/>
+              <a:rPr lang="en-US" i="1" dirty="0"/>
               <a:t>Nowhere!</a:t>
             </a:r>
-            <a:endParaRPr lang="en-US" dirty="0" smtClean="0"/>
+            <a:endParaRPr lang="en-US" dirty="0"/>
           </a:p>
           <a:p>
             <a:r>
-              <a:rPr lang="en-US" dirty="0" smtClean="0"/>
+              <a:rPr lang="en-US" dirty="0"/>
               <a:t>Before the element appears, it must be </a:t>
             </a:r>
             <a:r>
-              <a:rPr lang="en-US" i="1" dirty="0" smtClean="0"/>
+              <a:rPr lang="en-US" i="1" dirty="0"/>
               <a:t>appended</a:t>
             </a:r>
             <a:r>
-              <a:rPr lang="en-US" dirty="0" smtClean="0"/>
+              <a:rPr lang="en-US" dirty="0"/>
               <a:t> to the document</a:t>
             </a:r>
           </a:p>
           <a:p>
             <a:r>
-              <a:rPr lang="en-US" dirty="0" smtClean="0"/>
+              <a:rPr lang="en-US" dirty="0"/>
               <a:t>Use </a:t>
             </a:r>
             <a:r>
-              <a:rPr lang="en-US" b="1" dirty="0" smtClean="0">
+              <a:rPr lang="en-US" b="1" dirty="0">
                 <a:solidFill>
                   <a:schemeClr val="accent1">
                     <a:lumMod val="50000"/>
@@ -38575,7 +38194,7 @@
               <a:t>.</a:t>
             </a:r>
             <a:r>
-              <a:rPr lang="en-US" b="1" dirty="0" err="1" smtClean="0">
+              <a:rPr lang="en-US" b="1" dirty="0" err="1">
                 <a:solidFill>
                   <a:schemeClr val="accent1">
                     <a:lumMod val="50000"/>
@@ -38586,27 +38205,27 @@
               <a:t>appendChild</a:t>
             </a:r>
             <a:r>
-              <a:rPr lang="en-US" dirty="0" smtClean="0"/>
+              <a:rPr lang="en-US" dirty="0"/>
               <a:t> to add the element as a child of </a:t>
             </a:r>
             <a:r>
-              <a:rPr lang="en-US" i="1" dirty="0" smtClean="0"/>
+              <a:rPr lang="en-US" i="1" dirty="0"/>
               <a:t>another</a:t>
             </a:r>
             <a:r>
-              <a:rPr lang="en-US" dirty="0" smtClean="0"/>
+              <a:rPr lang="en-US" dirty="0"/>
               <a:t> element</a:t>
             </a:r>
           </a:p>
           <a:p>
-            <a:endParaRPr lang="en-US" dirty="0" smtClean="0"/>
+            <a:endParaRPr lang="en-US" dirty="0"/>
           </a:p>
           <a:p>
             <a:pPr marL="57150" indent="0">
               <a:buNone/>
             </a:pPr>
             <a:r>
-              <a:rPr lang="en-US" b="1" dirty="0" smtClean="0"/>
+              <a:rPr lang="en-US" b="1" dirty="0"/>
               <a:t>HTML:</a:t>
             </a:r>
           </a:p>
@@ -38615,7 +38234,7 @@
               <a:buNone/>
             </a:pPr>
             <a:r>
-              <a:rPr lang="en-US" sz="2800" dirty="0" smtClean="0">
+              <a:rPr lang="en-US" sz="2800" dirty="0">
                 <a:solidFill>
                   <a:srgbClr val="800000"/>
                 </a:solidFill>
@@ -38624,7 +38243,7 @@
               <a:t>&lt;div</a:t>
             </a:r>
             <a:r>
-              <a:rPr lang="en-US" sz="2800" dirty="0" smtClean="0">
+              <a:rPr lang="en-US" sz="2800" dirty="0">
                 <a:solidFill>
                   <a:srgbClr val="000000"/>
                 </a:solidFill>
@@ -38666,16 +38285,7 @@
                 </a:solidFill>
                 <a:latin typeface="Consolas" panose="020B0609020204030204" pitchFamily="49" charset="0"/>
               </a:rPr>
-              <a:t>&gt;&lt;/div</a:t>
-            </a:r>
-            <a:r>
-              <a:rPr lang="en-US" sz="2800" dirty="0" smtClean="0">
-                <a:solidFill>
-                  <a:srgbClr val="800000"/>
-                </a:solidFill>
-                <a:latin typeface="Consolas" panose="020B0609020204030204" pitchFamily="49" charset="0"/>
-              </a:rPr>
-              <a:t>&gt;</a:t>
+              <a:t>&gt;&lt;/div&gt;</a:t>
             </a:r>
           </a:p>
           <a:p>
@@ -38683,7 +38293,7 @@
               <a:buNone/>
             </a:pPr>
             <a:r>
-              <a:rPr lang="en-US" b="1" dirty="0" smtClean="0"/>
+              <a:rPr lang="en-US" b="1" dirty="0"/>
               <a:t>JS:</a:t>
             </a:r>
             <a:endParaRPr lang="en-US" dirty="0">
@@ -38698,16 +38308,16 @@
               <a:buNone/>
             </a:pPr>
             <a:r>
-              <a:rPr lang="en-US" sz="2800" dirty="0" err="1" smtClean="0">
+              <a:rPr lang="en-US" sz="2800" dirty="0">
                 <a:solidFill>
                   <a:srgbClr val="0000FF"/>
                 </a:solidFill>
                 <a:latin typeface="Consolas" panose="020B0609020204030204" pitchFamily="49" charset="0"/>
               </a:rPr>
-              <a:t>var</a:t>
+              <a:t>let</a:t>
             </a:r>
             <a:r>
-              <a:rPr lang="en-US" sz="2800" dirty="0" smtClean="0">
+              <a:rPr lang="en-US" sz="2800" dirty="0">
                 <a:solidFill>
                   <a:srgbClr val="000000"/>
                 </a:solidFill>
@@ -38775,7 +38385,7 @@
               <a:buNone/>
             </a:pPr>
             <a:r>
-              <a:rPr lang="en-US" sz="2800" dirty="0" err="1" smtClean="0">
+              <a:rPr lang="en-US" sz="2800" dirty="0" err="1">
                 <a:solidFill>
                   <a:srgbClr val="000000"/>
                 </a:solidFill>
@@ -38784,7 +38394,7 @@
               <a:t>myDiv.appendChild</a:t>
             </a:r>
             <a:r>
-              <a:rPr lang="en-US" sz="2800" dirty="0" smtClean="0">
+              <a:rPr lang="en-US" sz="2800" dirty="0">
                 <a:solidFill>
                   <a:srgbClr val="000000"/>
                 </a:solidFill>
@@ -38793,7 +38403,7 @@
               <a:t>(</a:t>
             </a:r>
             <a:r>
-              <a:rPr lang="en-US" sz="2800" dirty="0" err="1" smtClean="0">
+              <a:rPr lang="en-US" sz="2800" dirty="0" err="1">
                 <a:solidFill>
                   <a:srgbClr val="000000"/>
                 </a:solidFill>
@@ -38802,7 +38412,7 @@
               <a:t>myPara</a:t>
             </a:r>
             <a:r>
-              <a:rPr lang="en-US" sz="2800" dirty="0" smtClean="0">
+              <a:rPr lang="en-US" sz="2800" dirty="0">
                 <a:solidFill>
                   <a:srgbClr val="000000"/>
                 </a:solidFill>
@@ -39473,10 +39083,9 @@
           <a:lstStyle/>
           <a:p>
             <a:r>
-              <a:rPr lang="en-US" dirty="0" smtClean="0"/>
+              <a:rPr lang="en-US" dirty="0"/>
               <a:t>Breaking down the statement</a:t>
             </a:r>
-            <a:endParaRPr lang="en-US" dirty="0"/>
           </a:p>
         </p:txBody>
       </p:sp>
@@ -39501,7 +39110,7 @@
               <a:buNone/>
             </a:pPr>
             <a:r>
-              <a:rPr lang="en-US" sz="5400" dirty="0" err="1" smtClean="0">
+              <a:rPr lang="en-US" sz="5400" dirty="0" err="1">
                 <a:solidFill>
                   <a:srgbClr val="000000"/>
                 </a:solidFill>
@@ -39510,7 +39119,7 @@
               <a:t>myDiv.appendChild</a:t>
             </a:r>
             <a:r>
-              <a:rPr lang="en-US" sz="5400" dirty="0" smtClean="0">
+              <a:rPr lang="en-US" sz="5400" dirty="0">
                 <a:solidFill>
                   <a:srgbClr val="000000"/>
                 </a:solidFill>
@@ -39519,7 +39128,7 @@
               <a:t>(</a:t>
             </a:r>
             <a:r>
-              <a:rPr lang="en-US" sz="5400" dirty="0" err="1" smtClean="0">
+              <a:rPr lang="en-US" sz="5400" dirty="0" err="1">
                 <a:solidFill>
                   <a:srgbClr val="000000"/>
                 </a:solidFill>
@@ -39528,7 +39137,7 @@
               <a:t>myPara</a:t>
             </a:r>
             <a:r>
-              <a:rPr lang="en-US" sz="5400" dirty="0" smtClean="0">
+              <a:rPr lang="en-US" sz="5400" dirty="0">
                 <a:solidFill>
                   <a:srgbClr val="000000"/>
                 </a:solidFill>
@@ -39536,7 +39145,12 @@
               </a:rPr>
               <a:t>);</a:t>
             </a:r>
-            <a:endParaRPr lang="en-US" sz="5400" dirty="0">
+          </a:p>
+          <a:p>
+            <a:pPr marL="0" indent="0">
+              <a:buNone/>
+            </a:pPr>
+            <a:endParaRPr lang="en-US" sz="4400" dirty="0">
               <a:solidFill>
                 <a:srgbClr val="000000"/>
               </a:solidFill>
@@ -39547,7 +39161,7 @@
             <a:pPr marL="0" indent="0">
               <a:buNone/>
             </a:pPr>
-            <a:endParaRPr lang="en-US" sz="4400" dirty="0" smtClean="0">
+            <a:endParaRPr lang="en-US" sz="4400" dirty="0">
               <a:solidFill>
                 <a:srgbClr val="000000"/>
               </a:solidFill>
@@ -39558,18 +39172,7 @@
             <a:pPr marL="0" indent="0">
               <a:buNone/>
             </a:pPr>
-            <a:endParaRPr lang="en-US" sz="4400" dirty="0" smtClean="0">
-              <a:solidFill>
-                <a:srgbClr val="000000"/>
-              </a:solidFill>
-              <a:latin typeface="Consolas" panose="020B0609020204030204" pitchFamily="49" charset="0"/>
-            </a:endParaRPr>
-          </a:p>
-          <a:p>
-            <a:pPr marL="0" indent="0">
-              <a:buNone/>
-            </a:pPr>
-            <a:endParaRPr lang="en-US" dirty="0" smtClean="0"/>
+            <a:endParaRPr lang="en-US" dirty="0"/>
           </a:p>
         </p:txBody>
       </p:sp>
@@ -39685,7 +39288,7 @@
               <a:defRPr/>
             </a:pPr>
             <a:r>
-              <a:rPr kumimoji="0" lang="en-US" sz="4000" b="1" i="0" u="none" strike="noStrike" kern="1200" cap="none" spc="0" normalizeH="0" baseline="0" noProof="0" dirty="0" err="1" smtClean="0">
+              <a:rPr kumimoji="0" lang="en-US" sz="4000" b="1" i="0" u="none" strike="noStrike" kern="1200" cap="none" spc="0" normalizeH="0" baseline="0" noProof="0" dirty="0" err="1">
                 <a:ln>
                   <a:noFill/>
                 </a:ln>
@@ -39702,7 +39305,7 @@
               <a:t>myDiv</a:t>
             </a:r>
             <a:r>
-              <a:rPr kumimoji="0" lang="en-US" sz="4000" b="0" i="0" u="none" strike="noStrike" kern="1200" cap="none" spc="0" normalizeH="0" baseline="0" noProof="0" dirty="0" smtClean="0">
+              <a:rPr kumimoji="0" lang="en-US" sz="4000" b="0" i="0" u="none" strike="noStrike" kern="1200" cap="none" spc="0" normalizeH="0" baseline="0" noProof="0" dirty="0">
                 <a:ln>
                   <a:noFill/>
                 </a:ln>
@@ -39719,7 +39322,7 @@
               <a:t>: </a:t>
             </a:r>
             <a:r>
-              <a:rPr kumimoji="0" lang="en-US" sz="4000" b="0" i="1" u="none" strike="noStrike" kern="1200" cap="none" spc="0" normalizeH="0" baseline="0" noProof="0" dirty="0" smtClean="0">
+              <a:rPr kumimoji="0" lang="en-US" sz="4000" b="0" i="1" u="none" strike="noStrike" kern="1200" cap="none" spc="0" normalizeH="0" baseline="0" noProof="0" dirty="0">
                 <a:ln>
                   <a:noFill/>
                 </a:ln>
@@ -39736,7 +39339,7 @@
               <a:t>variable</a:t>
             </a:r>
             <a:r>
-              <a:rPr kumimoji="0" lang="en-US" sz="4000" b="0" i="0" u="none" strike="noStrike" kern="1200" cap="none" spc="0" normalizeH="0" baseline="0" noProof="0" dirty="0" smtClean="0">
+              <a:rPr kumimoji="0" lang="en-US" sz="4000" b="0" i="0" u="none" strike="noStrike" kern="1200" cap="none" spc="0" normalizeH="0" baseline="0" noProof="0" dirty="0">
                 <a:ln>
                   <a:noFill/>
                 </a:ln>
@@ -39941,7 +39544,7 @@
               <a:defRPr/>
             </a:pPr>
             <a:r>
-              <a:rPr kumimoji="0" lang="en-US" sz="4000" b="1" i="0" u="none" strike="noStrike" kern="1200" cap="none" spc="0" normalizeH="0" baseline="0" noProof="0" dirty="0" smtClean="0">
+              <a:rPr kumimoji="0" lang="en-US" sz="4000" b="1" i="0" u="none" strike="noStrike" kern="1200" cap="none" spc="0" normalizeH="0" baseline="0" noProof="0" dirty="0">
                 <a:ln>
                   <a:noFill/>
                 </a:ln>
@@ -39958,7 +39561,7 @@
               <a:t>.</a:t>
             </a:r>
             <a:r>
-              <a:rPr kumimoji="0" lang="en-US" sz="4000" b="1" i="0" u="none" strike="noStrike" kern="1200" cap="none" spc="0" normalizeH="0" baseline="0" noProof="0" dirty="0" err="1" smtClean="0">
+              <a:rPr kumimoji="0" lang="en-US" sz="4000" b="1" i="0" u="none" strike="noStrike" kern="1200" cap="none" spc="0" normalizeH="0" baseline="0" noProof="0" dirty="0" err="1">
                 <a:ln>
                   <a:noFill/>
                 </a:ln>
@@ -39975,7 +39578,7 @@
               <a:t>appendChild</a:t>
             </a:r>
             <a:r>
-              <a:rPr kumimoji="0" lang="en-US" sz="4000" b="0" i="0" u="none" strike="noStrike" kern="1200" cap="none" spc="0" normalizeH="0" baseline="0" noProof="0" dirty="0" smtClean="0">
+              <a:rPr kumimoji="0" lang="en-US" sz="4000" b="0" i="0" u="none" strike="noStrike" kern="1200" cap="none" spc="0" normalizeH="0" baseline="0" noProof="0" dirty="0">
                 <a:ln>
                   <a:noFill/>
                 </a:ln>
@@ -39992,7 +39595,7 @@
               <a:t>: </a:t>
             </a:r>
             <a:r>
-              <a:rPr kumimoji="0" lang="en-US" sz="4000" b="0" i="1" u="none" strike="noStrike" kern="1200" cap="none" spc="0" normalizeH="0" baseline="0" noProof="0" dirty="0" smtClean="0">
+              <a:rPr kumimoji="0" lang="en-US" sz="4000" b="0" i="1" u="none" strike="noStrike" kern="1200" cap="none" spc="0" normalizeH="0" baseline="0" noProof="0" dirty="0">
                 <a:ln>
                   <a:noFill/>
                 </a:ln>
@@ -40009,7 +39612,7 @@
               <a:t>function</a:t>
             </a:r>
             <a:r>
-              <a:rPr kumimoji="0" lang="en-US" sz="4000" b="0" i="0" u="none" strike="noStrike" kern="1200" cap="none" spc="0" normalizeH="0" baseline="0" noProof="0" dirty="0" smtClean="0">
+              <a:rPr kumimoji="0" lang="en-US" sz="4000" b="0" i="0" u="none" strike="noStrike" kern="1200" cap="none" spc="0" normalizeH="0" baseline="0" noProof="0" dirty="0">
                 <a:ln>
                   <a:noFill/>
                 </a:ln>
@@ -40026,7 +39629,7 @@
               <a:t> that adds </a:t>
             </a:r>
             <a:r>
-              <a:rPr kumimoji="0" lang="en-US" sz="4000" b="0" i="0" u="none" strike="noStrike" kern="1200" cap="none" spc="0" normalizeH="0" baseline="0" noProof="0" dirty="0" err="1" smtClean="0">
+              <a:rPr kumimoji="0" lang="en-US" sz="4000" b="0" i="0" u="none" strike="noStrike" kern="1200" cap="none" spc="0" normalizeH="0" baseline="0" noProof="0" dirty="0" err="1">
                 <a:ln>
                   <a:noFill/>
                 </a:ln>
@@ -40043,7 +39646,7 @@
               <a:t>myPara</a:t>
             </a:r>
             <a:r>
-              <a:rPr kumimoji="0" lang="en-US" sz="4000" b="0" i="0" u="none" strike="noStrike" kern="1200" cap="none" spc="0" normalizeH="0" baseline="0" noProof="0" dirty="0" smtClean="0">
+              <a:rPr kumimoji="0" lang="en-US" sz="4000" b="0" i="0" u="none" strike="noStrike" kern="1200" cap="none" spc="0" normalizeH="0" baseline="0" noProof="0" dirty="0">
                 <a:ln>
                   <a:noFill/>
                 </a:ln>
@@ -40060,7 +39663,7 @@
               <a:t> to the page as a child of </a:t>
             </a:r>
             <a:r>
-              <a:rPr kumimoji="0" lang="en-US" sz="4000" b="0" i="0" u="none" strike="noStrike" kern="1200" cap="none" spc="0" normalizeH="0" baseline="0" noProof="0" dirty="0" err="1" smtClean="0">
+              <a:rPr kumimoji="0" lang="en-US" sz="4000" b="0" i="0" u="none" strike="noStrike" kern="1200" cap="none" spc="0" normalizeH="0" baseline="0" noProof="0" dirty="0" err="1">
                 <a:ln>
                   <a:noFill/>
                 </a:ln>
@@ -40210,7 +39813,7 @@
               <a:defRPr/>
             </a:pPr>
             <a:r>
-              <a:rPr kumimoji="0" lang="en-US" sz="4000" b="1" i="0" u="none" strike="noStrike" kern="1200" cap="none" spc="0" normalizeH="0" baseline="0" noProof="0" dirty="0" err="1" smtClean="0">
+              <a:rPr kumimoji="0" lang="en-US" sz="4000" b="1" i="0" u="none" strike="noStrike" kern="1200" cap="none" spc="0" normalizeH="0" baseline="0" noProof="0" dirty="0" err="1">
                 <a:ln>
                   <a:noFill/>
                 </a:ln>
@@ -40227,7 +39830,7 @@
               <a:t>myPara</a:t>
             </a:r>
             <a:r>
-              <a:rPr kumimoji="0" lang="en-US" sz="4000" b="0" i="0" u="none" strike="noStrike" kern="1200" cap="none" spc="0" normalizeH="0" baseline="0" noProof="0" dirty="0" smtClean="0">
+              <a:rPr kumimoji="0" lang="en-US" sz="4000" b="0" i="0" u="none" strike="noStrike" kern="1200" cap="none" spc="0" normalizeH="0" baseline="0" noProof="0" dirty="0">
                 <a:ln>
                   <a:noFill/>
                 </a:ln>
@@ -40244,7 +39847,7 @@
               <a:t>: </a:t>
             </a:r>
             <a:r>
-              <a:rPr kumimoji="0" lang="en-US" sz="4000" b="0" i="1" u="none" strike="noStrike" kern="1200" cap="none" spc="0" normalizeH="0" baseline="0" noProof="0" dirty="0" smtClean="0">
+              <a:rPr kumimoji="0" lang="en-US" sz="4000" b="0" i="1" u="none" strike="noStrike" kern="1200" cap="none" spc="0" normalizeH="0" baseline="0" noProof="0" dirty="0">
                 <a:ln>
                   <a:noFill/>
                 </a:ln>
@@ -40261,7 +39864,7 @@
               <a:t>variable</a:t>
             </a:r>
             <a:r>
-              <a:rPr kumimoji="0" lang="en-US" sz="4000" b="0" i="0" u="none" strike="noStrike" kern="1200" cap="none" spc="0" normalizeH="0" baseline="0" noProof="0" dirty="0" smtClean="0">
+              <a:rPr kumimoji="0" lang="en-US" sz="4000" b="0" i="0" u="none" strike="noStrike" kern="1200" cap="none" spc="0" normalizeH="0" baseline="0" noProof="0" dirty="0">
                 <a:ln>
                   <a:noFill/>
                 </a:ln>
@@ -40277,20 +39880,6 @@
               </a:rPr>
               <a:t> containing a new child element</a:t>
             </a:r>
-            <a:endParaRPr kumimoji="0" lang="en-US" sz="4000" b="0" i="0" u="none" strike="noStrike" kern="1200" cap="none" spc="0" normalizeH="0" baseline="0" noProof="0" dirty="0">
-              <a:ln>
-                <a:noFill/>
-              </a:ln>
-              <a:solidFill>
-                <a:srgbClr val="FF7900"/>
-              </a:solidFill>
-              <a:effectLst/>
-              <a:uLnTx/>
-              <a:uFillTx/>
-              <a:latin typeface="Calibri" panose="020F0502020204030204"/>
-              <a:ea typeface="+mn-ea"/>
-              <a:cs typeface="+mn-cs"/>
-            </a:endParaRPr>
           </a:p>
         </p:txBody>
       </p:sp>
@@ -40957,10 +40546,9 @@
           <a:lstStyle/>
           <a:p>
             <a:r>
-              <a:rPr lang="en-US" dirty="0" smtClean="0"/>
+              <a:rPr lang="en-US" dirty="0"/>
               <a:t>Append child example</a:t>
             </a:r>
-            <a:endParaRPr lang="en-US" dirty="0"/>
           </a:p>
         </p:txBody>
       </p:sp>
@@ -40985,12 +40573,12 @@
               <a:buNone/>
             </a:pPr>
             <a:r>
-              <a:rPr lang="en-US" sz="11500" dirty="0">
+              <a:rPr lang="en-US" sz="9600" dirty="0">
                 <a:hlinkClick r:id="rId3"/>
               </a:rPr>
-              <a:t>https://repl.it/repls/IncompatibleGoodMonitors</a:t>
+              <a:t>https://replit.com/@HylandOutreach/CreateTextContent</a:t>
             </a:r>
-            <a:endParaRPr lang="en-US" sz="16600" dirty="0"/>
+            <a:endParaRPr lang="en-US" sz="9600" dirty="0"/>
           </a:p>
         </p:txBody>
       </p:sp>
@@ -41007,13 +40595,67 @@
   <p:transition>
     <p:fade/>
   </p:transition>
-  <p:timing>
-    <p:tnLst>
-      <p:par>
-        <p:cTn id="1" dur="indefinite" restart="never" nodeType="tmRoot"/>
-      </p:par>
-    </p:tnLst>
-  </p:timing>
+</p:sld>
+</file>
+
+<file path=ppt/slides/slide9.xml><?xml version="1.0" encoding="utf-8"?>
+<p:sld xmlns:a="http://schemas.openxmlformats.org/drawingml/2006/main" xmlns:r="http://schemas.openxmlformats.org/officeDocument/2006/relationships" xmlns:p="http://schemas.openxmlformats.org/presentationml/2006/main">
+  <p:cSld>
+    <p:spTree>
+      <p:nvGrpSpPr>
+        <p:cNvPr id="1" name=""/>
+        <p:cNvGrpSpPr/>
+        <p:nvPr/>
+      </p:nvGrpSpPr>
+      <p:grpSpPr>
+        <a:xfrm>
+          <a:off x="0" y="0"/>
+          <a:ext cx="0" cy="0"/>
+          <a:chOff x="0" y="0"/>
+          <a:chExt cx="0" cy="0"/>
+        </a:xfrm>
+      </p:grpSpPr>
+      <p:sp>
+        <p:nvSpPr>
+          <p:cNvPr id="2" name="Text Placeholder 1">
+            <a:extLst>
+              <a:ext uri="{FF2B5EF4-FFF2-40B4-BE49-F238E27FC236}">
+                <a16:creationId xmlns:a16="http://schemas.microsoft.com/office/drawing/2014/main" id="{85CBF4D0-D013-46D0-B59F-9567A62ADA9A}"/>
+              </a:ext>
+            </a:extLst>
+          </p:cNvPr>
+          <p:cNvSpPr>
+            <a:spLocks noGrp="1"/>
+          </p:cNvSpPr>
+          <p:nvPr>
+            <p:ph type="body" sz="quarter" idx="10"/>
+          </p:nvPr>
+        </p:nvSpPr>
+        <p:spPr/>
+        <p:txBody>
+          <a:bodyPr/>
+          <a:lstStyle/>
+          <a:p>
+            <a:r>
+              <a:rPr lang="en-US" dirty="0"/>
+              <a:t>Questions?</a:t>
+            </a:r>
+          </a:p>
+        </p:txBody>
+      </p:sp>
+    </p:spTree>
+    <p:extLst>
+      <p:ext uri="{BB962C8B-B14F-4D97-AF65-F5344CB8AC3E}">
+        <p14:creationId xmlns:p14="http://schemas.microsoft.com/office/powerpoint/2010/main" val="1653481131"/>
+      </p:ext>
+    </p:extLst>
+  </p:cSld>
+  <p:clrMapOvr>
+    <a:masterClrMapping/>
+  </p:clrMapOvr>
+  <p:transition>
+    <p:fade/>
+  </p:transition>
 </p:sld>
 </file>
 

</xml_diff>

<commit_message>
Update gitbook 2022-09-07 15:29:16
</commit_message>
<xml_diff>
--- a/Week07/DomManipulationContinued.pptx
+++ b/Week07/DomManipulationContinued.pptx
@@ -5,7 +5,7 @@
     <p:sldMasterId id="2147483648" r:id="rId1"/>
   </p:sldMasterIdLst>
   <p:notesMasterIdLst>
-    <p:notesMasterId r:id="rId10"/>
+    <p:notesMasterId r:id="rId11"/>
   </p:notesMasterIdLst>
   <p:sldIdLst>
     <p:sldId id="258" r:id="rId2"/>
@@ -16,6 +16,7 @@
     <p:sldId id="313" r:id="rId7"/>
     <p:sldId id="314" r:id="rId8"/>
     <p:sldId id="315" r:id="rId9"/>
+    <p:sldId id="316" r:id="rId10"/>
   </p:sldIdLst>
   <p:sldSz cx="12192000" cy="6858000"/>
   <p:notesSz cx="6858000" cy="9144000"/>
@@ -215,7 +216,7 @@
           <a:p>
             <a:fld id="{19104133-B5B0-4351-8158-4F0E5EB1E2BF}" type="datetimeFigureOut">
               <a:rPr lang="en-US" smtClean="0"/>
-              <a:t>3/26/2020</a:t>
+              <a:t>9/7/2022</a:t>
             </a:fld>
             <a:endParaRPr lang="en-US"/>
           </a:p>
@@ -279,38 +280,37 @@
           <a:p>
             <a:pPr lvl="0"/>
             <a:r>
-              <a:rPr lang="en-US" smtClean="0"/>
+              <a:rPr lang="en-US"/>
               <a:t>Edit Master text styles</a:t>
             </a:r>
           </a:p>
           <a:p>
             <a:pPr lvl="1"/>
             <a:r>
-              <a:rPr lang="en-US" smtClean="0"/>
+              <a:rPr lang="en-US"/>
               <a:t>Second level</a:t>
             </a:r>
           </a:p>
           <a:p>
             <a:pPr lvl="2"/>
             <a:r>
-              <a:rPr lang="en-US" smtClean="0"/>
+              <a:rPr lang="en-US"/>
               <a:t>Third level</a:t>
             </a:r>
           </a:p>
           <a:p>
             <a:pPr lvl="3"/>
             <a:r>
-              <a:rPr lang="en-US" smtClean="0"/>
+              <a:rPr lang="en-US"/>
               <a:t>Fourth level</a:t>
             </a:r>
           </a:p>
           <a:p>
             <a:pPr lvl="4"/>
             <a:r>
-              <a:rPr lang="en-US" smtClean="0"/>
+              <a:rPr lang="en-US"/>
               <a:t>Fifth level</a:t>
             </a:r>
-            <a:endParaRPr lang="en-US"/>
           </a:p>
         </p:txBody>
       </p:sp>
@@ -528,11 +528,11 @@
           <a:lstStyle/>
           <a:p>
             <a:r>
-              <a:rPr lang="en-US" dirty="0" smtClean="0"/>
+              <a:rPr lang="en-US" dirty="0"/>
               <a:t>Ask a student to come up to the whiteboard</a:t>
             </a:r>
             <a:r>
-              <a:rPr lang="en-US" baseline="0" dirty="0" smtClean="0"/>
+              <a:rPr lang="en-US" baseline="0" dirty="0"/>
               <a:t> and write the JavaScript necessary to select the paragraph and store it in a variable.</a:t>
             </a:r>
             <a:endParaRPr lang="en-US" dirty="0"/>
@@ -620,28 +620,28 @@
           <a:lstStyle/>
           <a:p>
             <a:r>
-              <a:rPr lang="en-US" dirty="0" smtClean="0"/>
+              <a:rPr lang="en-US" dirty="0"/>
               <a:t>Show the students the </a:t>
             </a:r>
             <a:r>
-              <a:rPr lang="en-US" b="1" dirty="0" err="1" smtClean="0"/>
+              <a:rPr lang="en-US" b="1" dirty="0" err="1"/>
               <a:t>textContent</a:t>
             </a:r>
             <a:r>
-              <a:rPr lang="en-US" b="0" dirty="0" smtClean="0"/>
+              <a:rPr lang="en-US" b="0" dirty="0"/>
               <a:t> property of an HTML</a:t>
             </a:r>
             <a:r>
-              <a:rPr lang="en-US" b="0" baseline="0" dirty="0" smtClean="0"/>
+              <a:rPr lang="en-US" b="0" baseline="0" dirty="0"/>
               <a:t> element stored in JavaScript. It is possible to update the content programmatically.</a:t>
             </a:r>
           </a:p>
           <a:p>
-            <a:endParaRPr lang="en-US" b="0" baseline="0" dirty="0" smtClean="0"/>
+            <a:endParaRPr lang="en-US" b="0" baseline="0" dirty="0"/>
           </a:p>
           <a:p>
             <a:r>
-              <a:rPr lang="en-US" b="0" baseline="0" dirty="0" smtClean="0"/>
+              <a:rPr lang="en-US" b="0" baseline="0" dirty="0"/>
               <a:t>Note that the capitalization MUST be consistent – all lowercase except for the C in Content.</a:t>
             </a:r>
             <a:endParaRPr lang="en-US" dirty="0"/>
@@ -729,38 +729,34 @@
           <a:lstStyle/>
           <a:p>
             <a:r>
-              <a:rPr lang="en-US" dirty="0" smtClean="0"/>
+              <a:rPr lang="en-US" dirty="0"/>
               <a:t>For the </a:t>
             </a:r>
             <a:r>
-              <a:rPr lang="en-US" dirty="0" err="1" smtClean="0"/>
+              <a:rPr lang="en-US" dirty="0" err="1"/>
               <a:t>Repl</a:t>
             </a:r>
             <a:r>
-              <a:rPr lang="en-US" dirty="0" smtClean="0"/>
+              <a:rPr lang="en-US" dirty="0"/>
               <a:t>,</a:t>
             </a:r>
             <a:r>
-              <a:rPr lang="en-US" baseline="0" dirty="0" smtClean="0"/>
-              <a:t> </a:t>
+              <a:rPr lang="en-US" baseline="0" dirty="0"/>
+              <a:t> show how the text on an HTML page can be updated programmatically. Note that the important part is </a:t>
             </a:r>
             <a:r>
-              <a:rPr lang="en-US" baseline="0" dirty="0" smtClean="0"/>
-              <a:t>show how the text on an HTML page can be updated programmatically. Note that the important part is </a:t>
-            </a:r>
-            <a:r>
-              <a:rPr lang="en-US" b="1" baseline="0" dirty="0" smtClean="0"/>
+              <a:rPr lang="en-US" b="1" baseline="0" dirty="0"/>
               <a:t>.</a:t>
             </a:r>
             <a:r>
-              <a:rPr lang="en-US" b="1" baseline="0" dirty="0" err="1" smtClean="0"/>
+              <a:rPr lang="en-US" b="1" baseline="0" dirty="0" err="1"/>
               <a:t>textContent</a:t>
             </a:r>
             <a:r>
-              <a:rPr lang="en-US" b="0" baseline="0" dirty="0" smtClean="0"/>
+              <a:rPr lang="en-US" b="0" baseline="0" dirty="0"/>
               <a:t>.</a:t>
             </a:r>
-            <a:endParaRPr lang="en-US" baseline="0" dirty="0" smtClean="0"/>
+            <a:endParaRPr lang="en-US" baseline="0" dirty="0"/>
           </a:p>
         </p:txBody>
       </p:sp>
@@ -845,63 +841,63 @@
           <a:lstStyle/>
           <a:p>
             <a:r>
-              <a:rPr lang="en-US" dirty="0" smtClean="0"/>
+              <a:rPr lang="en-US" dirty="0"/>
               <a:t>Another thing you can do with JavaScript is create completely new HTML elements</a:t>
             </a:r>
             <a:r>
-              <a:rPr lang="en-US" baseline="0" dirty="0" smtClean="0"/>
+              <a:rPr lang="en-US" baseline="0" dirty="0"/>
               <a:t> with </a:t>
             </a:r>
             <a:r>
-              <a:rPr lang="en-US" b="1" baseline="0" dirty="0" err="1" smtClean="0"/>
+              <a:rPr lang="en-US" b="1" baseline="0" dirty="0" err="1"/>
               <a:t>document.createElement</a:t>
             </a:r>
             <a:r>
-              <a:rPr lang="en-US" b="0" baseline="0" dirty="0" smtClean="0"/>
+              <a:rPr lang="en-US" b="0" baseline="0" dirty="0"/>
               <a:t>.</a:t>
             </a:r>
-            <a:endParaRPr lang="en-US" dirty="0" smtClean="0"/>
+            <a:endParaRPr lang="en-US" dirty="0"/>
           </a:p>
           <a:p>
-            <a:endParaRPr lang="en-US" dirty="0" smtClean="0"/>
+            <a:endParaRPr lang="en-US" dirty="0"/>
           </a:p>
           <a:p>
             <a:r>
-              <a:rPr lang="en-US" dirty="0" smtClean="0"/>
+              <a:rPr lang="en-US" dirty="0"/>
               <a:t>Show</a:t>
             </a:r>
             <a:r>
-              <a:rPr lang="en-US" baseline="0" dirty="0" smtClean="0"/>
+              <a:rPr lang="en-US" baseline="0" dirty="0"/>
               <a:t> </a:t>
             </a:r>
             <a:r>
-              <a:rPr lang="en-US" b="1" baseline="0" dirty="0" err="1" smtClean="0"/>
+              <a:rPr lang="en-US" b="1" baseline="0" dirty="0" err="1"/>
               <a:t>document.createElement</a:t>
             </a:r>
             <a:r>
-              <a:rPr lang="en-US" baseline="0" dirty="0" smtClean="0"/>
+              <a:rPr lang="en-US" baseline="0" dirty="0"/>
               <a:t>. Explain that it creates a new HTML element just like you would do in an HTML file – but it is programmatic!</a:t>
             </a:r>
           </a:p>
           <a:p>
-            <a:endParaRPr lang="en-US" baseline="0" dirty="0" smtClean="0"/>
+            <a:endParaRPr lang="en-US" baseline="0" dirty="0"/>
           </a:p>
           <a:p>
             <a:r>
-              <a:rPr lang="en-US" baseline="0" dirty="0" smtClean="0"/>
+              <a:rPr lang="en-US" baseline="0" dirty="0"/>
               <a:t>This creates an element in JavaScript, but it does not add it to the actual HTML document yet…</a:t>
             </a:r>
           </a:p>
           <a:p>
-            <a:endParaRPr lang="en-US" baseline="0" dirty="0" smtClean="0"/>
+            <a:endParaRPr lang="en-US" baseline="0" dirty="0"/>
           </a:p>
           <a:p>
             <a:r>
-              <a:rPr lang="en-US" baseline="0" dirty="0" smtClean="0"/>
+              <a:rPr lang="en-US" baseline="0" dirty="0"/>
               <a:t>Ask the students what the HTML element would look like. It is </a:t>
             </a:r>
             <a:r>
-              <a:rPr lang="en-US" b="1" baseline="0" dirty="0" smtClean="0"/>
+              <a:rPr lang="en-US" b="1" baseline="0" dirty="0"/>
               <a:t>&lt;p&gt;New Paragraph!&lt;/p&gt;</a:t>
             </a:r>
           </a:p>
@@ -991,126 +987,126 @@
           <a:lstStyle/>
           <a:p>
             <a:r>
-              <a:rPr lang="en-US" dirty="0" smtClean="0"/>
+              <a:rPr lang="en-US" dirty="0"/>
               <a:t>Ask</a:t>
             </a:r>
             <a:r>
-              <a:rPr lang="en-US" baseline="0" dirty="0" smtClean="0"/>
+              <a:rPr lang="en-US" baseline="0" dirty="0"/>
               <a:t> the students where they think the new element will appear on the HTML page – </a:t>
             </a:r>
             <a:r>
-              <a:rPr lang="en-US" b="1" baseline="0" dirty="0" smtClean="0"/>
+              <a:rPr lang="en-US" b="1" baseline="0" dirty="0"/>
               <a:t>Nowhere!</a:t>
             </a:r>
           </a:p>
           <a:p>
-            <a:endParaRPr lang="en-US" b="1" baseline="0" dirty="0" smtClean="0"/>
+            <a:endParaRPr lang="en-US" b="1" baseline="0" dirty="0"/>
           </a:p>
           <a:p>
             <a:r>
-              <a:rPr lang="en-US" b="0" baseline="0" dirty="0" smtClean="0"/>
+              <a:rPr lang="en-US" b="0" baseline="0" dirty="0"/>
               <a:t>Explain that for an element to appear, it must be appended to the document somewhere. This is possible with </a:t>
             </a:r>
             <a:r>
-              <a:rPr lang="en-US" b="1" baseline="0" dirty="0" err="1" smtClean="0"/>
+              <a:rPr lang="en-US" b="1" baseline="0" dirty="0" err="1"/>
               <a:t>appendChild</a:t>
             </a:r>
             <a:r>
-              <a:rPr lang="en-US" b="0" baseline="0" dirty="0" smtClean="0"/>
+              <a:rPr lang="en-US" b="0" baseline="0" dirty="0"/>
               <a:t>. </a:t>
             </a:r>
           </a:p>
           <a:p>
-            <a:endParaRPr lang="en-US" b="0" baseline="0" dirty="0" smtClean="0"/>
+            <a:endParaRPr lang="en-US" b="0" baseline="0" dirty="0"/>
           </a:p>
           <a:p>
             <a:r>
-              <a:rPr lang="en-US" b="0" baseline="0" dirty="0" smtClean="0"/>
+              <a:rPr lang="en-US" b="0" baseline="0" dirty="0"/>
               <a:t>First, it is necessary to have a container element (like the HTML </a:t>
             </a:r>
             <a:r>
-              <a:rPr lang="en-US" b="1" baseline="0" dirty="0" smtClean="0"/>
+              <a:rPr lang="en-US" b="1" baseline="0" dirty="0"/>
               <a:t>div</a:t>
             </a:r>
             <a:r>
-              <a:rPr lang="en-US" b="0" baseline="0" dirty="0" smtClean="0"/>
+              <a:rPr lang="en-US" b="0" baseline="0" dirty="0"/>
               <a:t> with an </a:t>
             </a:r>
             <a:r>
-              <a:rPr lang="en-US" b="1" baseline="0" dirty="0" smtClean="0"/>
+              <a:rPr lang="en-US" b="1" baseline="0" dirty="0"/>
               <a:t>id</a:t>
             </a:r>
             <a:r>
-              <a:rPr lang="en-US" b="0" baseline="0" dirty="0" smtClean="0"/>
+              <a:rPr lang="en-US" b="0" baseline="0" dirty="0"/>
               <a:t> of </a:t>
             </a:r>
             <a:r>
-              <a:rPr lang="en-US" b="1" baseline="0" dirty="0" smtClean="0"/>
+              <a:rPr lang="en-US" b="1" baseline="0" dirty="0"/>
               <a:t>container</a:t>
             </a:r>
             <a:r>
-              <a:rPr lang="en-US" b="0" baseline="0" dirty="0" smtClean="0"/>
+              <a:rPr lang="en-US" b="0" baseline="0" dirty="0"/>
               <a:t>)</a:t>
             </a:r>
           </a:p>
           <a:p>
-            <a:endParaRPr lang="en-US" b="0" baseline="0" dirty="0" smtClean="0"/>
+            <a:endParaRPr lang="en-US" b="0" baseline="0" dirty="0"/>
           </a:p>
           <a:p>
             <a:r>
-              <a:rPr lang="en-US" b="0" baseline="0" dirty="0" smtClean="0"/>
+              <a:rPr lang="en-US" b="0" baseline="0" dirty="0"/>
               <a:t>Ask the students how to select the </a:t>
             </a:r>
             <a:r>
-              <a:rPr lang="en-US" b="1" baseline="0" dirty="0" smtClean="0"/>
+              <a:rPr lang="en-US" b="1" baseline="0" dirty="0"/>
               <a:t>div</a:t>
             </a:r>
             <a:r>
-              <a:rPr lang="en-US" b="0" baseline="0" dirty="0" smtClean="0"/>
+              <a:rPr lang="en-US" b="0" baseline="0" dirty="0"/>
               <a:t> in JavaScript – </a:t>
             </a:r>
             <a:r>
-              <a:rPr lang="en-US" b="1" baseline="0" dirty="0" err="1" smtClean="0"/>
+              <a:rPr lang="en-US" b="1" baseline="0" dirty="0" err="1"/>
               <a:t>document.querySelector</a:t>
             </a:r>
             <a:r>
-              <a:rPr lang="en-US" b="1" baseline="0" dirty="0" smtClean="0"/>
+              <a:rPr lang="en-US" b="1" baseline="0" dirty="0"/>
               <a:t>(“#container”)</a:t>
             </a:r>
           </a:p>
           <a:p>
-            <a:endParaRPr lang="en-US" b="0" baseline="0" dirty="0" smtClean="0"/>
+            <a:endParaRPr lang="en-US" b="0" baseline="0" dirty="0"/>
           </a:p>
           <a:p>
             <a:r>
-              <a:rPr lang="en-US" b="0" baseline="0" dirty="0" smtClean="0"/>
+              <a:rPr lang="en-US" b="0" baseline="0" dirty="0"/>
               <a:t>Show how to append the </a:t>
             </a:r>
             <a:r>
-              <a:rPr lang="en-US" b="1" baseline="0" dirty="0" err="1" smtClean="0"/>
+              <a:rPr lang="en-US" b="1" baseline="0" dirty="0" err="1"/>
               <a:t>myPara</a:t>
             </a:r>
             <a:r>
-              <a:rPr lang="en-US" b="0" baseline="0" dirty="0" smtClean="0"/>
+              <a:rPr lang="en-US" b="0" baseline="0" dirty="0"/>
               <a:t> element to the </a:t>
             </a:r>
             <a:r>
-              <a:rPr lang="en-US" b="1" baseline="0" dirty="0" err="1" smtClean="0"/>
+              <a:rPr lang="en-US" b="1" baseline="0" dirty="0" err="1"/>
               <a:t>myDiv</a:t>
             </a:r>
             <a:r>
-              <a:rPr lang="en-US" b="0" baseline="0" dirty="0" smtClean="0"/>
+              <a:rPr lang="en-US" b="0" baseline="0" dirty="0"/>
               <a:t> element with </a:t>
             </a:r>
             <a:r>
-              <a:rPr lang="en-US" b="1" baseline="0" dirty="0" smtClean="0"/>
+              <a:rPr lang="en-US" b="1" baseline="0" dirty="0"/>
               <a:t>.</a:t>
             </a:r>
             <a:r>
-              <a:rPr lang="en-US" b="1" baseline="0" dirty="0" err="1" smtClean="0"/>
+              <a:rPr lang="en-US" b="1" baseline="0" dirty="0" err="1"/>
               <a:t>appendChild</a:t>
             </a:r>
-            <a:endParaRPr lang="en-US" b="0" baseline="0" dirty="0" smtClean="0"/>
+            <a:endParaRPr lang="en-US" b="0" baseline="0" dirty="0"/>
           </a:p>
           <a:p>
             <a:endParaRPr lang="en-US" b="0" dirty="0"/>
@@ -1342,35 +1338,35 @@
           <a:lstStyle/>
           <a:p>
             <a:r>
-              <a:rPr lang="en-US" dirty="0" smtClean="0"/>
+              <a:rPr lang="en-US" dirty="0"/>
               <a:t>In the </a:t>
             </a:r>
             <a:r>
-              <a:rPr lang="en-US" dirty="0" err="1" smtClean="0"/>
+              <a:rPr lang="en-US" dirty="0" err="1"/>
               <a:t>Repl</a:t>
             </a:r>
             <a:r>
-              <a:rPr lang="en-US" dirty="0" smtClean="0"/>
+              <a:rPr lang="en-US" dirty="0"/>
               <a:t>, click the button a couple of times and</a:t>
             </a:r>
             <a:r>
-              <a:rPr lang="en-US" baseline="0" dirty="0" smtClean="0"/>
+              <a:rPr lang="en-US" baseline="0" dirty="0"/>
               <a:t> inspect element to show the new paragraphs added.</a:t>
             </a:r>
           </a:p>
           <a:p>
-            <a:endParaRPr lang="en-US" baseline="0" dirty="0" smtClean="0"/>
+            <a:endParaRPr lang="en-US" baseline="0" dirty="0"/>
           </a:p>
           <a:p>
             <a:r>
-              <a:rPr lang="en-US" baseline="0" dirty="0" smtClean="0"/>
+              <a:rPr lang="en-US" baseline="0" dirty="0"/>
               <a:t>Note the use of </a:t>
             </a:r>
             <a:r>
-              <a:rPr lang="en-US" b="1" baseline="0" dirty="0" err="1" smtClean="0"/>
+              <a:rPr lang="en-US" b="1" baseline="0" dirty="0" err="1"/>
               <a:t>appendChild</a:t>
             </a:r>
-            <a:endParaRPr lang="en-US" baseline="0" dirty="0" smtClean="0"/>
+            <a:endParaRPr lang="en-US" baseline="0" dirty="0"/>
           </a:p>
         </p:txBody>
       </p:sp>
@@ -1550,15 +1546,7 @@
           <a:p>
             <a:r>
               <a:rPr lang="en-US" dirty="0"/>
-              <a:t>Click to edit Master </a:t>
-            </a:r>
-            <a:r>
-              <a:rPr lang="en-US" dirty="0" smtClean="0"/>
-              <a:t>subtitle </a:t>
-            </a:r>
-            <a:r>
-              <a:rPr lang="en-US" dirty="0"/>
-              <a:t>style</a:t>
+              <a:t>Click to edit Master subtitle style</a:t>
             </a:r>
           </a:p>
         </p:txBody>
@@ -1600,7 +1588,7 @@
             <a:fld id="{1C2D31DE-C454-491C-B5C3-F097855E3DF7}" type="datetime4">
               <a:rPr lang="en-US" smtClean="0"/>
               <a:pPr/>
-              <a:t>March 26, 2020</a:t>
+              <a:t>September 7, 2022</a:t>
             </a:fld>
             <a:endParaRPr lang="en-US" dirty="0"/>
           </a:p>
@@ -4674,17 +4662,16 @@
           <a:p>
             <a:pPr lvl="0"/>
             <a:r>
-              <a:rPr lang="en-US" dirty="0" smtClean="0"/>
+              <a:rPr lang="en-US" dirty="0"/>
               <a:t>Presenter Name</a:t>
             </a:r>
             <a:br>
-              <a:rPr lang="en-US" dirty="0" smtClean="0"/>
+              <a:rPr lang="en-US" dirty="0"/>
             </a:br>
             <a:r>
-              <a:rPr lang="en-US" dirty="0" smtClean="0"/>
+              <a:rPr lang="en-US" dirty="0"/>
               <a:t>Presenter Title</a:t>
             </a:r>
-            <a:endParaRPr lang="en-US" dirty="0"/>
           </a:p>
         </p:txBody>
       </p:sp>
@@ -4701,13 +4688,6 @@
   <p:transition>
     <p:fade/>
   </p:transition>
-  <p:timing>
-    <p:tnLst>
-      <p:par>
-        <p:cTn id="1" dur="indefinite" restart="never" nodeType="tmRoot"/>
-      </p:par>
-    </p:tnLst>
-  </p:timing>
   <p:hf sldNum="0" hdr="0" ftr="0"/>
 </p:sldLayout>
 </file>
@@ -5000,7 +4980,7 @@
           <a:p>
             <a:fld id="{5958763E-B898-436D-883D-03711491D54A}" type="datetimeFigureOut">
               <a:rPr lang="en-US" smtClean="0"/>
-              <a:t>3/26/2020</a:t>
+              <a:t>9/7/2022</a:t>
             </a:fld>
             <a:endParaRPr lang="en-US"/>
           </a:p>
@@ -5073,13 +5053,6 @@
   <p:transition>
     <p:fade/>
   </p:transition>
-  <p:timing>
-    <p:tnLst>
-      <p:par>
-        <p:cTn id="1" dur="indefinite" restart="never" nodeType="tmRoot"/>
-      </p:par>
-    </p:tnLst>
-  </p:timing>
 </p:sldLayout>
 </file>
 
@@ -5128,10 +5101,9 @@
           </a:lstStyle>
           <a:p>
             <a:r>
-              <a:rPr lang="en-US" dirty="0" smtClean="0"/>
+              <a:rPr lang="en-US" dirty="0"/>
               <a:t>Click icon to add picture</a:t>
             </a:r>
-            <a:endParaRPr lang="en-US" dirty="0"/>
           </a:p>
         </p:txBody>
       </p:sp>
@@ -5201,7 +5173,7 @@
           <a:p>
             <a:fld id="{5958763E-B898-436D-883D-03711491D54A}" type="datetimeFigureOut">
               <a:rPr lang="en-US" smtClean="0"/>
-              <a:t>3/26/2020</a:t>
+              <a:t>9/7/2022</a:t>
             </a:fld>
             <a:endParaRPr lang="en-US"/>
           </a:p>
@@ -5274,13 +5246,6 @@
   <p:transition>
     <p:fade/>
   </p:transition>
-  <p:timing>
-    <p:tnLst>
-      <p:par>
-        <p:cTn id="1" dur="indefinite" restart="never" nodeType="tmRoot"/>
-      </p:par>
-    </p:tnLst>
-  </p:timing>
 </p:sldLayout>
 </file>
 
@@ -5458,7 +5423,7 @@
           <a:p>
             <a:fld id="{5958763E-B898-436D-883D-03711491D54A}" type="datetimeFigureOut">
               <a:rPr lang="en-US" smtClean="0"/>
-              <a:t>3/26/2020</a:t>
+              <a:t>9/7/2022</a:t>
             </a:fld>
             <a:endParaRPr lang="en-US"/>
           </a:p>
@@ -5531,13 +5496,6 @@
   <p:transition>
     <p:fade/>
   </p:transition>
-  <p:timing>
-    <p:tnLst>
-      <p:par>
-        <p:cTn id="1" dur="indefinite" restart="never" nodeType="tmRoot"/>
-      </p:par>
-    </p:tnLst>
-  </p:timing>
 </p:sldLayout>
 </file>
 
@@ -5813,7 +5771,7 @@
           <a:p>
             <a:fld id="{5958763E-B898-436D-883D-03711491D54A}" type="datetimeFigureOut">
               <a:rPr lang="en-US" smtClean="0"/>
-              <a:t>3/26/2020</a:t>
+              <a:t>9/7/2022</a:t>
             </a:fld>
             <a:endParaRPr lang="en-US"/>
           </a:p>
@@ -5874,13 +5832,6 @@
   <p:transition>
     <p:fade/>
   </p:transition>
-  <p:timing>
-    <p:tnLst>
-      <p:par>
-        <p:cTn id="1" dur="indefinite" restart="never" nodeType="tmRoot"/>
-      </p:par>
-    </p:tnLst>
-  </p:timing>
 </p:sldLayout>
 </file>
 
@@ -6236,7 +6187,7 @@
           <a:p>
             <a:fld id="{5958763E-B898-436D-883D-03711491D54A}" type="datetimeFigureOut">
               <a:rPr lang="en-US" smtClean="0"/>
-              <a:t>3/26/2020</a:t>
+              <a:t>9/7/2022</a:t>
             </a:fld>
             <a:endParaRPr lang="en-US"/>
           </a:p>
@@ -6297,13 +6248,6 @@
   <p:transition>
     <p:fade/>
   </p:transition>
-  <p:timing>
-    <p:tnLst>
-      <p:par>
-        <p:cTn id="1" dur="indefinite" restart="never" nodeType="tmRoot"/>
-      </p:par>
-    </p:tnLst>
-  </p:timing>
 </p:sldLayout>
 </file>
 
@@ -6744,7 +6688,7 @@
           <a:p>
             <a:fld id="{5958763E-B898-436D-883D-03711491D54A}" type="datetimeFigureOut">
               <a:rPr lang="en-US" smtClean="0"/>
-              <a:t>3/26/2020</a:t>
+              <a:t>9/7/2022</a:t>
             </a:fld>
             <a:endParaRPr lang="en-US"/>
           </a:p>
@@ -6805,13 +6749,6 @@
   <p:transition>
     <p:fade/>
   </p:transition>
-  <p:timing>
-    <p:tnLst>
-      <p:par>
-        <p:cTn id="1" dur="indefinite" restart="never" nodeType="tmRoot"/>
-      </p:par>
-    </p:tnLst>
-  </p:timing>
 </p:sldLayout>
 </file>
 
@@ -7202,7 +7139,7 @@
           <a:p>
             <a:fld id="{5958763E-B898-436D-883D-03711491D54A}" type="datetimeFigureOut">
               <a:rPr lang="en-US" smtClean="0"/>
-              <a:t>3/26/2020</a:t>
+              <a:t>9/7/2022</a:t>
             </a:fld>
             <a:endParaRPr lang="en-US"/>
           </a:p>
@@ -7263,13 +7200,6 @@
   <p:transition>
     <p:fade/>
   </p:transition>
-  <p:timing>
-    <p:tnLst>
-      <p:par>
-        <p:cTn id="1" dur="indefinite" restart="never" nodeType="tmRoot"/>
-      </p:par>
-    </p:tnLst>
-  </p:timing>
 </p:sldLayout>
 </file>
 
@@ -7820,7 +7750,7 @@
           <a:p>
             <a:fld id="{5958763E-B898-436D-883D-03711491D54A}" type="datetimeFigureOut">
               <a:rPr lang="en-US" smtClean="0"/>
-              <a:t>3/26/2020</a:t>
+              <a:t>9/7/2022</a:t>
             </a:fld>
             <a:endParaRPr lang="en-US"/>
           </a:p>
@@ -7881,13 +7811,6 @@
   <p:transition>
     <p:fade/>
   </p:transition>
-  <p:timing>
-    <p:tnLst>
-      <p:par>
-        <p:cTn id="1" dur="indefinite" restart="never" nodeType="tmRoot"/>
-      </p:par>
-    </p:tnLst>
-  </p:timing>
 </p:sldLayout>
 </file>
 
@@ -8598,7 +8521,7 @@
           <a:p>
             <a:fld id="{5958763E-B898-436D-883D-03711491D54A}" type="datetimeFigureOut">
               <a:rPr lang="en-US" smtClean="0"/>
-              <a:t>3/26/2020</a:t>
+              <a:t>9/7/2022</a:t>
             </a:fld>
             <a:endParaRPr lang="en-US"/>
           </a:p>
@@ -8659,13 +8582,6 @@
   <p:transition>
     <p:fade/>
   </p:transition>
-  <p:timing>
-    <p:tnLst>
-      <p:par>
-        <p:cTn id="1" dur="indefinite" restart="never" nodeType="tmRoot"/>
-      </p:par>
-    </p:tnLst>
-  </p:timing>
 </p:sldLayout>
 </file>
 
@@ -8709,7 +8625,7 @@
           <a:p>
             <a:fld id="{5958763E-B898-436D-883D-03711491D54A}" type="datetimeFigureOut">
               <a:rPr lang="en-US" smtClean="0"/>
-              <a:t>3/26/2020</a:t>
+              <a:t>9/7/2022</a:t>
             </a:fld>
             <a:endParaRPr lang="en-US"/>
           </a:p>
@@ -8782,13 +8698,6 @@
   <p:transition>
     <p:fade/>
   </p:transition>
-  <p:timing>
-    <p:tnLst>
-      <p:par>
-        <p:cTn id="1" dur="indefinite" restart="never" nodeType="tmRoot"/>
-      </p:par>
-    </p:tnLst>
-  </p:timing>
 </p:sldLayout>
 </file>
 
@@ -8868,7 +8777,7 @@
                 <a:spcPct val="0"/>
               </a:spcAft>
             </a:pPr>
-            <a:endParaRPr lang="en-US" sz="2400" dirty="0" err="1" smtClean="0">
+            <a:endParaRPr lang="en-US" sz="2400" dirty="0" err="1">
               <a:gradFill>
                 <a:gsLst>
                   <a:gs pos="0">
@@ -9001,15 +8910,7 @@
           <a:p>
             <a:r>
               <a:rPr lang="en-US" dirty="0"/>
-              <a:t>Click to edit Master </a:t>
-            </a:r>
-            <a:r>
-              <a:rPr lang="en-US" dirty="0" smtClean="0"/>
-              <a:t>subtitle </a:t>
-            </a:r>
-            <a:r>
-              <a:rPr lang="en-US" dirty="0"/>
-              <a:t>style</a:t>
+              <a:t>Click to edit Master subtitle style</a:t>
             </a:r>
           </a:p>
         </p:txBody>
@@ -9051,7 +8952,7 @@
             <a:fld id="{1C2D31DE-C454-491C-B5C3-F097855E3DF7}" type="datetime4">
               <a:rPr lang="en-US" smtClean="0"/>
               <a:pPr/>
-              <a:t>March 26, 2020</a:t>
+              <a:t>September 7, 2022</a:t>
             </a:fld>
             <a:endParaRPr lang="en-US" dirty="0"/>
           </a:p>
@@ -12125,17 +12026,16 @@
           <a:p>
             <a:pPr lvl="0"/>
             <a:r>
-              <a:rPr lang="en-US" dirty="0" smtClean="0"/>
+              <a:rPr lang="en-US" dirty="0"/>
               <a:t>Presenter Name</a:t>
             </a:r>
             <a:br>
-              <a:rPr lang="en-US" dirty="0" smtClean="0"/>
+              <a:rPr lang="en-US" dirty="0"/>
             </a:br>
             <a:r>
-              <a:rPr lang="en-US" dirty="0" smtClean="0"/>
+              <a:rPr lang="en-US" dirty="0"/>
               <a:t>Presenter Title</a:t>
             </a:r>
-            <a:endParaRPr lang="en-US" dirty="0"/>
           </a:p>
         </p:txBody>
       </p:sp>
@@ -12152,13 +12052,6 @@
   <p:transition>
     <p:fade/>
   </p:transition>
-  <p:timing>
-    <p:tnLst>
-      <p:par>
-        <p:cTn id="1" dur="indefinite" restart="never" nodeType="tmRoot"/>
-      </p:par>
-    </p:tnLst>
-  </p:timing>
   <p:hf sldNum="0" hdr="0" ftr="0"/>
 </p:sldLayout>
 </file>
@@ -12211,7 +12104,7 @@
           <a:p>
             <a:fld id="{5958763E-B898-436D-883D-03711491D54A}" type="datetimeFigureOut">
               <a:rPr lang="en-US" smtClean="0"/>
-              <a:t>3/26/2020</a:t>
+              <a:t>9/7/2022</a:t>
             </a:fld>
             <a:endParaRPr lang="en-US"/>
           </a:p>
@@ -12284,13 +12177,6 @@
   <p:transition>
     <p:fade/>
   </p:transition>
-  <p:timing>
-    <p:tnLst>
-      <p:par>
-        <p:cTn id="1" dur="indefinite" restart="never" nodeType="tmRoot"/>
-      </p:par>
-    </p:tnLst>
-  </p:timing>
 </p:sldLayout>
 </file>
 
@@ -12342,7 +12228,7 @@
           <a:p>
             <a:fld id="{5958763E-B898-436D-883D-03711491D54A}" type="datetimeFigureOut">
               <a:rPr lang="en-US" smtClean="0"/>
-              <a:t>3/26/2020</a:t>
+              <a:t>9/7/2022</a:t>
             </a:fld>
             <a:endParaRPr lang="en-US"/>
           </a:p>
@@ -12415,13 +12301,6 @@
   <p:transition>
     <p:fade/>
   </p:transition>
-  <p:timing>
-    <p:tnLst>
-      <p:par>
-        <p:cTn id="1" dur="indefinite" restart="never" nodeType="tmRoot"/>
-      </p:par>
-    </p:tnLst>
-  </p:timing>
 </p:sldLayout>
 </file>
 
@@ -12473,7 +12352,7 @@
           <a:p>
             <a:fld id="{5958763E-B898-436D-883D-03711491D54A}" type="datetimeFigureOut">
               <a:rPr lang="en-US" smtClean="0"/>
-              <a:t>3/26/2020</a:t>
+              <a:t>9/7/2022</a:t>
             </a:fld>
             <a:endParaRPr lang="en-US"/>
           </a:p>
@@ -12546,13 +12425,6 @@
   <p:transition>
     <p:fade/>
   </p:transition>
-  <p:timing>
-    <p:tnLst>
-      <p:par>
-        <p:cTn id="1" dur="indefinite" restart="never" nodeType="tmRoot"/>
-      </p:par>
-    </p:tnLst>
-  </p:timing>
 </p:sldLayout>
 </file>
 
@@ -12604,7 +12476,7 @@
           <a:p>
             <a:fld id="{5958763E-B898-436D-883D-03711491D54A}" type="datetimeFigureOut">
               <a:rPr lang="en-US" smtClean="0"/>
-              <a:t>3/26/2020</a:t>
+              <a:t>9/7/2022</a:t>
             </a:fld>
             <a:endParaRPr lang="en-US"/>
           </a:p>
@@ -12677,13 +12549,6 @@
   <p:transition>
     <p:fade/>
   </p:transition>
-  <p:timing>
-    <p:tnLst>
-      <p:par>
-        <p:cTn id="1" dur="indefinite" restart="never" nodeType="tmRoot"/>
-      </p:par>
-    </p:tnLst>
-  </p:timing>
 </p:sldLayout>
 </file>
 
@@ -12735,7 +12600,7 @@
           <a:p>
             <a:fld id="{5958763E-B898-436D-883D-03711491D54A}" type="datetimeFigureOut">
               <a:rPr lang="en-US" smtClean="0"/>
-              <a:t>3/26/2020</a:t>
+              <a:t>9/7/2022</a:t>
             </a:fld>
             <a:endParaRPr lang="en-US"/>
           </a:p>
@@ -12808,13 +12673,6 @@
   <p:transition>
     <p:fade/>
   </p:transition>
-  <p:timing>
-    <p:tnLst>
-      <p:par>
-        <p:cTn id="1" dur="indefinite" restart="never" nodeType="tmRoot"/>
-      </p:par>
-    </p:tnLst>
-  </p:timing>
 </p:sldLayout>
 </file>
 
@@ -12866,7 +12724,7 @@
           <a:p>
             <a:fld id="{5958763E-B898-436D-883D-03711491D54A}" type="datetimeFigureOut">
               <a:rPr lang="en-US" smtClean="0"/>
-              <a:t>3/26/2020</a:t>
+              <a:t>9/7/2022</a:t>
             </a:fld>
             <a:endParaRPr lang="en-US"/>
           </a:p>
@@ -12939,13 +12797,6 @@
   <p:transition>
     <p:fade/>
   </p:transition>
-  <p:timing>
-    <p:tnLst>
-      <p:par>
-        <p:cTn id="1" dur="indefinite" restart="never" nodeType="tmRoot"/>
-      </p:par>
-    </p:tnLst>
-  </p:timing>
 </p:sldLayout>
 </file>
 
@@ -12997,7 +12848,7 @@
           <a:p>
             <a:fld id="{5958763E-B898-436D-883D-03711491D54A}" type="datetimeFigureOut">
               <a:rPr lang="en-US" smtClean="0"/>
-              <a:t>3/26/2020</a:t>
+              <a:t>9/7/2022</a:t>
             </a:fld>
             <a:endParaRPr lang="en-US"/>
           </a:p>
@@ -13070,13 +12921,6 @@
   <p:transition>
     <p:fade/>
   </p:transition>
-  <p:timing>
-    <p:tnLst>
-      <p:par>
-        <p:cTn id="1" dur="indefinite" restart="never" nodeType="tmRoot"/>
-      </p:par>
-    </p:tnLst>
-  </p:timing>
 </p:sldLayout>
 </file>
 
@@ -13128,7 +12972,7 @@
           <a:p>
             <a:fld id="{5958763E-B898-436D-883D-03711491D54A}" type="datetimeFigureOut">
               <a:rPr lang="en-US" smtClean="0"/>
-              <a:t>3/26/2020</a:t>
+              <a:t>9/7/2022</a:t>
             </a:fld>
             <a:endParaRPr lang="en-US"/>
           </a:p>
@@ -13201,13 +13045,6 @@
   <p:transition>
     <p:fade/>
   </p:transition>
-  <p:timing>
-    <p:tnLst>
-      <p:par>
-        <p:cTn id="1" dur="indefinite" restart="never" nodeType="tmRoot"/>
-      </p:par>
-    </p:tnLst>
-  </p:timing>
 </p:sldLayout>
 </file>
 
@@ -13268,7 +13105,7 @@
           <a:p>
             <a:fld id="{5958763E-B898-436D-883D-03711491D54A}" type="datetimeFigureOut">
               <a:rPr lang="en-US" smtClean="0"/>
-              <a:t>3/26/2020</a:t>
+              <a:t>9/7/2022</a:t>
             </a:fld>
             <a:endParaRPr lang="en-US"/>
           </a:p>
@@ -13341,13 +13178,6 @@
   <p:transition>
     <p:fade/>
   </p:transition>
-  <p:timing>
-    <p:tnLst>
-      <p:par>
-        <p:cTn id="1" dur="indefinite" restart="never" nodeType="tmRoot"/>
-      </p:par>
-    </p:tnLst>
-  </p:timing>
 </p:sldLayout>
 </file>
 
@@ -16349,13 +16179,6 @@
   <p:transition>
     <p:fade/>
   </p:transition>
-  <p:timing>
-    <p:tnLst>
-      <p:par>
-        <p:cTn id="1" dur="indefinite" restart="never" nodeType="tmRoot"/>
-      </p:par>
-    </p:tnLst>
-  </p:timing>
 </p:sldLayout>
 </file>
 
@@ -16443,7 +16266,7 @@
                 <a:spcPct val="0"/>
               </a:spcAft>
             </a:pPr>
-            <a:endParaRPr lang="en-US" sz="2400" dirty="0" err="1" smtClean="0">
+            <a:endParaRPr lang="en-US" sz="2400" dirty="0" err="1">
               <a:gradFill>
                 <a:gsLst>
                   <a:gs pos="0">
@@ -16579,15 +16402,7 @@
           <a:p>
             <a:r>
               <a:rPr lang="en-US" dirty="0"/>
-              <a:t>Click to edit Master </a:t>
-            </a:r>
-            <a:r>
-              <a:rPr lang="en-US" dirty="0" smtClean="0"/>
-              <a:t>subtitle </a:t>
-            </a:r>
-            <a:r>
-              <a:rPr lang="en-US" dirty="0"/>
-              <a:t>style</a:t>
+              <a:t>Click to edit Master subtitle style</a:t>
             </a:r>
           </a:p>
         </p:txBody>
@@ -16629,7 +16444,7 @@
             <a:fld id="{1C2D31DE-C454-491C-B5C3-F097855E3DF7}" type="datetime4">
               <a:rPr lang="en-US" smtClean="0"/>
               <a:pPr/>
-              <a:t>March 26, 2020</a:t>
+              <a:t>September 7, 2022</a:t>
             </a:fld>
             <a:endParaRPr lang="en-US" dirty="0"/>
           </a:p>
@@ -19711,17 +19526,16 @@
           <a:p>
             <a:pPr lvl="0"/>
             <a:r>
-              <a:rPr lang="en-US" dirty="0" smtClean="0"/>
+              <a:rPr lang="en-US" dirty="0"/>
               <a:t>Presenter Name</a:t>
             </a:r>
             <a:br>
-              <a:rPr lang="en-US" dirty="0" smtClean="0"/>
+              <a:rPr lang="en-US" dirty="0"/>
             </a:br>
             <a:r>
-              <a:rPr lang="en-US" dirty="0" smtClean="0"/>
+              <a:rPr lang="en-US" dirty="0"/>
               <a:t>Presenter Title</a:t>
             </a:r>
-            <a:endParaRPr lang="en-US" dirty="0"/>
           </a:p>
         </p:txBody>
       </p:sp>
@@ -19738,13 +19552,6 @@
   <p:transition>
     <p:fade/>
   </p:transition>
-  <p:timing>
-    <p:tnLst>
-      <p:par>
-        <p:cTn id="1" dur="indefinite" restart="never" nodeType="tmRoot"/>
-      </p:par>
-    </p:tnLst>
-  </p:timing>
   <p:hf sldNum="0" hdr="0" ftr="0"/>
 </p:sldLayout>
 </file>
@@ -27254,10 +27061,9 @@
           <a:p>
             <a:pPr lvl="0"/>
             <a:r>
-              <a:rPr lang="en-US" dirty="0" smtClean="0"/>
+              <a:rPr lang="en-US" dirty="0"/>
               <a:t>&lt;Call to action&gt;</a:t>
             </a:r>
-            <a:endParaRPr lang="en-US" dirty="0"/>
           </a:p>
         </p:txBody>
       </p:sp>
@@ -28874,7 +28680,7 @@
           <a:p>
             <a:fld id="{5958763E-B898-436D-883D-03711491D54A}" type="datetimeFigureOut">
               <a:rPr lang="en-US" smtClean="0"/>
-              <a:t>3/26/2020</a:t>
+              <a:t>9/7/2022</a:t>
             </a:fld>
             <a:endParaRPr lang="en-US"/>
           </a:p>
@@ -29001,7 +28807,7 @@
                 <a:spcPct val="0"/>
               </a:spcAft>
             </a:pPr>
-            <a:endParaRPr lang="en-US" sz="2400" dirty="0" err="1" smtClean="0">
+            <a:endParaRPr lang="en-US" sz="2400" dirty="0" err="1">
               <a:gradFill>
                 <a:gsLst>
                   <a:gs pos="0">
@@ -29032,13 +28838,6 @@
   <p:transition>
     <p:fade/>
   </p:transition>
-  <p:timing>
-    <p:tnLst>
-      <p:par>
-        <p:cTn id="1" dur="indefinite" restart="never" nodeType="tmRoot"/>
-      </p:par>
-    </p:tnLst>
-  </p:timing>
 </p:sldLayout>
 </file>
 
@@ -29283,7 +29082,7 @@
           <a:p>
             <a:fld id="{5958763E-B898-436D-883D-03711491D54A}" type="datetimeFigureOut">
               <a:rPr lang="en-US" smtClean="0"/>
-              <a:t>3/26/2020</a:t>
+              <a:t>9/7/2022</a:t>
             </a:fld>
             <a:endParaRPr lang="en-US"/>
           </a:p>
@@ -29356,13 +29155,6 @@
   <p:transition>
     <p:fade/>
   </p:transition>
-  <p:timing>
-    <p:tnLst>
-      <p:par>
-        <p:cTn id="1" dur="indefinite" restart="never" nodeType="tmRoot"/>
-      </p:par>
-    </p:tnLst>
-  </p:timing>
 </p:sldLayout>
 </file>
 
@@ -29584,7 +29376,7 @@
           <a:p>
             <a:fld id="{5958763E-B898-436D-883D-03711491D54A}" type="datetimeFigureOut">
               <a:rPr lang="en-US" smtClean="0"/>
-              <a:t>3/26/2020</a:t>
+              <a:t>9/7/2022</a:t>
             </a:fld>
             <a:endParaRPr lang="en-US"/>
           </a:p>
@@ -29657,13 +29449,6 @@
   <p:transition>
     <p:fade/>
   </p:transition>
-  <p:timing>
-    <p:tnLst>
-      <p:par>
-        <p:cTn id="1" dur="indefinite" restart="never" nodeType="tmRoot"/>
-      </p:par>
-    </p:tnLst>
-  </p:timing>
 </p:sldLayout>
 </file>
 
@@ -29792,7 +29577,7 @@
           <a:p>
             <a:fld id="{5958763E-B898-436D-883D-03711491D54A}" type="datetimeFigureOut">
               <a:rPr lang="en-US" smtClean="0"/>
-              <a:t>3/26/2020</a:t>
+              <a:t>9/7/2022</a:t>
             </a:fld>
             <a:endParaRPr lang="en-US"/>
           </a:p>
@@ -29915,13 +29700,6 @@
   <p:transition>
     <p:fade/>
   </p:transition>
-  <p:timing>
-    <p:tnLst>
-      <p:par>
-        <p:cTn id="1" dur="indefinite" restart="never" nodeType="tmRoot"/>
-      </p:par>
-    </p:tnLst>
-  </p:timing>
 </p:sldLayout>
 </file>
 
@@ -30060,7 +29838,7 @@
           <a:p>
             <a:fld id="{5958763E-B898-436D-883D-03711491D54A}" type="datetimeFigureOut">
               <a:rPr lang="en-US" smtClean="0"/>
-              <a:t>3/26/2020</a:t>
+              <a:t>9/7/2022</a:t>
             </a:fld>
             <a:endParaRPr lang="en-US"/>
           </a:p>
@@ -30187,13 +29965,6 @@
   <p:transition>
     <p:fade/>
   </p:transition>
-  <p:timing>
-    <p:tnLst>
-      <p:par>
-        <p:cTn id="1" dur="indefinite" restart="never" nodeType="tmRoot"/>
-      </p:par>
-    </p:tnLst>
-  </p:timing>
 </p:sldLayout>
 </file>
 
@@ -30355,7 +30126,7 @@
                 <a:spcPct val="0"/>
               </a:spcAft>
             </a:pPr>
-            <a:endParaRPr lang="en-US" sz="2400" dirty="0" err="1" smtClean="0">
+            <a:endParaRPr lang="en-US" sz="2400" dirty="0" err="1">
               <a:gradFill>
                 <a:gsLst>
                   <a:gs pos="0">
@@ -30406,10 +30177,9 @@
           </a:lstStyle>
           <a:p>
             <a:r>
-              <a:rPr lang="en-US" dirty="0" smtClean="0"/>
+              <a:rPr lang="en-US" dirty="0"/>
               <a:t>Type “Agenda”</a:t>
             </a:r>
-            <a:endParaRPr lang="en-US" dirty="0"/>
           </a:p>
         </p:txBody>
       </p:sp>
@@ -30533,24 +30303,23 @@
           <a:p>
             <a:pPr lvl="0"/>
             <a:r>
-              <a:rPr lang="en-US" dirty="0" smtClean="0"/>
+              <a:rPr lang="en-US" dirty="0"/>
               <a:t>Item 1</a:t>
             </a:r>
           </a:p>
           <a:p>
             <a:pPr lvl="0"/>
             <a:r>
-              <a:rPr lang="en-US" dirty="0" smtClean="0"/>
+              <a:rPr lang="en-US" dirty="0"/>
               <a:t>Item 2</a:t>
             </a:r>
           </a:p>
           <a:p>
             <a:pPr lvl="0"/>
             <a:r>
-              <a:rPr lang="en-US" dirty="0" smtClean="0"/>
+              <a:rPr lang="en-US" dirty="0"/>
               <a:t>Item 3</a:t>
             </a:r>
-            <a:endParaRPr lang="en-US" dirty="0"/>
           </a:p>
         </p:txBody>
       </p:sp>
@@ -30577,7 +30346,7 @@
           <a:p>
             <a:fld id="{5958763E-B898-436D-883D-03711491D54A}" type="datetimeFigureOut">
               <a:rPr lang="en-US" smtClean="0"/>
-              <a:t>3/26/2020</a:t>
+              <a:t>9/7/2022</a:t>
             </a:fld>
             <a:endParaRPr lang="en-US"/>
           </a:p>
@@ -30684,13 +30453,6 @@
   <p:transition>
     <p:fade/>
   </p:transition>
-  <p:timing>
-    <p:tnLst>
-      <p:par>
-        <p:cTn id="1" dur="indefinite" restart="never" nodeType="tmRoot"/>
-      </p:par>
-    </p:tnLst>
-  </p:timing>
 </p:sldLayout>
 </file>
 
@@ -30852,7 +30614,7 @@
                 <a:spcPct val="0"/>
               </a:spcAft>
             </a:pPr>
-            <a:endParaRPr lang="en-US" sz="2400" dirty="0" err="1" smtClean="0">
+            <a:endParaRPr lang="en-US" sz="2400" dirty="0" err="1">
               <a:gradFill>
                 <a:gsLst>
                   <a:gs pos="0">
@@ -30905,10 +30667,9 @@
           </a:lstStyle>
           <a:p>
             <a:r>
-              <a:rPr lang="en-US" dirty="0" smtClean="0"/>
+              <a:rPr lang="en-US" dirty="0"/>
               <a:t>Notable Quote</a:t>
             </a:r>
-            <a:endParaRPr lang="en-US" dirty="0"/>
           </a:p>
         </p:txBody>
       </p:sp>
@@ -31035,10 +30796,9 @@
           <a:p>
             <a:pPr lvl="0"/>
             <a:r>
-              <a:rPr lang="en-US" dirty="0" smtClean="0"/>
+              <a:rPr lang="en-US" dirty="0"/>
               <a:t>– Attribution</a:t>
             </a:r>
-            <a:endParaRPr lang="en-US" dirty="0"/>
           </a:p>
         </p:txBody>
       </p:sp>
@@ -31065,7 +30825,7 @@
           <a:p>
             <a:fld id="{5958763E-B898-436D-883D-03711491D54A}" type="datetimeFigureOut">
               <a:rPr lang="en-US" smtClean="0"/>
-              <a:t>3/26/2020</a:t>
+              <a:t>9/7/2022</a:t>
             </a:fld>
             <a:endParaRPr lang="en-US"/>
           </a:p>
@@ -31813,13 +31573,6 @@
   <p:transition>
     <p:fade/>
   </p:transition>
-  <p:timing>
-    <p:tnLst>
-      <p:par>
-        <p:cTn id="1" dur="indefinite" restart="never" nodeType="tmRoot"/>
-      </p:par>
-    </p:tnLst>
-  </p:timing>
 </p:sldLayout>
 </file>
 
@@ -31891,7 +31644,7 @@
           <a:p>
             <a:fld id="{5958763E-B898-436D-883D-03711491D54A}" type="datetimeFigureOut">
               <a:rPr lang="en-US" smtClean="0"/>
-              <a:t>3/26/2020</a:t>
+              <a:t>9/7/2022</a:t>
             </a:fld>
             <a:endParaRPr lang="en-US"/>
           </a:p>
@@ -31964,13 +31717,6 @@
   <p:transition>
     <p:fade/>
   </p:transition>
-  <p:timing>
-    <p:tnLst>
-      <p:par>
-        <p:cTn id="1" dur="indefinite" restart="never" nodeType="tmRoot"/>
-      </p:par>
-    </p:tnLst>
-  </p:timing>
 </p:sldLayout>
 </file>
 
@@ -32099,7 +31845,7 @@
           <a:p>
             <a:fld id="{5958763E-B898-436D-883D-03711491D54A}" type="datetimeFigureOut">
               <a:rPr lang="en-US" smtClean="0"/>
-              <a:t>3/26/2020</a:t>
+              <a:t>9/7/2022</a:t>
             </a:fld>
             <a:endParaRPr lang="en-US"/>
           </a:p>
@@ -32222,13 +31968,6 @@
   <p:transition>
     <p:fade/>
   </p:transition>
-  <p:timing>
-    <p:tnLst>
-      <p:par>
-        <p:cTn id="1" dur="indefinite" restart="never" nodeType="tmRoot"/>
-      </p:par>
-    </p:tnLst>
-  </p:timing>
 </p:sldLayout>
 </file>
 
@@ -32441,7 +32180,7 @@
           <a:p>
             <a:fld id="{5958763E-B898-436D-883D-03711491D54A}" type="datetimeFigureOut">
               <a:rPr lang="en-US" smtClean="0"/>
-              <a:t>3/26/2020</a:t>
+              <a:t>9/7/2022</a:t>
             </a:fld>
             <a:endParaRPr lang="en-US"/>
           </a:p>
@@ -32514,13 +32253,6 @@
   <p:transition>
     <p:fade/>
   </p:transition>
-  <p:timing>
-    <p:tnLst>
-      <p:par>
-        <p:cTn id="1" dur="indefinite" restart="never" nodeType="tmRoot"/>
-      </p:par>
-    </p:tnLst>
-  </p:timing>
 </p:sldLayout>
 </file>
 
@@ -32678,7 +32410,7 @@
           <a:p>
             <a:fld id="{5958763E-B898-436D-883D-03711491D54A}" type="datetimeFigureOut">
               <a:rPr lang="en-US" smtClean="0"/>
-              <a:t>3/26/2020</a:t>
+              <a:t>9/7/2022</a:t>
             </a:fld>
             <a:endParaRPr lang="en-US"/>
           </a:p>
@@ -32751,13 +32483,6 @@
   <p:transition>
     <p:fade/>
   </p:transition>
-  <p:timing>
-    <p:tnLst>
-      <p:par>
-        <p:cTn id="1" dur="indefinite" restart="never" nodeType="tmRoot"/>
-      </p:par>
-    </p:tnLst>
-  </p:timing>
 </p:sldLayout>
 </file>
 
@@ -32929,7 +32654,7 @@
           <a:p>
             <a:fld id="{5958763E-B898-436D-883D-03711491D54A}" type="datetimeFigureOut">
               <a:rPr lang="en-US" smtClean="0"/>
-              <a:t>3/26/2020</a:t>
+              <a:t>9/7/2022</a:t>
             </a:fld>
             <a:endParaRPr lang="en-US"/>
           </a:p>
@@ -33075,13 +32800,6 @@
   <p:transition>
     <p:fade/>
   </p:transition>
-  <p:timing>
-    <p:tnLst>
-      <p:par>
-        <p:cTn id="1" dur="indefinite" restart="never" nodeType="tmRoot"/>
-      </p:par>
-    </p:tnLst>
-  </p:timing>
   <p:txStyles>
     <p:titleStyle>
       <a:lvl1pPr algn="l" defTabSz="914400" rtl="0" eaLnBrk="1" latinLnBrk="0" hangingPunct="1">
@@ -33386,7 +33104,7 @@
       </a:lvl9pPr>
     </p:otherStyle>
   </p:txStyles>
-  <p:extLst mod="1">
+  <p:extLst>
     <p:ext uri="{27BBF7A9-308A-43DC-89C8-2F10F3537804}">
       <p15:sldGuideLst xmlns:p15="http://schemas.microsoft.com/office/powerpoint/2012/main">
         <p15:guide id="1" orient="horz" pos="2160" userDrawn="1">
@@ -33465,10 +33183,9 @@
           <a:lstStyle/>
           <a:p>
             <a:r>
-              <a:rPr lang="en-US" sz="6600" dirty="0" smtClean="0"/>
+              <a:rPr lang="en-US" sz="6600" dirty="0"/>
               <a:t>DOM Manipulation: Updating HTML</a:t>
             </a:r>
-            <a:endParaRPr lang="en-US" sz="6600" dirty="0"/>
           </a:p>
         </p:txBody>
       </p:sp>
@@ -33493,11 +33210,11 @@
           <a:lstStyle/>
           <a:p>
             <a:r>
-              <a:rPr lang="en-US" dirty="0" smtClean="0"/>
+              <a:rPr lang="en-US" dirty="0"/>
               <a:t>Hy-Tech Club: </a:t>
             </a:r>
             <a:r>
-              <a:rPr lang="en-US" smtClean="0"/>
+              <a:rPr lang="en-US"/>
               <a:t>Web 102</a:t>
             </a:r>
             <a:endParaRPr lang="en-US" dirty="0"/>
@@ -36485,13 +36202,6 @@
   <p:transition>
     <p:fade/>
   </p:transition>
-  <p:timing>
-    <p:tnLst>
-      <p:par>
-        <p:cTn id="1" dur="indefinite" restart="never" nodeType="tmRoot"/>
-      </p:par>
-    </p:tnLst>
-  </p:timing>
 </p:sld>
 </file>
 
@@ -36528,10 +36238,9 @@
           <a:lstStyle/>
           <a:p>
             <a:r>
-              <a:rPr lang="en-US" dirty="0" smtClean="0"/>
+              <a:rPr lang="en-US" dirty="0"/>
               <a:t>Review – select this paragraph in JavaScript</a:t>
             </a:r>
-            <a:endParaRPr lang="en-US" dirty="0"/>
           </a:p>
         </p:txBody>
       </p:sp>
@@ -36641,25 +36350,7 @@
                 </a:solidFill>
                 <a:latin typeface="Consolas" panose="020B0609020204030204" pitchFamily="49" charset="0"/>
               </a:rPr>
-              <a:t>"</a:t>
-            </a:r>
-            <a:r>
-              <a:rPr lang="en-US" sz="3600" dirty="0" err="1">
-                <a:solidFill>
-                  <a:srgbClr val="0000FF"/>
-                </a:solidFill>
-                <a:latin typeface="Consolas" panose="020B0609020204030204" pitchFamily="49" charset="0"/>
-              </a:rPr>
-              <a:t>myText</a:t>
-            </a:r>
-            <a:r>
-              <a:rPr lang="en-US" sz="3600" dirty="0">
-                <a:solidFill>
-                  <a:srgbClr val="0000FF"/>
-                </a:solidFill>
-                <a:latin typeface="Consolas" panose="020B0609020204030204" pitchFamily="49" charset="0"/>
-              </a:rPr>
-              <a:t>"</a:t>
+              <a:t>"my-text"</a:t>
             </a:r>
             <a:r>
               <a:rPr lang="en-US" sz="3600" dirty="0">
@@ -36765,13 +36456,13 @@
           <a:lstStyle/>
           <a:p>
             <a:r>
-              <a:rPr lang="en-US" sz="3200" dirty="0" err="1">
+              <a:rPr lang="en-US" sz="3200" dirty="0">
                 <a:solidFill>
                   <a:srgbClr val="0000FF"/>
                 </a:solidFill>
                 <a:latin typeface="Consolas" panose="020B0609020204030204" pitchFamily="49" charset="0"/>
               </a:rPr>
-              <a:t>var</a:t>
+              <a:t>let</a:t>
             </a:r>
             <a:r>
               <a:rPr lang="en-US" sz="3200" dirty="0">
@@ -36783,7 +36474,7 @@
               <a:t> </a:t>
             </a:r>
             <a:r>
-              <a:rPr lang="en-US" sz="3200" dirty="0" err="1" smtClean="0">
+              <a:rPr lang="en-US" sz="3200" dirty="0" err="1">
                 <a:solidFill>
                   <a:srgbClr val="000000"/>
                 </a:solidFill>
@@ -36792,22 +36483,13 @@
               <a:t>myEl</a:t>
             </a:r>
             <a:r>
-              <a:rPr lang="en-US" sz="3200" dirty="0" smtClean="0">
-                <a:solidFill>
-                  <a:srgbClr val="000000"/>
-                </a:solidFill>
-                <a:latin typeface="Consolas" panose="020B0609020204030204" pitchFamily="49" charset="0"/>
-              </a:rPr>
-              <a:t> </a:t>
-            </a:r>
-            <a:r>
               <a:rPr lang="en-US" sz="3200" dirty="0">
                 <a:solidFill>
                   <a:srgbClr val="000000"/>
                 </a:solidFill>
                 <a:latin typeface="Consolas" panose="020B0609020204030204" pitchFamily="49" charset="0"/>
               </a:rPr>
-              <a:t>= </a:t>
+              <a:t> = </a:t>
             </a:r>
             <a:r>
               <a:rPr lang="en-US" sz="3200" dirty="0" err="1">
@@ -36834,25 +36516,7 @@
                 </a:solidFill>
                 <a:latin typeface="Consolas" panose="020B0609020204030204" pitchFamily="49" charset="0"/>
               </a:rPr>
-              <a:t>"#</a:t>
-            </a:r>
-            <a:r>
-              <a:rPr lang="en-US" sz="3200" dirty="0" err="1">
-                <a:solidFill>
-                  <a:srgbClr val="A31515"/>
-                </a:solidFill>
-                <a:latin typeface="Consolas" panose="020B0609020204030204" pitchFamily="49" charset="0"/>
-              </a:rPr>
-              <a:t>myText</a:t>
-            </a:r>
-            <a:r>
-              <a:rPr lang="en-US" sz="3200" dirty="0">
-                <a:solidFill>
-                  <a:srgbClr val="A31515"/>
-                </a:solidFill>
-                <a:latin typeface="Consolas" panose="020B0609020204030204" pitchFamily="49" charset="0"/>
-              </a:rPr>
-              <a:t>"</a:t>
+              <a:t>"#my-text"</a:t>
             </a:r>
             <a:r>
               <a:rPr lang="en-US" sz="3200" dirty="0">
@@ -37028,7 +36692,7 @@
               <a:t>.</a:t>
             </a:r>
             <a:r>
-              <a:rPr lang="en-US" sz="4400" cap="none" dirty="0" err="1" smtClean="0">
+              <a:rPr lang="en-US" sz="4400" cap="none" dirty="0" err="1">
                 <a:solidFill>
                   <a:schemeClr val="accent1">
                     <a:lumMod val="50000"/>
@@ -37060,7 +36724,12 @@
             <p:ph idx="1"/>
           </p:nvPr>
         </p:nvSpPr>
-        <p:spPr/>
+        <p:spPr>
+          <a:xfrm>
+            <a:off x="381000" y="1143000"/>
+            <a:ext cx="11544300" cy="5257800"/>
+          </a:xfrm>
+        </p:spPr>
         <p:txBody>
           <a:bodyPr>
             <a:normAutofit/>
@@ -37071,13 +36740,13 @@
               <a:buNone/>
             </a:pPr>
             <a:r>
-              <a:rPr lang="en-US" sz="3600" dirty="0" err="1">
+              <a:rPr lang="en-US" sz="3600" dirty="0">
                 <a:solidFill>
                   <a:srgbClr val="0000FF"/>
                 </a:solidFill>
                 <a:latin typeface="Consolas" panose="020B0609020204030204" pitchFamily="49" charset="0"/>
               </a:rPr>
-              <a:t>var</a:t>
+              <a:t>let</a:t>
             </a:r>
             <a:r>
               <a:rPr lang="en-US" sz="3600" dirty="0">
@@ -37131,25 +36800,7 @@
                 </a:solidFill>
                 <a:latin typeface="Consolas" panose="020B0609020204030204" pitchFamily="49" charset="0"/>
               </a:rPr>
-              <a:t>"#</a:t>
-            </a:r>
-            <a:r>
-              <a:rPr lang="en-US" sz="3600" dirty="0" err="1">
-                <a:solidFill>
-                  <a:srgbClr val="A31515"/>
-                </a:solidFill>
-                <a:latin typeface="Consolas" panose="020B0609020204030204" pitchFamily="49" charset="0"/>
-              </a:rPr>
-              <a:t>myText</a:t>
-            </a:r>
-            <a:r>
-              <a:rPr lang="en-US" sz="3600" dirty="0">
-                <a:solidFill>
-                  <a:srgbClr val="A31515"/>
-                </a:solidFill>
-                <a:latin typeface="Consolas" panose="020B0609020204030204" pitchFamily="49" charset="0"/>
-              </a:rPr>
-              <a:t>"</a:t>
+              <a:t>"#my-text"</a:t>
             </a:r>
             <a:r>
               <a:rPr lang="en-US" sz="3600" dirty="0">
@@ -37217,26 +36868,25 @@
             <a:pPr marL="57150" indent="0">
               <a:buNone/>
             </a:pPr>
-            <a:endParaRPr lang="en-US" dirty="0" smtClean="0"/>
+            <a:endParaRPr lang="en-US" dirty="0"/>
           </a:p>
           <a:p>
             <a:pPr marL="57150" indent="0">
               <a:buNone/>
             </a:pPr>
-            <a:endParaRPr lang="en-US" dirty="0" smtClean="0"/>
+            <a:endParaRPr lang="en-US" dirty="0"/>
           </a:p>
           <a:p>
             <a:r>
-              <a:rPr lang="en-US" sz="3200" dirty="0" smtClean="0"/>
+              <a:rPr lang="en-US" sz="3200" dirty="0"/>
               <a:t>Sets the value like a variable</a:t>
             </a:r>
           </a:p>
           <a:p>
             <a:r>
-              <a:rPr lang="en-US" sz="3200" dirty="0" smtClean="0"/>
+              <a:rPr lang="en-US" sz="3200" dirty="0"/>
               <a:t>Allows the developer to change the content of the page!</a:t>
             </a:r>
-            <a:endParaRPr lang="en-US" sz="3200" dirty="0"/>
           </a:p>
         </p:txBody>
       </p:sp>
@@ -37303,7 +36953,7 @@
                 <a:spcPct val="0"/>
               </a:spcAft>
             </a:pPr>
-            <a:endParaRPr lang="en-US" sz="2400" dirty="0" err="1" smtClean="0">
+            <a:endParaRPr lang="en-US" sz="2400" dirty="0" err="1">
               <a:gradFill>
                 <a:gsLst>
                   <a:gs pos="0">
@@ -37650,14 +37300,9 @@
           <a:lstStyle/>
           <a:p>
             <a:r>
-              <a:rPr lang="en-US" dirty="0" smtClean="0"/>
-              <a:t>Text content </a:t>
+              <a:rPr lang="en-US" dirty="0"/>
+              <a:t>Text content example</a:t>
             </a:r>
-            <a:r>
-              <a:rPr lang="en-US" dirty="0" smtClean="0"/>
-              <a:t>example</a:t>
-            </a:r>
-            <a:endParaRPr lang="en-US" dirty="0"/>
           </a:p>
         </p:txBody>
       </p:sp>
@@ -37682,12 +37327,12 @@
               <a:buNone/>
             </a:pPr>
             <a:r>
-              <a:rPr lang="en-US" sz="11500" dirty="0">
+              <a:rPr lang="en-US" sz="9600" dirty="0">
                 <a:hlinkClick r:id="rId3"/>
               </a:rPr>
-              <a:t>https://repl.it/repls/HeartfeltSnowPixel</a:t>
+              <a:t>https://replit.com/@HylandOutreach/UpdateTextContent</a:t>
             </a:r>
-            <a:endParaRPr lang="en-US" sz="13800" dirty="0"/>
+            <a:endParaRPr lang="en-US" sz="9600" dirty="0"/>
           </a:p>
         </p:txBody>
       </p:sp>
@@ -37704,13 +37349,6 @@
   <p:transition>
     <p:fade/>
   </p:transition>
-  <p:timing>
-    <p:tnLst>
-      <p:par>
-        <p:cTn id="1" dur="indefinite" restart="never" nodeType="tmRoot"/>
-      </p:par>
-    </p:tnLst>
-  </p:timing>
 </p:sld>
 </file>
 
@@ -37754,7 +37392,7 @@
               </a:spcBef>
             </a:pPr>
             <a:r>
-              <a:rPr lang="en-US" sz="4400" cap="none" dirty="0" err="1" smtClean="0">
+              <a:rPr lang="en-US" sz="4400" cap="none" dirty="0" err="1">
                 <a:solidFill>
                   <a:schemeClr val="accent1">
                     <a:lumMod val="50000"/>
@@ -37797,13 +37435,13 @@
               <a:buNone/>
             </a:pPr>
             <a:r>
-              <a:rPr lang="en-US" sz="3600" dirty="0" err="1">
+              <a:rPr lang="en-US" sz="3600" dirty="0">
                 <a:solidFill>
                   <a:srgbClr val="0000FF"/>
                 </a:solidFill>
                 <a:latin typeface="Consolas" panose="020B0609020204030204" pitchFamily="49" charset="0"/>
               </a:rPr>
-              <a:t>var</a:t>
+              <a:t>let</a:t>
             </a:r>
             <a:r>
               <a:rPr lang="en-US" sz="3600" dirty="0">
@@ -37898,19 +37536,10 @@
                 </a:solidFill>
                 <a:latin typeface="Consolas" panose="020B0609020204030204" pitchFamily="49" charset="0"/>
               </a:rPr>
-              <a:t>"New paragraph</a:t>
+              <a:t>"New paragraph!"</a:t>
             </a:r>
             <a:r>
-              <a:rPr lang="en-US" sz="3600" dirty="0" smtClean="0">
-                <a:solidFill>
-                  <a:srgbClr val="A31515"/>
-                </a:solidFill>
-                <a:latin typeface="Consolas" panose="020B0609020204030204" pitchFamily="49" charset="0"/>
-              </a:rPr>
-              <a:t>!"</a:t>
-            </a:r>
-            <a:r>
-              <a:rPr lang="en-US" sz="3600" dirty="0" smtClean="0">
+              <a:rPr lang="en-US" sz="3600" dirty="0">
                 <a:solidFill>
                   <a:srgbClr val="000000"/>
                 </a:solidFill>
@@ -37937,7 +37566,7 @@
               </a:buClr>
             </a:pPr>
             <a:r>
-              <a:rPr lang="en-US" sz="3200" dirty="0" smtClean="0">
+              <a:rPr lang="en-US" sz="3200" dirty="0">
                 <a:solidFill>
                   <a:srgbClr val="56565A"/>
                 </a:solidFill>
@@ -37952,7 +37581,7 @@
               </a:buClr>
             </a:pPr>
             <a:r>
-              <a:rPr lang="en-US" sz="2800" dirty="0" smtClean="0">
+              <a:rPr lang="en-US" sz="2800" dirty="0">
                 <a:solidFill>
                   <a:srgbClr val="56565A"/>
                 </a:solidFill>
@@ -37967,7 +37596,7 @@
               </a:buClr>
             </a:pPr>
             <a:r>
-              <a:rPr lang="en-US" sz="3200" dirty="0" smtClean="0">
+              <a:rPr lang="en-US" sz="3200" dirty="0">
                 <a:solidFill>
                   <a:srgbClr val="56565A"/>
                 </a:solidFill>
@@ -37975,7 +37604,7 @@
               <a:t>Uses </a:t>
             </a:r>
             <a:r>
-              <a:rPr lang="en-US" sz="3600" b="1" dirty="0" smtClean="0">
+              <a:rPr lang="en-US" sz="3600" b="1" dirty="0">
                 <a:solidFill>
                   <a:schemeClr val="accent1">
                     <a:lumMod val="50000"/>
@@ -37986,7 +37615,7 @@
               <a:t>.</a:t>
             </a:r>
             <a:r>
-              <a:rPr lang="en-US" sz="3600" b="1" dirty="0" err="1" smtClean="0">
+              <a:rPr lang="en-US" sz="3600" b="1" dirty="0" err="1">
                 <a:solidFill>
                   <a:schemeClr val="accent1">
                     <a:lumMod val="50000"/>
@@ -37997,7 +37626,7 @@
               <a:t>textContent</a:t>
             </a:r>
             <a:r>
-              <a:rPr lang="en-US" sz="3200" dirty="0" smtClean="0">
+              <a:rPr lang="en-US" sz="3200" dirty="0">
                 <a:solidFill>
                   <a:srgbClr val="56565A"/>
                 </a:solidFill>
@@ -38012,7 +37641,7 @@
               </a:buClr>
               <a:buNone/>
             </a:pPr>
-            <a:endParaRPr lang="en-US" sz="3600" dirty="0" smtClean="0">
+            <a:endParaRPr lang="en-US" sz="3600" dirty="0">
               <a:solidFill>
                 <a:srgbClr val="000000"/>
               </a:solidFill>
@@ -38048,16 +37677,7 @@
                 </a:solidFill>
                 <a:latin typeface="Consolas" panose="020B0609020204030204" pitchFamily="49" charset="0"/>
               </a:rPr>
-              <a:t>&lt;/p</a:t>
-            </a:r>
-            <a:r>
-              <a:rPr lang="en-US" sz="4400" dirty="0" smtClean="0">
-                <a:solidFill>
-                  <a:srgbClr val="800000"/>
-                </a:solidFill>
-                <a:latin typeface="Consolas" panose="020B0609020204030204" pitchFamily="49" charset="0"/>
-              </a:rPr>
-              <a:t>&gt;</a:t>
+              <a:t>&lt;/p&gt;</a:t>
             </a:r>
             <a:endParaRPr lang="en-US" sz="4400" dirty="0">
               <a:solidFill>
@@ -38513,10 +38133,9 @@
           <a:lstStyle/>
           <a:p>
             <a:r>
-              <a:rPr lang="en-US" dirty="0" smtClean="0"/>
+              <a:rPr lang="en-US" dirty="0"/>
               <a:t>Where does the new element go?</a:t>
             </a:r>
-            <a:endParaRPr lang="en-US" dirty="0"/>
           </a:p>
         </p:txBody>
       </p:sp>
@@ -38539,32 +38158,32 @@
               <a:buNone/>
             </a:pPr>
             <a:r>
-              <a:rPr lang="en-US" i="1" dirty="0" smtClean="0"/>
+              <a:rPr lang="en-US" i="1" dirty="0"/>
               <a:t>Nowhere!</a:t>
             </a:r>
-            <a:endParaRPr lang="en-US" dirty="0" smtClean="0"/>
+            <a:endParaRPr lang="en-US" dirty="0"/>
           </a:p>
           <a:p>
             <a:r>
-              <a:rPr lang="en-US" dirty="0" smtClean="0"/>
+              <a:rPr lang="en-US" dirty="0"/>
               <a:t>Before the element appears, it must be </a:t>
             </a:r>
             <a:r>
-              <a:rPr lang="en-US" i="1" dirty="0" smtClean="0"/>
+              <a:rPr lang="en-US" i="1" dirty="0"/>
               <a:t>appended</a:t>
             </a:r>
             <a:r>
-              <a:rPr lang="en-US" dirty="0" smtClean="0"/>
+              <a:rPr lang="en-US" dirty="0"/>
               <a:t> to the document</a:t>
             </a:r>
           </a:p>
           <a:p>
             <a:r>
-              <a:rPr lang="en-US" dirty="0" smtClean="0"/>
+              <a:rPr lang="en-US" dirty="0"/>
               <a:t>Use </a:t>
             </a:r>
             <a:r>
-              <a:rPr lang="en-US" b="1" dirty="0" smtClean="0">
+              <a:rPr lang="en-US" b="1" dirty="0">
                 <a:solidFill>
                   <a:schemeClr val="accent1">
                     <a:lumMod val="50000"/>
@@ -38575,7 +38194,7 @@
               <a:t>.</a:t>
             </a:r>
             <a:r>
-              <a:rPr lang="en-US" b="1" dirty="0" err="1" smtClean="0">
+              <a:rPr lang="en-US" b="1" dirty="0" err="1">
                 <a:solidFill>
                   <a:schemeClr val="accent1">
                     <a:lumMod val="50000"/>
@@ -38586,27 +38205,27 @@
               <a:t>appendChild</a:t>
             </a:r>
             <a:r>
-              <a:rPr lang="en-US" dirty="0" smtClean="0"/>
+              <a:rPr lang="en-US" dirty="0"/>
               <a:t> to add the element as a child of </a:t>
             </a:r>
             <a:r>
-              <a:rPr lang="en-US" i="1" dirty="0" smtClean="0"/>
+              <a:rPr lang="en-US" i="1" dirty="0"/>
               <a:t>another</a:t>
             </a:r>
             <a:r>
-              <a:rPr lang="en-US" dirty="0" smtClean="0"/>
+              <a:rPr lang="en-US" dirty="0"/>
               <a:t> element</a:t>
             </a:r>
           </a:p>
           <a:p>
-            <a:endParaRPr lang="en-US" dirty="0" smtClean="0"/>
+            <a:endParaRPr lang="en-US" dirty="0"/>
           </a:p>
           <a:p>
             <a:pPr marL="57150" indent="0">
               <a:buNone/>
             </a:pPr>
             <a:r>
-              <a:rPr lang="en-US" b="1" dirty="0" smtClean="0"/>
+              <a:rPr lang="en-US" b="1" dirty="0"/>
               <a:t>HTML:</a:t>
             </a:r>
           </a:p>
@@ -38615,7 +38234,7 @@
               <a:buNone/>
             </a:pPr>
             <a:r>
-              <a:rPr lang="en-US" sz="2800" dirty="0" smtClean="0">
+              <a:rPr lang="en-US" sz="2800" dirty="0">
                 <a:solidFill>
                   <a:srgbClr val="800000"/>
                 </a:solidFill>
@@ -38624,7 +38243,7 @@
               <a:t>&lt;div</a:t>
             </a:r>
             <a:r>
-              <a:rPr lang="en-US" sz="2800" dirty="0" smtClean="0">
+              <a:rPr lang="en-US" sz="2800" dirty="0">
                 <a:solidFill>
                   <a:srgbClr val="000000"/>
                 </a:solidFill>
@@ -38666,16 +38285,7 @@
                 </a:solidFill>
                 <a:latin typeface="Consolas" panose="020B0609020204030204" pitchFamily="49" charset="0"/>
               </a:rPr>
-              <a:t>&gt;&lt;/div</a:t>
-            </a:r>
-            <a:r>
-              <a:rPr lang="en-US" sz="2800" dirty="0" smtClean="0">
-                <a:solidFill>
-                  <a:srgbClr val="800000"/>
-                </a:solidFill>
-                <a:latin typeface="Consolas" panose="020B0609020204030204" pitchFamily="49" charset="0"/>
-              </a:rPr>
-              <a:t>&gt;</a:t>
+              <a:t>&gt;&lt;/div&gt;</a:t>
             </a:r>
           </a:p>
           <a:p>
@@ -38683,7 +38293,7 @@
               <a:buNone/>
             </a:pPr>
             <a:r>
-              <a:rPr lang="en-US" b="1" dirty="0" smtClean="0"/>
+              <a:rPr lang="en-US" b="1" dirty="0"/>
               <a:t>JS:</a:t>
             </a:r>
             <a:endParaRPr lang="en-US" dirty="0">
@@ -38698,16 +38308,16 @@
               <a:buNone/>
             </a:pPr>
             <a:r>
-              <a:rPr lang="en-US" sz="2800" dirty="0" err="1" smtClean="0">
+              <a:rPr lang="en-US" sz="2800" dirty="0">
                 <a:solidFill>
                   <a:srgbClr val="0000FF"/>
                 </a:solidFill>
                 <a:latin typeface="Consolas" panose="020B0609020204030204" pitchFamily="49" charset="0"/>
               </a:rPr>
-              <a:t>var</a:t>
+              <a:t>let</a:t>
             </a:r>
             <a:r>
-              <a:rPr lang="en-US" sz="2800" dirty="0" smtClean="0">
+              <a:rPr lang="en-US" sz="2800" dirty="0">
                 <a:solidFill>
                   <a:srgbClr val="000000"/>
                 </a:solidFill>
@@ -38775,7 +38385,7 @@
               <a:buNone/>
             </a:pPr>
             <a:r>
-              <a:rPr lang="en-US" sz="2800" dirty="0" err="1" smtClean="0">
+              <a:rPr lang="en-US" sz="2800" dirty="0" err="1">
                 <a:solidFill>
                   <a:srgbClr val="000000"/>
                 </a:solidFill>
@@ -38784,7 +38394,7 @@
               <a:t>myDiv.appendChild</a:t>
             </a:r>
             <a:r>
-              <a:rPr lang="en-US" sz="2800" dirty="0" smtClean="0">
+              <a:rPr lang="en-US" sz="2800" dirty="0">
                 <a:solidFill>
                   <a:srgbClr val="000000"/>
                 </a:solidFill>
@@ -38793,7 +38403,7 @@
               <a:t>(</a:t>
             </a:r>
             <a:r>
-              <a:rPr lang="en-US" sz="2800" dirty="0" err="1" smtClean="0">
+              <a:rPr lang="en-US" sz="2800" dirty="0" err="1">
                 <a:solidFill>
                   <a:srgbClr val="000000"/>
                 </a:solidFill>
@@ -38802,7 +38412,7 @@
               <a:t>myPara</a:t>
             </a:r>
             <a:r>
-              <a:rPr lang="en-US" sz="2800" dirty="0" smtClean="0">
+              <a:rPr lang="en-US" sz="2800" dirty="0">
                 <a:solidFill>
                   <a:srgbClr val="000000"/>
                 </a:solidFill>
@@ -39473,10 +39083,9 @@
           <a:lstStyle/>
           <a:p>
             <a:r>
-              <a:rPr lang="en-US" dirty="0" smtClean="0"/>
+              <a:rPr lang="en-US" dirty="0"/>
               <a:t>Breaking down the statement</a:t>
             </a:r>
-            <a:endParaRPr lang="en-US" dirty="0"/>
           </a:p>
         </p:txBody>
       </p:sp>
@@ -39501,7 +39110,7 @@
               <a:buNone/>
             </a:pPr>
             <a:r>
-              <a:rPr lang="en-US" sz="5400" dirty="0" err="1" smtClean="0">
+              <a:rPr lang="en-US" sz="5400" dirty="0" err="1">
                 <a:solidFill>
                   <a:srgbClr val="000000"/>
                 </a:solidFill>
@@ -39510,7 +39119,7 @@
               <a:t>myDiv.appendChild</a:t>
             </a:r>
             <a:r>
-              <a:rPr lang="en-US" sz="5400" dirty="0" smtClean="0">
+              <a:rPr lang="en-US" sz="5400" dirty="0">
                 <a:solidFill>
                   <a:srgbClr val="000000"/>
                 </a:solidFill>
@@ -39519,7 +39128,7 @@
               <a:t>(</a:t>
             </a:r>
             <a:r>
-              <a:rPr lang="en-US" sz="5400" dirty="0" err="1" smtClean="0">
+              <a:rPr lang="en-US" sz="5400" dirty="0" err="1">
                 <a:solidFill>
                   <a:srgbClr val="000000"/>
                 </a:solidFill>
@@ -39528,7 +39137,7 @@
               <a:t>myPara</a:t>
             </a:r>
             <a:r>
-              <a:rPr lang="en-US" sz="5400" dirty="0" smtClean="0">
+              <a:rPr lang="en-US" sz="5400" dirty="0">
                 <a:solidFill>
                   <a:srgbClr val="000000"/>
                 </a:solidFill>
@@ -39536,7 +39145,12 @@
               </a:rPr>
               <a:t>);</a:t>
             </a:r>
-            <a:endParaRPr lang="en-US" sz="5400" dirty="0">
+          </a:p>
+          <a:p>
+            <a:pPr marL="0" indent="0">
+              <a:buNone/>
+            </a:pPr>
+            <a:endParaRPr lang="en-US" sz="4400" dirty="0">
               <a:solidFill>
                 <a:srgbClr val="000000"/>
               </a:solidFill>
@@ -39547,7 +39161,7 @@
             <a:pPr marL="0" indent="0">
               <a:buNone/>
             </a:pPr>
-            <a:endParaRPr lang="en-US" sz="4400" dirty="0" smtClean="0">
+            <a:endParaRPr lang="en-US" sz="4400" dirty="0">
               <a:solidFill>
                 <a:srgbClr val="000000"/>
               </a:solidFill>
@@ -39558,18 +39172,7 @@
             <a:pPr marL="0" indent="0">
               <a:buNone/>
             </a:pPr>
-            <a:endParaRPr lang="en-US" sz="4400" dirty="0" smtClean="0">
-              <a:solidFill>
-                <a:srgbClr val="000000"/>
-              </a:solidFill>
-              <a:latin typeface="Consolas" panose="020B0609020204030204" pitchFamily="49" charset="0"/>
-            </a:endParaRPr>
-          </a:p>
-          <a:p>
-            <a:pPr marL="0" indent="0">
-              <a:buNone/>
-            </a:pPr>
-            <a:endParaRPr lang="en-US" dirty="0" smtClean="0"/>
+            <a:endParaRPr lang="en-US" dirty="0"/>
           </a:p>
         </p:txBody>
       </p:sp>
@@ -39685,7 +39288,7 @@
               <a:defRPr/>
             </a:pPr>
             <a:r>
-              <a:rPr kumimoji="0" lang="en-US" sz="4000" b="1" i="0" u="none" strike="noStrike" kern="1200" cap="none" spc="0" normalizeH="0" baseline="0" noProof="0" dirty="0" err="1" smtClean="0">
+              <a:rPr kumimoji="0" lang="en-US" sz="4000" b="1" i="0" u="none" strike="noStrike" kern="1200" cap="none" spc="0" normalizeH="0" baseline="0" noProof="0" dirty="0" err="1">
                 <a:ln>
                   <a:noFill/>
                 </a:ln>
@@ -39702,7 +39305,7 @@
               <a:t>myDiv</a:t>
             </a:r>
             <a:r>
-              <a:rPr kumimoji="0" lang="en-US" sz="4000" b="0" i="0" u="none" strike="noStrike" kern="1200" cap="none" spc="0" normalizeH="0" baseline="0" noProof="0" dirty="0" smtClean="0">
+              <a:rPr kumimoji="0" lang="en-US" sz="4000" b="0" i="0" u="none" strike="noStrike" kern="1200" cap="none" spc="0" normalizeH="0" baseline="0" noProof="0" dirty="0">
                 <a:ln>
                   <a:noFill/>
                 </a:ln>
@@ -39719,7 +39322,7 @@
               <a:t>: </a:t>
             </a:r>
             <a:r>
-              <a:rPr kumimoji="0" lang="en-US" sz="4000" b="0" i="1" u="none" strike="noStrike" kern="1200" cap="none" spc="0" normalizeH="0" baseline="0" noProof="0" dirty="0" smtClean="0">
+              <a:rPr kumimoji="0" lang="en-US" sz="4000" b="0" i="1" u="none" strike="noStrike" kern="1200" cap="none" spc="0" normalizeH="0" baseline="0" noProof="0" dirty="0">
                 <a:ln>
                   <a:noFill/>
                 </a:ln>
@@ -39736,7 +39339,7 @@
               <a:t>variable</a:t>
             </a:r>
             <a:r>
-              <a:rPr kumimoji="0" lang="en-US" sz="4000" b="0" i="0" u="none" strike="noStrike" kern="1200" cap="none" spc="0" normalizeH="0" baseline="0" noProof="0" dirty="0" smtClean="0">
+              <a:rPr kumimoji="0" lang="en-US" sz="4000" b="0" i="0" u="none" strike="noStrike" kern="1200" cap="none" spc="0" normalizeH="0" baseline="0" noProof="0" dirty="0">
                 <a:ln>
                   <a:noFill/>
                 </a:ln>
@@ -39941,7 +39544,7 @@
               <a:defRPr/>
             </a:pPr>
             <a:r>
-              <a:rPr kumimoji="0" lang="en-US" sz="4000" b="1" i="0" u="none" strike="noStrike" kern="1200" cap="none" spc="0" normalizeH="0" baseline="0" noProof="0" dirty="0" smtClean="0">
+              <a:rPr kumimoji="0" lang="en-US" sz="4000" b="1" i="0" u="none" strike="noStrike" kern="1200" cap="none" spc="0" normalizeH="0" baseline="0" noProof="0" dirty="0">
                 <a:ln>
                   <a:noFill/>
                 </a:ln>
@@ -39958,7 +39561,7 @@
               <a:t>.</a:t>
             </a:r>
             <a:r>
-              <a:rPr kumimoji="0" lang="en-US" sz="4000" b="1" i="0" u="none" strike="noStrike" kern="1200" cap="none" spc="0" normalizeH="0" baseline="0" noProof="0" dirty="0" err="1" smtClean="0">
+              <a:rPr kumimoji="0" lang="en-US" sz="4000" b="1" i="0" u="none" strike="noStrike" kern="1200" cap="none" spc="0" normalizeH="0" baseline="0" noProof="0" dirty="0" err="1">
                 <a:ln>
                   <a:noFill/>
                 </a:ln>
@@ -39975,7 +39578,7 @@
               <a:t>appendChild</a:t>
             </a:r>
             <a:r>
-              <a:rPr kumimoji="0" lang="en-US" sz="4000" b="0" i="0" u="none" strike="noStrike" kern="1200" cap="none" spc="0" normalizeH="0" baseline="0" noProof="0" dirty="0" smtClean="0">
+              <a:rPr kumimoji="0" lang="en-US" sz="4000" b="0" i="0" u="none" strike="noStrike" kern="1200" cap="none" spc="0" normalizeH="0" baseline="0" noProof="0" dirty="0">
                 <a:ln>
                   <a:noFill/>
                 </a:ln>
@@ -39992,7 +39595,7 @@
               <a:t>: </a:t>
             </a:r>
             <a:r>
-              <a:rPr kumimoji="0" lang="en-US" sz="4000" b="0" i="1" u="none" strike="noStrike" kern="1200" cap="none" spc="0" normalizeH="0" baseline="0" noProof="0" dirty="0" smtClean="0">
+              <a:rPr kumimoji="0" lang="en-US" sz="4000" b="0" i="1" u="none" strike="noStrike" kern="1200" cap="none" spc="0" normalizeH="0" baseline="0" noProof="0" dirty="0">
                 <a:ln>
                   <a:noFill/>
                 </a:ln>
@@ -40009,7 +39612,7 @@
               <a:t>function</a:t>
             </a:r>
             <a:r>
-              <a:rPr kumimoji="0" lang="en-US" sz="4000" b="0" i="0" u="none" strike="noStrike" kern="1200" cap="none" spc="0" normalizeH="0" baseline="0" noProof="0" dirty="0" smtClean="0">
+              <a:rPr kumimoji="0" lang="en-US" sz="4000" b="0" i="0" u="none" strike="noStrike" kern="1200" cap="none" spc="0" normalizeH="0" baseline="0" noProof="0" dirty="0">
                 <a:ln>
                   <a:noFill/>
                 </a:ln>
@@ -40026,7 +39629,7 @@
               <a:t> that adds </a:t>
             </a:r>
             <a:r>
-              <a:rPr kumimoji="0" lang="en-US" sz="4000" b="0" i="0" u="none" strike="noStrike" kern="1200" cap="none" spc="0" normalizeH="0" baseline="0" noProof="0" dirty="0" err="1" smtClean="0">
+              <a:rPr kumimoji="0" lang="en-US" sz="4000" b="0" i="0" u="none" strike="noStrike" kern="1200" cap="none" spc="0" normalizeH="0" baseline="0" noProof="0" dirty="0" err="1">
                 <a:ln>
                   <a:noFill/>
                 </a:ln>
@@ -40043,7 +39646,7 @@
               <a:t>myPara</a:t>
             </a:r>
             <a:r>
-              <a:rPr kumimoji="0" lang="en-US" sz="4000" b="0" i="0" u="none" strike="noStrike" kern="1200" cap="none" spc="0" normalizeH="0" baseline="0" noProof="0" dirty="0" smtClean="0">
+              <a:rPr kumimoji="0" lang="en-US" sz="4000" b="0" i="0" u="none" strike="noStrike" kern="1200" cap="none" spc="0" normalizeH="0" baseline="0" noProof="0" dirty="0">
                 <a:ln>
                   <a:noFill/>
                 </a:ln>
@@ -40060,7 +39663,7 @@
               <a:t> to the page as a child of </a:t>
             </a:r>
             <a:r>
-              <a:rPr kumimoji="0" lang="en-US" sz="4000" b="0" i="0" u="none" strike="noStrike" kern="1200" cap="none" spc="0" normalizeH="0" baseline="0" noProof="0" dirty="0" err="1" smtClean="0">
+              <a:rPr kumimoji="0" lang="en-US" sz="4000" b="0" i="0" u="none" strike="noStrike" kern="1200" cap="none" spc="0" normalizeH="0" baseline="0" noProof="0" dirty="0" err="1">
                 <a:ln>
                   <a:noFill/>
                 </a:ln>
@@ -40210,7 +39813,7 @@
               <a:defRPr/>
             </a:pPr>
             <a:r>
-              <a:rPr kumimoji="0" lang="en-US" sz="4000" b="1" i="0" u="none" strike="noStrike" kern="1200" cap="none" spc="0" normalizeH="0" baseline="0" noProof="0" dirty="0" err="1" smtClean="0">
+              <a:rPr kumimoji="0" lang="en-US" sz="4000" b="1" i="0" u="none" strike="noStrike" kern="1200" cap="none" spc="0" normalizeH="0" baseline="0" noProof="0" dirty="0" err="1">
                 <a:ln>
                   <a:noFill/>
                 </a:ln>
@@ -40227,7 +39830,7 @@
               <a:t>myPara</a:t>
             </a:r>
             <a:r>
-              <a:rPr kumimoji="0" lang="en-US" sz="4000" b="0" i="0" u="none" strike="noStrike" kern="1200" cap="none" spc="0" normalizeH="0" baseline="0" noProof="0" dirty="0" smtClean="0">
+              <a:rPr kumimoji="0" lang="en-US" sz="4000" b="0" i="0" u="none" strike="noStrike" kern="1200" cap="none" spc="0" normalizeH="0" baseline="0" noProof="0" dirty="0">
                 <a:ln>
                   <a:noFill/>
                 </a:ln>
@@ -40244,7 +39847,7 @@
               <a:t>: </a:t>
             </a:r>
             <a:r>
-              <a:rPr kumimoji="0" lang="en-US" sz="4000" b="0" i="1" u="none" strike="noStrike" kern="1200" cap="none" spc="0" normalizeH="0" baseline="0" noProof="0" dirty="0" smtClean="0">
+              <a:rPr kumimoji="0" lang="en-US" sz="4000" b="0" i="1" u="none" strike="noStrike" kern="1200" cap="none" spc="0" normalizeH="0" baseline="0" noProof="0" dirty="0">
                 <a:ln>
                   <a:noFill/>
                 </a:ln>
@@ -40261,7 +39864,7 @@
               <a:t>variable</a:t>
             </a:r>
             <a:r>
-              <a:rPr kumimoji="0" lang="en-US" sz="4000" b="0" i="0" u="none" strike="noStrike" kern="1200" cap="none" spc="0" normalizeH="0" baseline="0" noProof="0" dirty="0" smtClean="0">
+              <a:rPr kumimoji="0" lang="en-US" sz="4000" b="0" i="0" u="none" strike="noStrike" kern="1200" cap="none" spc="0" normalizeH="0" baseline="0" noProof="0" dirty="0">
                 <a:ln>
                   <a:noFill/>
                 </a:ln>
@@ -40277,20 +39880,6 @@
               </a:rPr>
               <a:t> containing a new child element</a:t>
             </a:r>
-            <a:endParaRPr kumimoji="0" lang="en-US" sz="4000" b="0" i="0" u="none" strike="noStrike" kern="1200" cap="none" spc="0" normalizeH="0" baseline="0" noProof="0" dirty="0">
-              <a:ln>
-                <a:noFill/>
-              </a:ln>
-              <a:solidFill>
-                <a:srgbClr val="FF7900"/>
-              </a:solidFill>
-              <a:effectLst/>
-              <a:uLnTx/>
-              <a:uFillTx/>
-              <a:latin typeface="Calibri" panose="020F0502020204030204"/>
-              <a:ea typeface="+mn-ea"/>
-              <a:cs typeface="+mn-cs"/>
-            </a:endParaRPr>
           </a:p>
         </p:txBody>
       </p:sp>
@@ -40957,10 +40546,9 @@
           <a:lstStyle/>
           <a:p>
             <a:r>
-              <a:rPr lang="en-US" dirty="0" smtClean="0"/>
+              <a:rPr lang="en-US" dirty="0"/>
               <a:t>Append child example</a:t>
             </a:r>
-            <a:endParaRPr lang="en-US" dirty="0"/>
           </a:p>
         </p:txBody>
       </p:sp>
@@ -40985,12 +40573,12 @@
               <a:buNone/>
             </a:pPr>
             <a:r>
-              <a:rPr lang="en-US" sz="11500" dirty="0">
+              <a:rPr lang="en-US" sz="9600" dirty="0">
                 <a:hlinkClick r:id="rId3"/>
               </a:rPr>
-              <a:t>https://repl.it/repls/IncompatibleGoodMonitors</a:t>
+              <a:t>https://replit.com/@HylandOutreach/CreateTextContent</a:t>
             </a:r>
-            <a:endParaRPr lang="en-US" sz="16600" dirty="0"/>
+            <a:endParaRPr lang="en-US" sz="9600" dirty="0"/>
           </a:p>
         </p:txBody>
       </p:sp>
@@ -41007,13 +40595,67 @@
   <p:transition>
     <p:fade/>
   </p:transition>
-  <p:timing>
-    <p:tnLst>
-      <p:par>
-        <p:cTn id="1" dur="indefinite" restart="never" nodeType="tmRoot"/>
-      </p:par>
-    </p:tnLst>
-  </p:timing>
+</p:sld>
+</file>
+
+<file path=ppt/slides/slide9.xml><?xml version="1.0" encoding="utf-8"?>
+<p:sld xmlns:a="http://schemas.openxmlformats.org/drawingml/2006/main" xmlns:r="http://schemas.openxmlformats.org/officeDocument/2006/relationships" xmlns:p="http://schemas.openxmlformats.org/presentationml/2006/main">
+  <p:cSld>
+    <p:spTree>
+      <p:nvGrpSpPr>
+        <p:cNvPr id="1" name=""/>
+        <p:cNvGrpSpPr/>
+        <p:nvPr/>
+      </p:nvGrpSpPr>
+      <p:grpSpPr>
+        <a:xfrm>
+          <a:off x="0" y="0"/>
+          <a:ext cx="0" cy="0"/>
+          <a:chOff x="0" y="0"/>
+          <a:chExt cx="0" cy="0"/>
+        </a:xfrm>
+      </p:grpSpPr>
+      <p:sp>
+        <p:nvSpPr>
+          <p:cNvPr id="2" name="Text Placeholder 1">
+            <a:extLst>
+              <a:ext uri="{FF2B5EF4-FFF2-40B4-BE49-F238E27FC236}">
+                <a16:creationId xmlns:a16="http://schemas.microsoft.com/office/drawing/2014/main" id="{85CBF4D0-D013-46D0-B59F-9567A62ADA9A}"/>
+              </a:ext>
+            </a:extLst>
+          </p:cNvPr>
+          <p:cNvSpPr>
+            <a:spLocks noGrp="1"/>
+          </p:cNvSpPr>
+          <p:nvPr>
+            <p:ph type="body" sz="quarter" idx="10"/>
+          </p:nvPr>
+        </p:nvSpPr>
+        <p:spPr/>
+        <p:txBody>
+          <a:bodyPr/>
+          <a:lstStyle/>
+          <a:p>
+            <a:r>
+              <a:rPr lang="en-US" dirty="0"/>
+              <a:t>Questions?</a:t>
+            </a:r>
+          </a:p>
+        </p:txBody>
+      </p:sp>
+    </p:spTree>
+    <p:extLst>
+      <p:ext uri="{BB962C8B-B14F-4D97-AF65-F5344CB8AC3E}">
+        <p14:creationId xmlns:p14="http://schemas.microsoft.com/office/powerpoint/2010/main" val="1653481131"/>
+      </p:ext>
+    </p:extLst>
+  </p:cSld>
+  <p:clrMapOvr>
+    <a:masterClrMapping/>
+  </p:clrMapOvr>
+  <p:transition>
+    <p:fade/>
+  </p:transition>
 </p:sld>
 </file>
 

</xml_diff>